<commit_message>
Re #1828 Hopefully final touches.
</commit_message>
<xml_diff>
--- a/documentation/presentations/HoraceIntro.pptx
+++ b/documentation/presentations/HoraceIntro.pptx
@@ -7,24 +7,36 @@
     <p:sldMasterId id="2147483663" r:id="rId6"/>
     <p:sldMasterId id="2147483734" r:id="rId7"/>
   </p:sldMasterIdLst>
+  <p:notesMasterIdLst>
+    <p:notesMasterId r:id="rId19"/>
+  </p:notesMasterIdLst>
   <p:handoutMasterIdLst>
-    <p:handoutMasterId r:id="rId19"/>
+    <p:handoutMasterId r:id="rId20"/>
   </p:handoutMasterIdLst>
   <p:sldIdLst>
     <p:sldId id="256" r:id="rId8"/>
     <p:sldId id="260" r:id="rId9"/>
-    <p:sldId id="262" r:id="rId10"/>
-    <p:sldId id="263" r:id="rId11"/>
-    <p:sldId id="264" r:id="rId12"/>
-    <p:sldId id="265" r:id="rId13"/>
-    <p:sldId id="266" r:id="rId14"/>
-    <p:sldId id="259" r:id="rId15"/>
-    <p:sldId id="261" r:id="rId16"/>
-    <p:sldId id="267" r:id="rId17"/>
-    <p:sldId id="258" r:id="rId18"/>
+    <p:sldId id="471" r:id="rId10"/>
+    <p:sldId id="262" r:id="rId11"/>
+    <p:sldId id="263" r:id="rId12"/>
+    <p:sldId id="264" r:id="rId13"/>
+    <p:sldId id="265" r:id="rId14"/>
+    <p:sldId id="266" r:id="rId15"/>
+    <p:sldId id="259" r:id="rId16"/>
+    <p:sldId id="261" r:id="rId17"/>
+    <p:sldId id="267" r:id="rId18"/>
   </p:sldIdLst>
   <p:sldSz cx="12192000" cy="6858000"/>
   <p:notesSz cx="6858000" cy="9144000"/>
+  <p:embeddedFontLst>
+    <p:embeddedFont>
+      <p:font typeface="Trebuchet MS" panose="020B0603020202020204" pitchFamily="34" charset="0"/>
+      <p:regular r:id="rId21"/>
+      <p:bold r:id="rId22"/>
+      <p:italic r:id="rId23"/>
+      <p:boldItalic r:id="rId24"/>
+    </p:embeddedFont>
+  </p:embeddedFontLst>
   <p:defaultTextStyle>
     <a:defPPr>
       <a:defRPr lang="en-US"/>
@@ -952,6 +964,356 @@
 </p:handoutMaster>
 </file>
 
+<file path=ppt/notesMasters/notesMaster1.xml><?xml version="1.0" encoding="utf-8"?>
+<p:notesMaster xmlns:a="http://schemas.openxmlformats.org/drawingml/2006/main" xmlns:r="http://schemas.openxmlformats.org/officeDocument/2006/relationships" xmlns:p="http://schemas.openxmlformats.org/presentationml/2006/main">
+  <p:cSld>
+    <p:bg>
+      <p:bgRef idx="1001">
+        <a:schemeClr val="bg1"/>
+      </p:bgRef>
+    </p:bg>
+    <p:spTree>
+      <p:nvGrpSpPr>
+        <p:cNvPr id="1" name=""/>
+        <p:cNvGrpSpPr/>
+        <p:nvPr/>
+      </p:nvGrpSpPr>
+      <p:grpSpPr>
+        <a:xfrm>
+          <a:off x="0" y="0"/>
+          <a:ext cx="0" cy="0"/>
+          <a:chOff x="0" y="0"/>
+          <a:chExt cx="0" cy="0"/>
+        </a:xfrm>
+      </p:grpSpPr>
+      <p:sp>
+        <p:nvSpPr>
+          <p:cNvPr id="2" name="Header Placeholder 1"/>
+          <p:cNvSpPr>
+            <a:spLocks noGrp="1"/>
+          </p:cNvSpPr>
+          <p:nvPr>
+            <p:ph type="hdr" sz="quarter"/>
+          </p:nvPr>
+        </p:nvSpPr>
+        <p:spPr>
+          <a:xfrm>
+            <a:off x="0" y="0"/>
+            <a:ext cx="2971800" cy="458788"/>
+          </a:xfrm>
+          <a:prstGeom prst="rect">
+            <a:avLst/>
+          </a:prstGeom>
+        </p:spPr>
+        <p:txBody>
+          <a:bodyPr vert="horz" lIns="91440" tIns="45720" rIns="91440" bIns="45720" rtlCol="0"/>
+          <a:lstStyle>
+            <a:lvl1pPr algn="l">
+              <a:defRPr sz="1200"/>
+            </a:lvl1pPr>
+          </a:lstStyle>
+          <a:p>
+            <a:endParaRPr lang="en-GB"/>
+          </a:p>
+        </p:txBody>
+      </p:sp>
+      <p:sp>
+        <p:nvSpPr>
+          <p:cNvPr id="3" name="Date Placeholder 2"/>
+          <p:cNvSpPr>
+            <a:spLocks noGrp="1"/>
+          </p:cNvSpPr>
+          <p:nvPr>
+            <p:ph type="dt" idx="1"/>
+          </p:nvPr>
+        </p:nvSpPr>
+        <p:spPr>
+          <a:xfrm>
+            <a:off x="3884613" y="0"/>
+            <a:ext cx="2971800" cy="458788"/>
+          </a:xfrm>
+          <a:prstGeom prst="rect">
+            <a:avLst/>
+          </a:prstGeom>
+        </p:spPr>
+        <p:txBody>
+          <a:bodyPr vert="horz" lIns="91440" tIns="45720" rIns="91440" bIns="45720" rtlCol="0"/>
+          <a:lstStyle>
+            <a:lvl1pPr algn="r">
+              <a:defRPr sz="1200"/>
+            </a:lvl1pPr>
+          </a:lstStyle>
+          <a:p>
+            <a:fld id="{573D2489-8F64-4E53-A5EB-4423DDD23EF5}" type="datetimeFigureOut">
+              <a:rPr lang="en-GB" smtClean="0"/>
+              <a:t>25/02/2025</a:t>
+            </a:fld>
+            <a:endParaRPr lang="en-GB"/>
+          </a:p>
+        </p:txBody>
+      </p:sp>
+      <p:sp>
+        <p:nvSpPr>
+          <p:cNvPr id="4" name="Slide Image Placeholder 3"/>
+          <p:cNvSpPr>
+            <a:spLocks noGrp="1" noRot="1" noChangeAspect="1"/>
+          </p:cNvSpPr>
+          <p:nvPr>
+            <p:ph type="sldImg" idx="2"/>
+          </p:nvPr>
+        </p:nvSpPr>
+        <p:spPr>
+          <a:xfrm>
+            <a:off x="685800" y="1143000"/>
+            <a:ext cx="5486400" cy="3086100"/>
+          </a:xfrm>
+          <a:prstGeom prst="rect">
+            <a:avLst/>
+          </a:prstGeom>
+          <a:noFill/>
+          <a:ln w="12700">
+            <a:solidFill>
+              <a:prstClr val="black"/>
+            </a:solidFill>
+          </a:ln>
+        </p:spPr>
+        <p:txBody>
+          <a:bodyPr vert="horz" lIns="91440" tIns="45720" rIns="91440" bIns="45720" rtlCol="0" anchor="ctr"/>
+          <a:lstStyle/>
+          <a:p>
+            <a:endParaRPr lang="en-GB"/>
+          </a:p>
+        </p:txBody>
+      </p:sp>
+      <p:sp>
+        <p:nvSpPr>
+          <p:cNvPr id="5" name="Notes Placeholder 4"/>
+          <p:cNvSpPr>
+            <a:spLocks noGrp="1"/>
+          </p:cNvSpPr>
+          <p:nvPr>
+            <p:ph type="body" sz="quarter" idx="3"/>
+          </p:nvPr>
+        </p:nvSpPr>
+        <p:spPr>
+          <a:xfrm>
+            <a:off x="685800" y="4400550"/>
+            <a:ext cx="5486400" cy="3600450"/>
+          </a:xfrm>
+          <a:prstGeom prst="rect">
+            <a:avLst/>
+          </a:prstGeom>
+        </p:spPr>
+        <p:txBody>
+          <a:bodyPr vert="horz" lIns="91440" tIns="45720" rIns="91440" bIns="45720" rtlCol="0"/>
+          <a:lstStyle/>
+          <a:p>
+            <a:pPr lvl="0"/>
+            <a:r>
+              <a:rPr lang="en-US"/>
+              <a:t>Click to edit Master text styles</a:t>
+            </a:r>
+          </a:p>
+          <a:p>
+            <a:pPr lvl="1"/>
+            <a:r>
+              <a:rPr lang="en-US"/>
+              <a:t>Second level</a:t>
+            </a:r>
+          </a:p>
+          <a:p>
+            <a:pPr lvl="2"/>
+            <a:r>
+              <a:rPr lang="en-US"/>
+              <a:t>Third level</a:t>
+            </a:r>
+          </a:p>
+          <a:p>
+            <a:pPr lvl="3"/>
+            <a:r>
+              <a:rPr lang="en-US"/>
+              <a:t>Fourth level</a:t>
+            </a:r>
+          </a:p>
+          <a:p>
+            <a:pPr lvl="4"/>
+            <a:r>
+              <a:rPr lang="en-US"/>
+              <a:t>Fifth level</a:t>
+            </a:r>
+            <a:endParaRPr lang="en-GB"/>
+          </a:p>
+        </p:txBody>
+      </p:sp>
+      <p:sp>
+        <p:nvSpPr>
+          <p:cNvPr id="6" name="Footer Placeholder 5"/>
+          <p:cNvSpPr>
+            <a:spLocks noGrp="1"/>
+          </p:cNvSpPr>
+          <p:nvPr>
+            <p:ph type="ftr" sz="quarter" idx="4"/>
+          </p:nvPr>
+        </p:nvSpPr>
+        <p:spPr>
+          <a:xfrm>
+            <a:off x="0" y="8685213"/>
+            <a:ext cx="2971800" cy="458787"/>
+          </a:xfrm>
+          <a:prstGeom prst="rect">
+            <a:avLst/>
+          </a:prstGeom>
+        </p:spPr>
+        <p:txBody>
+          <a:bodyPr vert="horz" lIns="91440" tIns="45720" rIns="91440" bIns="45720" rtlCol="0" anchor="b"/>
+          <a:lstStyle>
+            <a:lvl1pPr algn="l">
+              <a:defRPr sz="1200"/>
+            </a:lvl1pPr>
+          </a:lstStyle>
+          <a:p>
+            <a:endParaRPr lang="en-GB"/>
+          </a:p>
+        </p:txBody>
+      </p:sp>
+      <p:sp>
+        <p:nvSpPr>
+          <p:cNvPr id="7" name="Slide Number Placeholder 6"/>
+          <p:cNvSpPr>
+            <a:spLocks noGrp="1"/>
+          </p:cNvSpPr>
+          <p:nvPr>
+            <p:ph type="sldNum" sz="quarter" idx="5"/>
+          </p:nvPr>
+        </p:nvSpPr>
+        <p:spPr>
+          <a:xfrm>
+            <a:off x="3884613" y="8685213"/>
+            <a:ext cx="2971800" cy="458787"/>
+          </a:xfrm>
+          <a:prstGeom prst="rect">
+            <a:avLst/>
+          </a:prstGeom>
+        </p:spPr>
+        <p:txBody>
+          <a:bodyPr vert="horz" lIns="91440" tIns="45720" rIns="91440" bIns="45720" rtlCol="0" anchor="b"/>
+          <a:lstStyle>
+            <a:lvl1pPr algn="r">
+              <a:defRPr sz="1200"/>
+            </a:lvl1pPr>
+          </a:lstStyle>
+          <a:p>
+            <a:fld id="{22F882CC-523A-434A-A62A-6AD0EFC64087}" type="slidenum">
+              <a:rPr lang="en-GB" smtClean="0"/>
+              <a:t>‹#›</a:t>
+            </a:fld>
+            <a:endParaRPr lang="en-GB"/>
+          </a:p>
+        </p:txBody>
+      </p:sp>
+    </p:spTree>
+    <p:extLst>
+      <p:ext uri="{BB962C8B-B14F-4D97-AF65-F5344CB8AC3E}">
+        <p14:creationId xmlns:p14="http://schemas.microsoft.com/office/powerpoint/2010/main" val="1385934392"/>
+      </p:ext>
+    </p:extLst>
+  </p:cSld>
+  <p:clrMap bg1="lt1" tx1="dk1" bg2="lt2" tx2="dk2" accent1="accent1" accent2="accent2" accent3="accent3" accent4="accent4" accent5="accent5" accent6="accent6" hlink="hlink" folHlink="folHlink"/>
+  <p:notesStyle>
+    <a:lvl1pPr marL="0" algn="l" defTabSz="914400" rtl="0" eaLnBrk="1" latinLnBrk="0" hangingPunct="1">
+      <a:defRPr sz="1200" kern="1200">
+        <a:solidFill>
+          <a:schemeClr val="tx1"/>
+        </a:solidFill>
+        <a:latin typeface="+mn-lt"/>
+        <a:ea typeface="+mn-ea"/>
+        <a:cs typeface="+mn-cs"/>
+      </a:defRPr>
+    </a:lvl1pPr>
+    <a:lvl2pPr marL="457200" algn="l" defTabSz="914400" rtl="0" eaLnBrk="1" latinLnBrk="0" hangingPunct="1">
+      <a:defRPr sz="1200" kern="1200">
+        <a:solidFill>
+          <a:schemeClr val="tx1"/>
+        </a:solidFill>
+        <a:latin typeface="+mn-lt"/>
+        <a:ea typeface="+mn-ea"/>
+        <a:cs typeface="+mn-cs"/>
+      </a:defRPr>
+    </a:lvl2pPr>
+    <a:lvl3pPr marL="914400" algn="l" defTabSz="914400" rtl="0" eaLnBrk="1" latinLnBrk="0" hangingPunct="1">
+      <a:defRPr sz="1200" kern="1200">
+        <a:solidFill>
+          <a:schemeClr val="tx1"/>
+        </a:solidFill>
+        <a:latin typeface="+mn-lt"/>
+        <a:ea typeface="+mn-ea"/>
+        <a:cs typeface="+mn-cs"/>
+      </a:defRPr>
+    </a:lvl3pPr>
+    <a:lvl4pPr marL="1371600" algn="l" defTabSz="914400" rtl="0" eaLnBrk="1" latinLnBrk="0" hangingPunct="1">
+      <a:defRPr sz="1200" kern="1200">
+        <a:solidFill>
+          <a:schemeClr val="tx1"/>
+        </a:solidFill>
+        <a:latin typeface="+mn-lt"/>
+        <a:ea typeface="+mn-ea"/>
+        <a:cs typeface="+mn-cs"/>
+      </a:defRPr>
+    </a:lvl4pPr>
+    <a:lvl5pPr marL="1828800" algn="l" defTabSz="914400" rtl="0" eaLnBrk="1" latinLnBrk="0" hangingPunct="1">
+      <a:defRPr sz="1200" kern="1200">
+        <a:solidFill>
+          <a:schemeClr val="tx1"/>
+        </a:solidFill>
+        <a:latin typeface="+mn-lt"/>
+        <a:ea typeface="+mn-ea"/>
+        <a:cs typeface="+mn-cs"/>
+      </a:defRPr>
+    </a:lvl5pPr>
+    <a:lvl6pPr marL="2286000" algn="l" defTabSz="914400" rtl="0" eaLnBrk="1" latinLnBrk="0" hangingPunct="1">
+      <a:defRPr sz="1200" kern="1200">
+        <a:solidFill>
+          <a:schemeClr val="tx1"/>
+        </a:solidFill>
+        <a:latin typeface="+mn-lt"/>
+        <a:ea typeface="+mn-ea"/>
+        <a:cs typeface="+mn-cs"/>
+      </a:defRPr>
+    </a:lvl6pPr>
+    <a:lvl7pPr marL="2743200" algn="l" defTabSz="914400" rtl="0" eaLnBrk="1" latinLnBrk="0" hangingPunct="1">
+      <a:defRPr sz="1200" kern="1200">
+        <a:solidFill>
+          <a:schemeClr val="tx1"/>
+        </a:solidFill>
+        <a:latin typeface="+mn-lt"/>
+        <a:ea typeface="+mn-ea"/>
+        <a:cs typeface="+mn-cs"/>
+      </a:defRPr>
+    </a:lvl7pPr>
+    <a:lvl8pPr marL="3200400" algn="l" defTabSz="914400" rtl="0" eaLnBrk="1" latinLnBrk="0" hangingPunct="1">
+      <a:defRPr sz="1200" kern="1200">
+        <a:solidFill>
+          <a:schemeClr val="tx1"/>
+        </a:solidFill>
+        <a:latin typeface="+mn-lt"/>
+        <a:ea typeface="+mn-ea"/>
+        <a:cs typeface="+mn-cs"/>
+      </a:defRPr>
+    </a:lvl8pPr>
+    <a:lvl9pPr marL="3657600" algn="l" defTabSz="914400" rtl="0" eaLnBrk="1" latinLnBrk="0" hangingPunct="1">
+      <a:defRPr sz="1200" kern="1200">
+        <a:solidFill>
+          <a:schemeClr val="tx1"/>
+        </a:solidFill>
+        <a:latin typeface="+mn-lt"/>
+        <a:ea typeface="+mn-ea"/>
+        <a:cs typeface="+mn-cs"/>
+      </a:defRPr>
+    </a:lvl9pPr>
+  </p:notesStyle>
+</p:notesMaster>
+</file>
+
 <file path=ppt/slideLayouts/slideLayout1.xml><?xml version="1.0" encoding="utf-8"?>
 <p:sldLayout xmlns:a="http://schemas.openxmlformats.org/drawingml/2006/main" xmlns:r="http://schemas.openxmlformats.org/officeDocument/2006/relationships" xmlns:p="http://schemas.openxmlformats.org/presentationml/2006/main" preserve="1" userDrawn="1">
   <p:cSld name="Title Slide">
@@ -15282,7 +15644,7 @@
         <p:cNvPr id="1" name="">
           <a:extLst>
             <a:ext uri="{FF2B5EF4-FFF2-40B4-BE49-F238E27FC236}">
-              <a16:creationId xmlns:a16="http://schemas.microsoft.com/office/drawing/2014/main" id="{0CD77EA6-1EE9-0823-964E-6068B9395C5C}"/>
+              <a16:creationId xmlns:a16="http://schemas.microsoft.com/office/drawing/2014/main" id="{D9DC687F-AB89-1C3C-604A-4B4298546BDA}"/>
             </a:ext>
           </a:extLst>
         </p:cNvPr>
@@ -15299,10 +15661,10 @@
       </p:grpSpPr>
       <p:sp>
         <p:nvSpPr>
-          <p:cNvPr id="2" name="TextBox 1">
-            <a:extLst>
-              <a:ext uri="{FF2B5EF4-FFF2-40B4-BE49-F238E27FC236}">
-                <a16:creationId xmlns:a16="http://schemas.microsoft.com/office/drawing/2014/main" id="{DA831172-2A78-CB94-0985-E54391524AFB}"/>
+          <p:cNvPr id="9" name="TextBox 8">
+            <a:extLst>
+              <a:ext uri="{FF2B5EF4-FFF2-40B4-BE49-F238E27FC236}">
+                <a16:creationId xmlns:a16="http://schemas.microsoft.com/office/drawing/2014/main" id="{2031B0D7-CDA0-A8A2-5632-360DE9CC564E}"/>
               </a:ext>
             </a:extLst>
           </p:cNvPr>
@@ -15312,7 +15674,7 @@
         <p:spPr>
           <a:xfrm>
             <a:off x="4320367" y="269358"/>
-            <a:ext cx="3390608" cy="523220"/>
+            <a:ext cx="3318537" cy="523220"/>
           </a:xfrm>
           <a:prstGeom prst="rect">
             <a:avLst/>
@@ -15329,265 +15691,249 @@
               <a:rPr lang="en-GB" sz="2800" dirty="0">
                 <a:latin typeface="+mj-lt"/>
               </a:rPr>
-              <a:t>HORACE Workflow:</a:t>
+              <a:t>HORACE structure:</a:t>
             </a:r>
           </a:p>
         </p:txBody>
       </p:sp>
+      <p:grpSp>
+        <p:nvGrpSpPr>
+          <p:cNvPr id="17" name="Group 16">
+            <a:extLst>
+              <a:ext uri="{FF2B5EF4-FFF2-40B4-BE49-F238E27FC236}">
+                <a16:creationId xmlns:a16="http://schemas.microsoft.com/office/drawing/2014/main" id="{7D8AF87B-60EE-9AA7-FDB4-B7376FCFDFD5}"/>
+              </a:ext>
+            </a:extLst>
+          </p:cNvPr>
+          <p:cNvGrpSpPr/>
+          <p:nvPr/>
+        </p:nvGrpSpPr>
+        <p:grpSpPr>
+          <a:xfrm>
+            <a:off x="680482" y="1470835"/>
+            <a:ext cx="3062177" cy="3987210"/>
+            <a:chOff x="680482" y="861237"/>
+            <a:chExt cx="3062177" cy="3987210"/>
+          </a:xfrm>
+        </p:grpSpPr>
+        <p:sp>
+          <p:nvSpPr>
+            <p:cNvPr id="13" name="Rectangle 12">
+              <a:extLst>
+                <a:ext uri="{FF2B5EF4-FFF2-40B4-BE49-F238E27FC236}">
+                  <a16:creationId xmlns:a16="http://schemas.microsoft.com/office/drawing/2014/main" id="{E256D75B-6D3A-0E44-D86D-7E64C372EAED}"/>
+                </a:ext>
+              </a:extLst>
+            </p:cNvPr>
+            <p:cNvSpPr/>
+            <p:nvPr/>
+          </p:nvSpPr>
+          <p:spPr>
+            <a:xfrm>
+              <a:off x="680482" y="861237"/>
+              <a:ext cx="3062177" cy="3987210"/>
+            </a:xfrm>
+            <a:prstGeom prst="rect">
+              <a:avLst/>
+            </a:prstGeom>
+            <a:pattFill prst="pct5">
+              <a:fgClr>
+                <a:schemeClr val="accent6">
+                  <a:lumMod val="40000"/>
+                  <a:lumOff val="60000"/>
+                </a:schemeClr>
+              </a:fgClr>
+              <a:bgClr>
+                <a:schemeClr val="bg1"/>
+              </a:bgClr>
+            </a:pattFill>
+          </p:spPr>
+          <p:style>
+            <a:lnRef idx="2">
+              <a:schemeClr val="accent1">
+                <a:shade val="15000"/>
+              </a:schemeClr>
+            </a:lnRef>
+            <a:fillRef idx="1">
+              <a:schemeClr val="accent1"/>
+            </a:fillRef>
+            <a:effectRef idx="0">
+              <a:schemeClr val="accent1"/>
+            </a:effectRef>
+            <a:fontRef idx="minor">
+              <a:schemeClr val="lt1"/>
+            </a:fontRef>
+          </p:style>
+          <p:txBody>
+            <a:bodyPr rtlCol="0" anchor="t" anchorCtr="0"/>
+            <a:lstStyle/>
+            <a:p>
+              <a:pPr algn="ctr"/>
+              <a:r>
+                <a:rPr lang="en-GB" dirty="0">
+                  <a:solidFill>
+                    <a:schemeClr val="tx1"/>
+                  </a:solidFill>
+                </a:rPr>
+                <a:t>SQW object (Filebacked)</a:t>
+              </a:r>
+            </a:p>
+          </p:txBody>
+        </p:sp>
+        <p:sp>
+          <p:nvSpPr>
+            <p:cNvPr id="10" name="Rectangle 9">
+              <a:extLst>
+                <a:ext uri="{FF2B5EF4-FFF2-40B4-BE49-F238E27FC236}">
+                  <a16:creationId xmlns:a16="http://schemas.microsoft.com/office/drawing/2014/main" id="{43C57F1E-84CF-864B-9BC0-EB0DD40BF2C1}"/>
+                </a:ext>
+              </a:extLst>
+            </p:cNvPr>
+            <p:cNvSpPr/>
+            <p:nvPr/>
+          </p:nvSpPr>
+          <p:spPr>
+            <a:xfrm>
+              <a:off x="812815" y="1389321"/>
+              <a:ext cx="1821711" cy="1105786"/>
+            </a:xfrm>
+            <a:prstGeom prst="rect">
+              <a:avLst/>
+            </a:prstGeom>
+          </p:spPr>
+          <p:style>
+            <a:lnRef idx="2">
+              <a:schemeClr val="accent1">
+                <a:shade val="15000"/>
+              </a:schemeClr>
+            </a:lnRef>
+            <a:fillRef idx="1">
+              <a:schemeClr val="accent1"/>
+            </a:fillRef>
+            <a:effectRef idx="0">
+              <a:schemeClr val="accent1"/>
+            </a:effectRef>
+            <a:fontRef idx="minor">
+              <a:schemeClr val="lt1"/>
+            </a:fontRef>
+          </p:style>
+          <p:txBody>
+            <a:bodyPr rtlCol="0" anchor="ctr"/>
+            <a:lstStyle/>
+            <a:p>
+              <a:pPr algn="ctr"/>
+              <a:r>
+                <a:rPr lang="en-GB" dirty="0"/>
+                <a:t>1-4D image in reciprocal coordinate system</a:t>
+              </a:r>
+            </a:p>
+          </p:txBody>
+        </p:sp>
+        <p:sp>
+          <p:nvSpPr>
+            <p:cNvPr id="11" name="Rectangle 10">
+              <a:extLst>
+                <a:ext uri="{FF2B5EF4-FFF2-40B4-BE49-F238E27FC236}">
+                  <a16:creationId xmlns:a16="http://schemas.microsoft.com/office/drawing/2014/main" id="{9D7CABBA-857E-414F-A3C2-09639526CB5C}"/>
+                </a:ext>
+              </a:extLst>
+            </p:cNvPr>
+            <p:cNvSpPr/>
+            <p:nvPr/>
+          </p:nvSpPr>
+          <p:spPr>
+            <a:xfrm>
+              <a:off x="826991" y="2750288"/>
+              <a:ext cx="1821711" cy="708837"/>
+            </a:xfrm>
+            <a:prstGeom prst="rect">
+              <a:avLst/>
+            </a:prstGeom>
+          </p:spPr>
+          <p:style>
+            <a:lnRef idx="2">
+              <a:schemeClr val="accent1">
+                <a:shade val="15000"/>
+              </a:schemeClr>
+            </a:lnRef>
+            <a:fillRef idx="1">
+              <a:schemeClr val="accent1"/>
+            </a:fillRef>
+            <a:effectRef idx="0">
+              <a:schemeClr val="accent1"/>
+            </a:effectRef>
+            <a:fontRef idx="minor">
+              <a:schemeClr val="lt1"/>
+            </a:fontRef>
+          </p:style>
+          <p:txBody>
+            <a:bodyPr rtlCol="0" anchor="ctr"/>
+            <a:lstStyle/>
+            <a:p>
+              <a:pPr algn="ctr"/>
+              <a:r>
+                <a:rPr lang="en-GB" dirty="0"/>
+                <a:t>Experiment info</a:t>
+              </a:r>
+            </a:p>
+          </p:txBody>
+        </p:sp>
+        <p:sp>
+          <p:nvSpPr>
+            <p:cNvPr id="12" name="Rectangle 11">
+              <a:extLst>
+                <a:ext uri="{FF2B5EF4-FFF2-40B4-BE49-F238E27FC236}">
+                  <a16:creationId xmlns:a16="http://schemas.microsoft.com/office/drawing/2014/main" id="{F0F7B7AD-16D6-731C-9378-AEA6F8F5FADA}"/>
+                </a:ext>
+              </a:extLst>
+            </p:cNvPr>
+            <p:cNvSpPr/>
+            <p:nvPr/>
+          </p:nvSpPr>
+          <p:spPr>
+            <a:xfrm>
+              <a:off x="797452" y="3802025"/>
+              <a:ext cx="1821711" cy="708837"/>
+            </a:xfrm>
+            <a:prstGeom prst="rect">
+              <a:avLst/>
+            </a:prstGeom>
+          </p:spPr>
+          <p:style>
+            <a:lnRef idx="2">
+              <a:schemeClr val="accent1">
+                <a:shade val="15000"/>
+              </a:schemeClr>
+            </a:lnRef>
+            <a:fillRef idx="1">
+              <a:schemeClr val="accent1"/>
+            </a:fillRef>
+            <a:effectRef idx="0">
+              <a:schemeClr val="accent1"/>
+            </a:effectRef>
+            <a:fontRef idx="minor">
+              <a:schemeClr val="lt1"/>
+            </a:fontRef>
+          </p:style>
+          <p:txBody>
+            <a:bodyPr rtlCol="0" anchor="ctr"/>
+            <a:lstStyle/>
+            <a:p>
+              <a:pPr algn="ctr"/>
+              <a:r>
+                <a:rPr lang="en-GB" dirty="0"/>
+                <a:t>Pixels (All neutron events)</a:t>
+              </a:r>
+            </a:p>
+          </p:txBody>
+        </p:sp>
+      </p:grpSp>
       <p:sp>
         <p:nvSpPr>
-          <p:cNvPr id="3" name="TextBox 2">
-            <a:extLst>
-              <a:ext uri="{FF2B5EF4-FFF2-40B4-BE49-F238E27FC236}">
-                <a16:creationId xmlns:a16="http://schemas.microsoft.com/office/drawing/2014/main" id="{529ACA14-6C46-F88C-5FD2-CB14D24018D6}"/>
-              </a:ext>
-            </a:extLst>
-          </p:cNvPr>
-          <p:cNvSpPr txBox="1"/>
-          <p:nvPr/>
-        </p:nvSpPr>
-        <p:spPr>
-          <a:xfrm>
-            <a:off x="2941676" y="819611"/>
-            <a:ext cx="6875720" cy="523220"/>
-          </a:xfrm>
-          <a:prstGeom prst="rect">
-            <a:avLst/>
-          </a:prstGeom>
-          <a:noFill/>
-        </p:spPr>
-        <p:txBody>
-          <a:bodyPr wrap="square" rtlCol="0">
-            <a:spAutoFit/>
-          </a:bodyPr>
-          <a:lstStyle/>
-          <a:p>
-            <a:r>
-              <a:rPr lang="en-GB" sz="2800" u="sng" dirty="0">
-                <a:solidFill>
-                  <a:schemeClr val="accent1"/>
-                </a:solidFill>
-              </a:rPr>
-              <a:t>https://pace-neutrons.github.io/Horace</a:t>
-            </a:r>
-          </a:p>
-        </p:txBody>
-      </p:sp>
-    </p:spTree>
-    <p:extLst>
-      <p:ext uri="{BB962C8B-B14F-4D97-AF65-F5344CB8AC3E}">
-        <p14:creationId xmlns:p14="http://schemas.microsoft.com/office/powerpoint/2010/main" val="3791555548"/>
-      </p:ext>
-    </p:extLst>
-  </p:cSld>
-  <p:clrMapOvr>
-    <a:masterClrMapping/>
-  </p:clrMapOvr>
-</p:sld>
-</file>
-
-<file path=ppt/slides/slide11.xml><?xml version="1.0" encoding="utf-8"?>
-<p:sld xmlns:a="http://schemas.openxmlformats.org/drawingml/2006/main" xmlns:r="http://schemas.openxmlformats.org/officeDocument/2006/relationships" xmlns:p="http://schemas.openxmlformats.org/presentationml/2006/main">
-  <p:cSld>
-    <p:spTree>
-      <p:nvGrpSpPr>
-        <p:cNvPr id="1" name=""/>
-        <p:cNvGrpSpPr/>
-        <p:nvPr/>
-      </p:nvGrpSpPr>
-      <p:grpSpPr>
-        <a:xfrm>
-          <a:off x="0" y="0"/>
-          <a:ext cx="0" cy="0"/>
-          <a:chOff x="0" y="0"/>
-          <a:chExt cx="0" cy="0"/>
-        </a:xfrm>
-      </p:grpSpPr>
-      <p:pic>
-        <p:nvPicPr>
-          <p:cNvPr id="40" name="Picture 39" descr="A graph of energy&#10;&#10;AI-generated content may be incorrect.">
-            <a:extLst>
-              <a:ext uri="{FF2B5EF4-FFF2-40B4-BE49-F238E27FC236}">
-                <a16:creationId xmlns:a16="http://schemas.microsoft.com/office/drawing/2014/main" id="{8853E9EE-4BC7-9412-72BD-2E82B413F51A}"/>
-              </a:ext>
-            </a:extLst>
-          </p:cNvPr>
-          <p:cNvPicPr>
-            <a:picLocks noChangeAspect="1"/>
-          </p:cNvPicPr>
-          <p:nvPr/>
-        </p:nvPicPr>
-        <p:blipFill>
-          <a:blip r:embed="rId2">
-            <a:extLst>
-              <a:ext uri="{28A0092B-C50C-407E-A947-70E740481C1C}">
-                <a14:useLocalDpi xmlns:a14="http://schemas.microsoft.com/office/drawing/2010/main" val="0"/>
-              </a:ext>
-            </a:extLst>
-          </a:blip>
-          <a:stretch>
-            <a:fillRect/>
-          </a:stretch>
-        </p:blipFill>
-        <p:spPr>
-          <a:xfrm>
-            <a:off x="123849" y="3337546"/>
-            <a:ext cx="2321095" cy="1820504"/>
-          </a:xfrm>
-          <a:prstGeom prst="rect">
-            <a:avLst/>
-          </a:prstGeom>
-        </p:spPr>
-      </p:pic>
-      <p:pic>
-        <p:nvPicPr>
-          <p:cNvPr id="42" name="Picture 41" descr="A graph of energy&#10;&#10;AI-generated content may be incorrect.">
-            <a:extLst>
-              <a:ext uri="{FF2B5EF4-FFF2-40B4-BE49-F238E27FC236}">
-                <a16:creationId xmlns:a16="http://schemas.microsoft.com/office/drawing/2014/main" id="{38FFB91E-9943-F3E7-91F6-76A82ECC977D}"/>
-              </a:ext>
-            </a:extLst>
-          </p:cNvPr>
-          <p:cNvPicPr>
-            <a:picLocks noChangeAspect="1"/>
-          </p:cNvPicPr>
-          <p:nvPr/>
-        </p:nvPicPr>
-        <p:blipFill>
-          <a:blip r:embed="rId3">
-            <a:extLst>
-              <a:ext uri="{28A0092B-C50C-407E-A947-70E740481C1C}">
-                <a14:useLocalDpi xmlns:a14="http://schemas.microsoft.com/office/drawing/2010/main" val="0"/>
-              </a:ext>
-            </a:extLst>
-          </a:blip>
-          <a:stretch>
-            <a:fillRect/>
-          </a:stretch>
-        </p:blipFill>
-        <p:spPr>
-          <a:xfrm>
-            <a:off x="3127229" y="2948311"/>
-            <a:ext cx="2428478" cy="1873398"/>
-          </a:xfrm>
-          <a:prstGeom prst="rect">
-            <a:avLst/>
-          </a:prstGeom>
-        </p:spPr>
-      </p:pic>
-      <p:sp>
-        <p:nvSpPr>
-          <p:cNvPr id="2" name="TextBox 1">
-            <a:extLst>
-              <a:ext uri="{FF2B5EF4-FFF2-40B4-BE49-F238E27FC236}">
-                <a16:creationId xmlns:a16="http://schemas.microsoft.com/office/drawing/2014/main" id="{B3DAC425-8DFD-FB44-8752-8375B7A6C7E7}"/>
-              </a:ext>
-            </a:extLst>
-          </p:cNvPr>
-          <p:cNvSpPr txBox="1"/>
-          <p:nvPr/>
-        </p:nvSpPr>
-        <p:spPr>
-          <a:xfrm>
-            <a:off x="674328" y="190138"/>
-            <a:ext cx="9946782" cy="954107"/>
-          </a:xfrm>
-          <a:prstGeom prst="rect">
-            <a:avLst/>
-          </a:prstGeom>
-          <a:noFill/>
-        </p:spPr>
-        <p:txBody>
-          <a:bodyPr wrap="square" rtlCol="0">
-            <a:spAutoFit/>
-          </a:bodyPr>
-          <a:lstStyle/>
-          <a:p>
-            <a:r>
-              <a:rPr lang="en-GB" sz="2800" dirty="0"/>
-              <a:t>Inelastic experiment using direct inelastic instrument.</a:t>
-            </a:r>
-          </a:p>
-          <a:p>
-            <a:r>
-              <a:rPr lang="en-GB" sz="2800" dirty="0"/>
-              <a:t>Time of flight technique</a:t>
-            </a:r>
-          </a:p>
-        </p:txBody>
-      </p:sp>
-      <p:pic>
-        <p:nvPicPr>
-          <p:cNvPr id="4" name="Picture 3">
-            <a:extLst>
-              <a:ext uri="{FF2B5EF4-FFF2-40B4-BE49-F238E27FC236}">
-                <a16:creationId xmlns:a16="http://schemas.microsoft.com/office/drawing/2014/main" id="{81748C00-65D1-211F-D461-82D4B8960F33}"/>
-              </a:ext>
-            </a:extLst>
-          </p:cNvPr>
-          <p:cNvPicPr>
-            <a:picLocks noChangeAspect="1"/>
-          </p:cNvPicPr>
-          <p:nvPr/>
-        </p:nvPicPr>
-        <p:blipFill>
-          <a:blip r:embed="rId4"/>
-          <a:stretch>
-            <a:fillRect/>
-          </a:stretch>
-        </p:blipFill>
-        <p:spPr>
-          <a:xfrm>
-            <a:off x="7525393" y="4609134"/>
-            <a:ext cx="3602666" cy="1883966"/>
-          </a:xfrm>
-          <a:prstGeom prst="rect">
-            <a:avLst/>
-          </a:prstGeom>
-        </p:spPr>
-      </p:pic>
-      <p:pic>
-        <p:nvPicPr>
-          <p:cNvPr id="6" name="Picture 5" descr="A diagram of a sun with arrows pointing to the center&#10;&#10;AI-generated content may be incorrect.">
-            <a:extLst>
-              <a:ext uri="{FF2B5EF4-FFF2-40B4-BE49-F238E27FC236}">
-                <a16:creationId xmlns:a16="http://schemas.microsoft.com/office/drawing/2014/main" id="{FF911592-631E-287D-7A31-07A4356F84AD}"/>
-              </a:ext>
-            </a:extLst>
-          </p:cNvPr>
-          <p:cNvPicPr>
-            <a:picLocks noChangeAspect="1"/>
-          </p:cNvPicPr>
-          <p:nvPr/>
-        </p:nvPicPr>
-        <p:blipFill>
-          <a:blip r:embed="rId5">
-            <a:extLst>
-              <a:ext uri="{28A0092B-C50C-407E-A947-70E740481C1C}">
-                <a14:useLocalDpi xmlns:a14="http://schemas.microsoft.com/office/drawing/2010/main" val="0"/>
-              </a:ext>
-            </a:extLst>
-          </a:blip>
-          <a:stretch>
-            <a:fillRect/>
-          </a:stretch>
-        </p:blipFill>
-        <p:spPr>
-          <a:xfrm rot="7581818">
-            <a:off x="207908" y="1547814"/>
-            <a:ext cx="1095375" cy="1423988"/>
-          </a:xfrm>
-          <a:prstGeom prst="rect">
-            <a:avLst/>
-          </a:prstGeom>
-        </p:spPr>
-      </p:pic>
-      <p:sp>
-        <p:nvSpPr>
-          <p:cNvPr id="7" name="Oval 6">
-            <a:extLst>
-              <a:ext uri="{FF2B5EF4-FFF2-40B4-BE49-F238E27FC236}">
-                <a16:creationId xmlns:a16="http://schemas.microsoft.com/office/drawing/2014/main" id="{140C8D70-BA90-1951-681E-465D3DA566A2}"/>
+          <p:cNvPr id="14" name="Rectangle 13">
+            <a:extLst>
+              <a:ext uri="{FF2B5EF4-FFF2-40B4-BE49-F238E27FC236}">
+                <a16:creationId xmlns:a16="http://schemas.microsoft.com/office/drawing/2014/main" id="{00BC3FC8-8175-3715-73F7-F7A35C449EC9}"/>
               </a:ext>
             </a:extLst>
           </p:cNvPr>
@@ -15596,111 +15942,18 @@
         </p:nvSpPr>
         <p:spPr>
           <a:xfrm>
-            <a:off x="1" y="1396624"/>
-            <a:ext cx="1712606" cy="1726368"/>
-          </a:xfrm>
-          <a:prstGeom prst="ellipse">
-            <a:avLst/>
-          </a:prstGeom>
-          <a:noFill/>
-        </p:spPr>
-        <p:style>
-          <a:lnRef idx="2">
-            <a:schemeClr val="accent1">
-              <a:shade val="15000"/>
-            </a:schemeClr>
-          </a:lnRef>
-          <a:fillRef idx="1">
-            <a:schemeClr val="accent1"/>
-          </a:fillRef>
-          <a:effectRef idx="0">
-            <a:schemeClr val="accent1"/>
-          </a:effectRef>
-          <a:fontRef idx="minor">
-            <a:schemeClr val="lt1"/>
-          </a:fontRef>
-        </p:style>
-        <p:txBody>
-          <a:bodyPr rtlCol="0" anchor="ctr"/>
-          <a:lstStyle/>
-          <a:p>
-            <a:pPr algn="ctr"/>
-            <a:endParaRPr lang="en-GB"/>
-          </a:p>
-        </p:txBody>
-      </p:sp>
-      <p:sp>
-        <p:nvSpPr>
-          <p:cNvPr id="8" name="Rectangle 7">
-            <a:extLst>
-              <a:ext uri="{FF2B5EF4-FFF2-40B4-BE49-F238E27FC236}">
-                <a16:creationId xmlns:a16="http://schemas.microsoft.com/office/drawing/2014/main" id="{B65C4EA5-6E49-F830-9ED4-7ACA438A9EC0}"/>
-              </a:ext>
-            </a:extLst>
-          </p:cNvPr>
-          <p:cNvSpPr/>
-          <p:nvPr/>
-        </p:nvSpPr>
-        <p:spPr>
-          <a:xfrm rot="19090764">
-            <a:off x="667241" y="2780172"/>
-            <a:ext cx="1324636" cy="237441"/>
+            <a:off x="4325681" y="4031510"/>
+            <a:ext cx="3062177" cy="1454889"/>
           </a:xfrm>
           <a:prstGeom prst="rect">
             <a:avLst/>
           </a:prstGeom>
-        </p:spPr>
-        <p:style>
-          <a:lnRef idx="2">
-            <a:schemeClr val="accent1">
-              <a:shade val="15000"/>
-            </a:schemeClr>
-          </a:lnRef>
-          <a:fillRef idx="1">
-            <a:schemeClr val="accent1"/>
-          </a:fillRef>
-          <a:effectRef idx="0">
-            <a:schemeClr val="accent1"/>
-          </a:effectRef>
-          <a:fontRef idx="minor">
-            <a:schemeClr val="lt1"/>
-          </a:fontRef>
-        </p:style>
-        <p:txBody>
-          <a:bodyPr rtlCol="0" anchor="ctr"/>
-          <a:lstStyle/>
-          <a:p>
-            <a:pPr algn="ctr"/>
-            <a:r>
-              <a:rPr lang="en-GB" dirty="0"/>
-              <a:t>Moderator</a:t>
-            </a:r>
-          </a:p>
-        </p:txBody>
-      </p:sp>
-      <p:sp>
-        <p:nvSpPr>
-          <p:cNvPr id="9" name="Oval 8">
-            <a:extLst>
-              <a:ext uri="{FF2B5EF4-FFF2-40B4-BE49-F238E27FC236}">
-                <a16:creationId xmlns:a16="http://schemas.microsoft.com/office/drawing/2014/main" id="{7EEB0299-2AA4-6C73-C84E-AB9ECEB7BDC0}"/>
-              </a:ext>
-            </a:extLst>
-          </p:cNvPr>
-          <p:cNvSpPr/>
-          <p:nvPr/>
-        </p:nvSpPr>
-        <p:spPr>
-          <a:xfrm rot="437301">
-            <a:off x="2590351" y="3662651"/>
-            <a:ext cx="535505" cy="565817"/>
-          </a:xfrm>
-          <a:prstGeom prst="ellipse">
-            <a:avLst/>
-          </a:prstGeom>
-          <a:pattFill prst="wdDnDiag">
+          <a:pattFill prst="pct5">
             <a:fgClr>
-              <a:schemeClr val="accent1"/>
+              <a:schemeClr val="accent6">
+                <a:lumMod val="40000"/>
+                <a:lumOff val="60000"/>
+              </a:schemeClr>
             </a:fgClr>
             <a:bgClr>
               <a:schemeClr val="bg1"/>
@@ -15724,20 +15977,51 @@
           </a:fontRef>
         </p:style>
         <p:txBody>
-          <a:bodyPr rtlCol="0" anchor="ctr"/>
+          <a:bodyPr rtlCol="0" anchor="t" anchorCtr="0"/>
           <a:lstStyle/>
           <a:p>
             <a:pPr algn="ctr"/>
-            <a:endParaRPr lang="en-GB"/>
+            <a:r>
+              <a:rPr lang="en-GB" dirty="0" err="1">
+                <a:solidFill>
+                  <a:schemeClr val="tx1"/>
+                </a:solidFill>
+              </a:rPr>
+              <a:t>Multifit</a:t>
+            </a:r>
+            <a:endParaRPr lang="en-GB" dirty="0">
+              <a:solidFill>
+                <a:schemeClr val="tx1"/>
+              </a:solidFill>
+            </a:endParaRPr>
+          </a:p>
+          <a:p>
+            <a:pPr algn="ctr"/>
+            <a:endParaRPr lang="en-GB" dirty="0">
+              <a:solidFill>
+                <a:schemeClr val="tx1"/>
+              </a:solidFill>
+            </a:endParaRPr>
+          </a:p>
+          <a:p>
+            <a:pPr algn="ctr"/>
+            <a:r>
+              <a:rPr lang="en-GB" dirty="0">
+                <a:solidFill>
+                  <a:schemeClr val="tx1"/>
+                </a:solidFill>
+              </a:rPr>
+              <a:t>Fitting engine</a:t>
+            </a:r>
           </a:p>
         </p:txBody>
       </p:sp>
       <p:sp>
         <p:nvSpPr>
-          <p:cNvPr id="10" name="Arrow: Down 9">
-            <a:extLst>
-              <a:ext uri="{FF2B5EF4-FFF2-40B4-BE49-F238E27FC236}">
-                <a16:creationId xmlns:a16="http://schemas.microsoft.com/office/drawing/2014/main" id="{C963A831-8AEF-7B64-5C91-39AD89929F30}"/>
+          <p:cNvPr id="15" name="Rectangle 14">
+            <a:extLst>
+              <a:ext uri="{FF2B5EF4-FFF2-40B4-BE49-F238E27FC236}">
+                <a16:creationId xmlns:a16="http://schemas.microsoft.com/office/drawing/2014/main" id="{F6AA3292-84FA-54CA-FFFA-2F4E195E7AB2}"/>
               </a:ext>
             </a:extLst>
           </p:cNvPr>
@@ -15745,13 +16029,24 @@
           <p:nvPr/>
         </p:nvSpPr>
         <p:spPr>
-          <a:xfrm rot="18849727">
-            <a:off x="1987081" y="2833746"/>
-            <a:ext cx="275522" cy="1086627"/>
+          <a:xfrm>
+            <a:off x="7836194" y="1463747"/>
+            <a:ext cx="3062177" cy="3987210"/>
           </a:xfrm>
-          <a:prstGeom prst="downArrow">
+          <a:prstGeom prst="rect">
             <a:avLst/>
           </a:prstGeom>
+          <a:pattFill prst="pct5">
+            <a:fgClr>
+              <a:schemeClr val="accent6">
+                <a:lumMod val="40000"/>
+                <a:lumOff val="60000"/>
+              </a:schemeClr>
+            </a:fgClr>
+            <a:bgClr>
+              <a:schemeClr val="bg1"/>
+            </a:bgClr>
+          </a:pattFill>
         </p:spPr>
         <p:style>
           <a:lnRef idx="2">
@@ -15770,20 +16065,89 @@
           </a:fontRef>
         </p:style>
         <p:txBody>
-          <a:bodyPr rtlCol="0" anchor="ctr"/>
+          <a:bodyPr rtlCol="0" anchor="t" anchorCtr="0"/>
           <a:lstStyle/>
           <a:p>
             <a:pPr algn="ctr"/>
-            <a:endParaRPr lang="en-GB"/>
+            <a:r>
+              <a:rPr lang="en-GB" dirty="0" err="1">
+                <a:solidFill>
+                  <a:schemeClr val="tx1"/>
+                </a:solidFill>
+              </a:rPr>
+              <a:t>Tobyfit</a:t>
+            </a:r>
+            <a:endParaRPr lang="en-GB" dirty="0">
+              <a:solidFill>
+                <a:schemeClr val="tx1"/>
+              </a:solidFill>
+            </a:endParaRPr>
+          </a:p>
+          <a:p>
+            <a:pPr algn="ctr"/>
+            <a:endParaRPr lang="en-GB" dirty="0">
+              <a:solidFill>
+                <a:schemeClr val="tx1"/>
+              </a:solidFill>
+            </a:endParaRPr>
+          </a:p>
+          <a:p>
+            <a:pPr algn="ctr"/>
+            <a:r>
+              <a:rPr lang="en-GB" dirty="0">
+                <a:solidFill>
+                  <a:schemeClr val="tx1"/>
+                </a:solidFill>
+              </a:rPr>
+              <a:t>Instrument info</a:t>
+            </a:r>
+          </a:p>
+          <a:p>
+            <a:pPr algn="ctr"/>
+            <a:endParaRPr lang="en-GB" dirty="0">
+              <a:solidFill>
+                <a:schemeClr val="tx1"/>
+              </a:solidFill>
+            </a:endParaRPr>
+          </a:p>
+          <a:p>
+            <a:pPr algn="ctr"/>
+            <a:r>
+              <a:rPr lang="en-GB" dirty="0">
+                <a:solidFill>
+                  <a:schemeClr val="tx1"/>
+                </a:solidFill>
+              </a:rPr>
+              <a:t>ISIS instruments models</a:t>
+            </a:r>
+          </a:p>
+          <a:p>
+            <a:pPr algn="ctr"/>
+            <a:endParaRPr lang="en-GB" dirty="0">
+              <a:solidFill>
+                <a:schemeClr val="tx1"/>
+              </a:solidFill>
+            </a:endParaRPr>
+          </a:p>
+          <a:p>
+            <a:pPr algn="ctr"/>
+            <a:r>
+              <a:rPr lang="en-GB" dirty="0">
+                <a:solidFill>
+                  <a:schemeClr val="tx1"/>
+                </a:solidFill>
+              </a:rPr>
+              <a:t>Resolution function &amp; Resolution convolution</a:t>
+            </a:r>
           </a:p>
         </p:txBody>
       </p:sp>
       <p:sp>
         <p:nvSpPr>
-          <p:cNvPr id="12" name="Rectangle 11">
-            <a:extLst>
-              <a:ext uri="{FF2B5EF4-FFF2-40B4-BE49-F238E27FC236}">
-                <a16:creationId xmlns:a16="http://schemas.microsoft.com/office/drawing/2014/main" id="{E7B8E823-F592-25F6-7C8F-C3B81E2C7344}"/>
+          <p:cNvPr id="16" name="Rectangle 15">
+            <a:extLst>
+              <a:ext uri="{FF2B5EF4-FFF2-40B4-BE49-F238E27FC236}">
+                <a16:creationId xmlns:a16="http://schemas.microsoft.com/office/drawing/2014/main" id="{70215B1F-1E26-B6D0-59FC-01B3BBEAF285}"/>
               </a:ext>
             </a:extLst>
           </p:cNvPr>
@@ -15792,12 +16156,23 @@
         </p:nvSpPr>
         <p:spPr>
           <a:xfrm>
-            <a:off x="4198156" y="5036777"/>
-            <a:ext cx="186923" cy="200923"/>
+            <a:off x="4325681" y="1463747"/>
+            <a:ext cx="3062177" cy="1454889"/>
           </a:xfrm>
           <a:prstGeom prst="rect">
             <a:avLst/>
           </a:prstGeom>
+          <a:pattFill prst="pct5">
+            <a:fgClr>
+              <a:schemeClr val="accent6">
+                <a:lumMod val="40000"/>
+                <a:lumOff val="60000"/>
+              </a:schemeClr>
+            </a:fgClr>
+            <a:bgClr>
+              <a:schemeClr val="bg1"/>
+            </a:bgClr>
+          </a:pattFill>
         </p:spPr>
         <p:style>
           <a:lnRef idx="2">
@@ -15816,80 +16191,79 @@
           </a:fontRef>
         </p:style>
         <p:txBody>
-          <a:bodyPr rtlCol="0" anchor="ctr"/>
+          <a:bodyPr rtlCol="0" anchor="t" anchorCtr="0"/>
           <a:lstStyle/>
           <a:p>
             <a:pPr algn="ctr"/>
-            <a:endParaRPr lang="en-GB"/>
+            <a:r>
+              <a:rPr lang="en-GB" dirty="0">
+                <a:solidFill>
+                  <a:schemeClr val="tx1"/>
+                </a:solidFill>
+              </a:rPr>
+              <a:t>Algorithms to operate with sqw object</a:t>
+            </a:r>
+          </a:p>
+          <a:p>
+            <a:pPr algn="ctr"/>
+            <a:endParaRPr lang="en-GB" dirty="0">
+              <a:solidFill>
+                <a:schemeClr val="tx1"/>
+              </a:solidFill>
+            </a:endParaRPr>
+          </a:p>
+          <a:p>
+            <a:pPr algn="ctr"/>
+            <a:r>
+              <a:rPr lang="en-GB" dirty="0">
+                <a:solidFill>
+                  <a:schemeClr val="tx1"/>
+                </a:solidFill>
+              </a:rPr>
+              <a:t>CUT</a:t>
+            </a:r>
+          </a:p>
+          <a:p>
+            <a:pPr algn="ctr"/>
+            <a:r>
+              <a:rPr lang="en-GB" dirty="0">
+                <a:solidFill>
+                  <a:schemeClr val="tx1"/>
+                </a:solidFill>
+              </a:rPr>
+              <a:t>plot</a:t>
+            </a:r>
           </a:p>
         </p:txBody>
       </p:sp>
       <p:cxnSp>
         <p:nvCxnSpPr>
-          <p:cNvPr id="14" name="Straight Arrow Connector 13">
-            <a:extLst>
-              <a:ext uri="{FF2B5EF4-FFF2-40B4-BE49-F238E27FC236}">
-                <a16:creationId xmlns:a16="http://schemas.microsoft.com/office/drawing/2014/main" id="{2119F7B5-E863-5D13-68CB-367A01056F4B}"/>
+          <p:cNvPr id="19" name="Connector: Elbow 18">
+            <a:extLst>
+              <a:ext uri="{FF2B5EF4-FFF2-40B4-BE49-F238E27FC236}">
+                <a16:creationId xmlns:a16="http://schemas.microsoft.com/office/drawing/2014/main" id="{5150F35A-513F-1A1C-ABBA-F7233E4D15AB}"/>
               </a:ext>
             </a:extLst>
           </p:cNvPr>
           <p:cNvCxnSpPr>
-            <a:cxnSpLocks/>
+            <a:stCxn id="10" idx="3"/>
+            <a:endCxn id="12" idx="3"/>
           </p:cNvCxnSpPr>
           <p:nvPr/>
         </p:nvCxnSpPr>
         <p:spPr>
-          <a:xfrm>
-            <a:off x="4280425" y="5146351"/>
-            <a:ext cx="2152489" cy="1215877"/>
+          <a:xfrm flipH="1">
+            <a:off x="2619163" y="2551812"/>
+            <a:ext cx="15363" cy="2214230"/>
           </a:xfrm>
-          <a:prstGeom prst="straightConnector1">
-            <a:avLst/>
+          <a:prstGeom prst="bentConnector3">
+            <a:avLst>
+              <a:gd name="adj1" fmla="val -1487991"/>
+            </a:avLst>
           </a:prstGeom>
-          <a:ln>
-            <a:tailEnd type="triangle"/>
-          </a:ln>
-        </p:spPr>
-        <p:style>
-          <a:lnRef idx="1">
-            <a:schemeClr val="accent1"/>
-          </a:lnRef>
-          <a:fillRef idx="0">
-            <a:schemeClr val="accent1"/>
-          </a:fillRef>
-          <a:effectRef idx="0">
-            <a:schemeClr val="accent1"/>
-          </a:effectRef>
-          <a:fontRef idx="minor">
-            <a:schemeClr val="tx1"/>
-          </a:fontRef>
-        </p:style>
-      </p:cxnSp>
-      <p:cxnSp>
-        <p:nvCxnSpPr>
-          <p:cNvPr id="16" name="Straight Arrow Connector 15">
-            <a:extLst>
-              <a:ext uri="{FF2B5EF4-FFF2-40B4-BE49-F238E27FC236}">
-                <a16:creationId xmlns:a16="http://schemas.microsoft.com/office/drawing/2014/main" id="{B7063671-B835-C4C6-B448-7DF0D4CE004F}"/>
-              </a:ext>
-            </a:extLst>
-          </p:cNvPr>
-          <p:cNvCxnSpPr>
-            <a:cxnSpLocks/>
-            <a:stCxn id="12" idx="3"/>
-          </p:cNvCxnSpPr>
-          <p:nvPr/>
-        </p:nvCxnSpPr>
-        <p:spPr>
-          <a:xfrm>
-            <a:off x="4385079" y="5137239"/>
-            <a:ext cx="2133992" cy="288976"/>
-          </a:xfrm>
-          <a:prstGeom prst="straightConnector1">
-            <a:avLst/>
-          </a:prstGeom>
-          <a:ln>
-            <a:tailEnd type="triangle"/>
+          <a:ln w="25400">
+            <a:headEnd type="stealth"/>
+            <a:tailEnd type="stealth"/>
           </a:ln>
         </p:spPr>
         <p:style>
@@ -15909,161 +16283,10 @@
       </p:cxnSp>
       <p:sp>
         <p:nvSpPr>
-          <p:cNvPr id="22" name="Arrow: Circular 21">
-            <a:extLst>
-              <a:ext uri="{FF2B5EF4-FFF2-40B4-BE49-F238E27FC236}">
-                <a16:creationId xmlns:a16="http://schemas.microsoft.com/office/drawing/2014/main" id="{395FDBB1-3D06-20A5-32AE-A42B2E5024FD}"/>
-              </a:ext>
-            </a:extLst>
-          </p:cNvPr>
-          <p:cNvSpPr/>
-          <p:nvPr/>
-        </p:nvSpPr>
-        <p:spPr>
-          <a:xfrm rot="1747931">
-            <a:off x="2578781" y="3343931"/>
-            <a:ext cx="824039" cy="763958"/>
-          </a:xfrm>
-          <a:prstGeom prst="circularArrow">
-            <a:avLst/>
-          </a:prstGeom>
-        </p:spPr>
-        <p:style>
-          <a:lnRef idx="2">
-            <a:schemeClr val="accent1">
-              <a:shade val="15000"/>
-            </a:schemeClr>
-          </a:lnRef>
-          <a:fillRef idx="1">
-            <a:schemeClr val="accent1"/>
-          </a:fillRef>
-          <a:effectRef idx="0">
-            <a:schemeClr val="accent1"/>
-          </a:effectRef>
-          <a:fontRef idx="minor">
-            <a:schemeClr val="lt1"/>
-          </a:fontRef>
-        </p:style>
-        <p:txBody>
-          <a:bodyPr rtlCol="0" anchor="ctr"/>
-          <a:lstStyle/>
-          <a:p>
-            <a:pPr algn="ctr"/>
-            <a:endParaRPr lang="en-GB">
-              <a:solidFill>
-                <a:schemeClr val="tx1"/>
-              </a:solidFill>
-            </a:endParaRPr>
-          </a:p>
-        </p:txBody>
-      </p:sp>
-      <p:cxnSp>
-        <p:nvCxnSpPr>
-          <p:cNvPr id="24" name="Straight Arrow Connector 23">
-            <a:extLst>
-              <a:ext uri="{FF2B5EF4-FFF2-40B4-BE49-F238E27FC236}">
-                <a16:creationId xmlns:a16="http://schemas.microsoft.com/office/drawing/2014/main" id="{A23C8E09-A9A5-ED03-6E3E-A407DF6E86C9}"/>
-              </a:ext>
-            </a:extLst>
-          </p:cNvPr>
-          <p:cNvCxnSpPr>
-            <a:cxnSpLocks/>
-            <a:stCxn id="9" idx="5"/>
-            <a:endCxn id="12" idx="1"/>
-          </p:cNvCxnSpPr>
-          <p:nvPr/>
-        </p:nvCxnSpPr>
-        <p:spPr>
-          <a:xfrm>
-            <a:off x="3020525" y="4168009"/>
-            <a:ext cx="1177631" cy="969230"/>
-          </a:xfrm>
-          <a:prstGeom prst="straightConnector1">
-            <a:avLst/>
-          </a:prstGeom>
-          <a:ln>
-            <a:tailEnd type="triangle"/>
-          </a:ln>
-        </p:spPr>
-        <p:style>
-          <a:lnRef idx="1">
-            <a:schemeClr val="accent1"/>
-          </a:lnRef>
-          <a:fillRef idx="0">
-            <a:schemeClr val="accent1"/>
-          </a:fillRef>
-          <a:effectRef idx="0">
-            <a:schemeClr val="accent1"/>
-          </a:effectRef>
-          <a:fontRef idx="minor">
-            <a:schemeClr val="tx1"/>
-          </a:fontRef>
-        </p:style>
-      </p:cxnSp>
-      <p:sp>
-        <p:nvSpPr>
-          <p:cNvPr id="30" name="Callout: Line 29">
-            <a:extLst>
-              <a:ext uri="{FF2B5EF4-FFF2-40B4-BE49-F238E27FC236}">
-                <a16:creationId xmlns:a16="http://schemas.microsoft.com/office/drawing/2014/main" id="{3D6C06DB-C3CA-BF10-3C15-019B3459071B}"/>
-              </a:ext>
-            </a:extLst>
-          </p:cNvPr>
-          <p:cNvSpPr/>
-          <p:nvPr/>
-        </p:nvSpPr>
-        <p:spPr>
-          <a:xfrm>
-            <a:off x="2225029" y="2158384"/>
-            <a:ext cx="1298437" cy="378895"/>
-          </a:xfrm>
-          <a:prstGeom prst="borderCallout1">
-            <a:avLst>
-              <a:gd name="adj1" fmla="val 98514"/>
-              <a:gd name="adj2" fmla="val 49426"/>
-              <a:gd name="adj3" fmla="val 399858"/>
-              <a:gd name="adj4" fmla="val 49057"/>
-            </a:avLst>
-          </a:prstGeom>
-          <a:ln>
-            <a:headEnd type="none"/>
-            <a:tailEnd type="stealth"/>
-          </a:ln>
-        </p:spPr>
-        <p:style>
-          <a:lnRef idx="2">
-            <a:schemeClr val="accent1">
-              <a:shade val="15000"/>
-            </a:schemeClr>
-          </a:lnRef>
-          <a:fillRef idx="1">
-            <a:schemeClr val="accent1"/>
-          </a:fillRef>
-          <a:effectRef idx="0">
-            <a:schemeClr val="accent1"/>
-          </a:effectRef>
-          <a:fontRef idx="minor">
-            <a:schemeClr val="lt1"/>
-          </a:fontRef>
-        </p:style>
-        <p:txBody>
-          <a:bodyPr rtlCol="0" anchor="ctr"/>
-          <a:lstStyle/>
-          <a:p>
-            <a:pPr algn="ctr"/>
-            <a:r>
-              <a:rPr lang="en-GB" dirty="0"/>
-              <a:t>Chopper</a:t>
-            </a:r>
-          </a:p>
-        </p:txBody>
-      </p:sp>
-      <p:sp>
-        <p:nvSpPr>
-          <p:cNvPr id="31" name="TextBox 30">
-            <a:extLst>
-              <a:ext uri="{FF2B5EF4-FFF2-40B4-BE49-F238E27FC236}">
-                <a16:creationId xmlns:a16="http://schemas.microsoft.com/office/drawing/2014/main" id="{18DF1C62-EBE1-B9D9-8C6D-099DCC41E453}"/>
+          <p:cNvPr id="22" name="TextBox 21">
+            <a:extLst>
+              <a:ext uri="{FF2B5EF4-FFF2-40B4-BE49-F238E27FC236}">
+                <a16:creationId xmlns:a16="http://schemas.microsoft.com/office/drawing/2014/main" id="{9758B607-85FB-8C5D-E821-954A751280EF}"/>
               </a:ext>
             </a:extLst>
           </p:cNvPr>
@@ -16071,14 +16294,21 @@
           <p:nvPr/>
         </p:nvSpPr>
         <p:spPr>
-          <a:xfrm>
-            <a:off x="8128956" y="4514185"/>
-            <a:ext cx="2886374" cy="369332"/>
+          <a:xfrm rot="16200000">
+            <a:off x="1067985" y="3769912"/>
+            <a:ext cx="4508204" cy="646331"/>
           </a:xfrm>
           <a:prstGeom prst="rect">
             <a:avLst/>
           </a:prstGeom>
-          <a:noFill/>
+          <a:solidFill>
+            <a:schemeClr val="bg1"/>
+          </a:solidFill>
+          <a:ln>
+            <a:solidFill>
+              <a:srgbClr val="00B050"/>
+            </a:solidFill>
+          </a:ln>
         </p:spPr>
         <p:txBody>
           <a:bodyPr wrap="square" rtlCol="0">
@@ -16088,17 +16318,23 @@
           <a:p>
             <a:r>
               <a:rPr lang="en-GB" dirty="0"/>
-              <a:t>MERLIN PSD Detectors</a:t>
+              <a:t>Image is calculated as average from pixels</a:t>
+            </a:r>
+          </a:p>
+          <a:p>
+            <a:r>
+              <a:rPr lang="en-GB" dirty="0"/>
+              <a:t>and serves as the “key” for pixel database</a:t>
             </a:r>
           </a:p>
         </p:txBody>
       </p:sp>
       <p:graphicFrame>
         <p:nvGraphicFramePr>
-          <p:cNvPr id="33" name="Object 32">
-            <a:extLst>
-              <a:ext uri="{FF2B5EF4-FFF2-40B4-BE49-F238E27FC236}">
-                <a16:creationId xmlns:a16="http://schemas.microsoft.com/office/drawing/2014/main" id="{9A6B7E1D-3805-7D6B-AE44-6A9D31C203D7}"/>
+          <p:cNvPr id="24" name="Object 23">
+            <a:extLst>
+              <a:ext uri="{FF2B5EF4-FFF2-40B4-BE49-F238E27FC236}">
+                <a16:creationId xmlns:a16="http://schemas.microsoft.com/office/drawing/2014/main" id="{2E513060-6B86-182F-4AE7-E811CDF67224}"/>
               </a:ext>
             </a:extLst>
           </p:cNvPr>
@@ -16108,95 +16344,32 @@
           <p:nvPr>
             <p:extLst>
               <p:ext uri="{D42A27DB-BD31-4B8C-83A1-F6EECF244321}">
-                <p14:modId xmlns:p14="http://schemas.microsoft.com/office/powerpoint/2010/main" val="1052057710"/>
+                <p14:modId xmlns:p14="http://schemas.microsoft.com/office/powerpoint/2010/main" val="1276187063"/>
               </p:ext>
             </p:extLst>
           </p:nvPr>
         </p:nvGraphicFramePr>
         <p:xfrm>
-          <a:off x="6722108" y="707502"/>
-          <a:ext cx="3251952" cy="1264648"/>
+          <a:off x="1091423" y="874558"/>
+          <a:ext cx="1712606" cy="589189"/>
         </p:xfrm>
         <a:graphic>
           <a:graphicData uri="http://schemas.openxmlformats.org/presentationml/2006/ole">
             <mc:AlternateContent xmlns:mc="http://schemas.openxmlformats.org/markup-compatibility/2006">
               <mc:Choice xmlns:v="urn:schemas-microsoft-com:vml" Requires="v">
-                <p:oleObj name="Equation" r:id="rId6" imgW="685800" imgH="266400" progId="Equation.DSMT4">
+                <p:oleObj name="Equation" r:id="rId2" imgW="520560" imgH="241200" progId="Equation.DSMT4">
                   <p:embed/>
                 </p:oleObj>
               </mc:Choice>
               <mc:Fallback>
-                <p:oleObj name="Equation" r:id="rId6" imgW="685800" imgH="266400" progId="Equation.DSMT4">
+                <p:oleObj name="Equation" r:id="rId2" imgW="520560" imgH="241200" progId="Equation.DSMT4">
                   <p:embed/>
                   <p:pic>
                     <p:nvPicPr>
-                      <p:cNvPr id="0" name=""/>
-                      <p:cNvPicPr/>
-                      <p:nvPr/>
-                    </p:nvPicPr>
-                    <p:blipFill>
-                      <a:blip r:embed="rId7"/>
-                      <a:stretch>
-                        <a:fillRect/>
-                      </a:stretch>
-                    </p:blipFill>
-                    <p:spPr>
-                      <a:xfrm>
-                        <a:off x="6722108" y="707502"/>
-                        <a:ext cx="3251952" cy="1264648"/>
-                      </a:xfrm>
-                      <a:prstGeom prst="rect">
-                        <a:avLst/>
-                      </a:prstGeom>
-                    </p:spPr>
-                  </p:pic>
-                </p:oleObj>
-              </mc:Fallback>
-            </mc:AlternateContent>
-          </a:graphicData>
-        </a:graphic>
-      </p:graphicFrame>
-      <p:graphicFrame>
-        <p:nvGraphicFramePr>
-          <p:cNvPr id="34" name="Object 33">
-            <a:extLst>
-              <a:ext uri="{FF2B5EF4-FFF2-40B4-BE49-F238E27FC236}">
-                <a16:creationId xmlns:a16="http://schemas.microsoft.com/office/drawing/2014/main" id="{4AFE27E7-9A2A-653E-7FA0-D49655E7C93F}"/>
-              </a:ext>
-            </a:extLst>
-          </p:cNvPr>
-          <p:cNvGraphicFramePr>
-            <a:graphicFrameLocks noChangeAspect="1"/>
-          </p:cNvGraphicFramePr>
-          <p:nvPr>
-            <p:extLst>
-              <p:ext uri="{D42A27DB-BD31-4B8C-83A1-F6EECF244321}">
-                <p14:modId xmlns:p14="http://schemas.microsoft.com/office/powerpoint/2010/main" val="4274516765"/>
-              </p:ext>
-            </p:extLst>
-          </p:nvPr>
-        </p:nvGraphicFramePr>
-        <p:xfrm>
-          <a:off x="6217664" y="4530286"/>
-          <a:ext cx="663575" cy="895929"/>
-        </p:xfrm>
-        <a:graphic>
-          <a:graphicData uri="http://schemas.openxmlformats.org/presentationml/2006/ole">
-            <mc:AlternateContent xmlns:mc="http://schemas.openxmlformats.org/markup-compatibility/2006">
-              <mc:Choice xmlns:v="urn:schemas-microsoft-com:vml" Requires="v">
-                <p:oleObj name="Equation" r:id="rId8" imgW="139680" imgH="253800" progId="Equation.DSMT4">
-                  <p:embed/>
-                </p:oleObj>
-              </mc:Choice>
-              <mc:Fallback>
-                <p:oleObj name="Equation" r:id="rId8" imgW="139680" imgH="253800" progId="Equation.DSMT4">
-                  <p:embed/>
-                  <p:pic>
-                    <p:nvPicPr>
-                      <p:cNvPr id="33" name="Object 32">
+                      <p:cNvPr id="30" name="Object 29">
                         <a:extLst>
                           <a:ext uri="{FF2B5EF4-FFF2-40B4-BE49-F238E27FC236}">
-                            <a16:creationId xmlns:a16="http://schemas.microsoft.com/office/drawing/2014/main" id="{9A6B7E1D-3805-7D6B-AE44-6A9D31C203D7}"/>
+                            <a16:creationId xmlns:a16="http://schemas.microsoft.com/office/drawing/2014/main" id="{E884F9A5-E763-FAF5-BF18-2E903249B03E}"/>
                           </a:ext>
                         </a:extLst>
                       </p:cNvPr>
@@ -16204,399 +16377,15 @@
                       <p:nvPr/>
                     </p:nvPicPr>
                     <p:blipFill>
-                      <a:blip r:embed="rId9"/>
+                      <a:blip r:embed="rId3"/>
                       <a:stretch>
                         <a:fillRect/>
                       </a:stretch>
                     </p:blipFill>
                     <p:spPr>
                       <a:xfrm>
-                        <a:off x="6217664" y="4530286"/>
-                        <a:ext cx="663575" cy="895929"/>
-                      </a:xfrm>
-                      <a:prstGeom prst="rect">
-                        <a:avLst/>
-                      </a:prstGeom>
-                    </p:spPr>
-                  </p:pic>
-                </p:oleObj>
-              </mc:Fallback>
-            </mc:AlternateContent>
-          </a:graphicData>
-        </a:graphic>
-      </p:graphicFrame>
-      <p:graphicFrame>
-        <p:nvGraphicFramePr>
-          <p:cNvPr id="35" name="Object 34">
-            <a:extLst>
-              <a:ext uri="{FF2B5EF4-FFF2-40B4-BE49-F238E27FC236}">
-                <a16:creationId xmlns:a16="http://schemas.microsoft.com/office/drawing/2014/main" id="{00C09E5A-8D6C-FC64-3BE4-2F89DE4C7977}"/>
-              </a:ext>
-            </a:extLst>
-          </p:cNvPr>
-          <p:cNvGraphicFramePr>
-            <a:graphicFrameLocks noChangeAspect="1"/>
-          </p:cNvGraphicFramePr>
-          <p:nvPr>
-            <p:extLst>
-              <p:ext uri="{D42A27DB-BD31-4B8C-83A1-F6EECF244321}">
-                <p14:modId xmlns:p14="http://schemas.microsoft.com/office/powerpoint/2010/main" val="2418822133"/>
-              </p:ext>
-            </p:extLst>
-          </p:nvPr>
-        </p:nvGraphicFramePr>
-        <p:xfrm>
-          <a:off x="4803169" y="5632260"/>
-          <a:ext cx="844550" cy="939800"/>
-        </p:xfrm>
-        <a:graphic>
-          <a:graphicData uri="http://schemas.openxmlformats.org/presentationml/2006/ole">
-            <mc:AlternateContent xmlns:mc="http://schemas.openxmlformats.org/markup-compatibility/2006">
-              <mc:Choice xmlns:v="urn:schemas-microsoft-com:vml" Requires="v">
-                <p:oleObj name="Equation" r:id="rId10" imgW="177480" imgH="266400" progId="Equation.DSMT4">
-                  <p:embed/>
-                </p:oleObj>
-              </mc:Choice>
-              <mc:Fallback>
-                <p:oleObj name="Equation" r:id="rId10" imgW="177480" imgH="266400" progId="Equation.DSMT4">
-                  <p:embed/>
-                  <p:pic>
-                    <p:nvPicPr>
-                      <p:cNvPr id="34" name="Object 33">
-                        <a:extLst>
-                          <a:ext uri="{FF2B5EF4-FFF2-40B4-BE49-F238E27FC236}">
-                            <a16:creationId xmlns:a16="http://schemas.microsoft.com/office/drawing/2014/main" id="{4AFE27E7-9A2A-653E-7FA0-D49655E7C93F}"/>
-                          </a:ext>
-                        </a:extLst>
-                      </p:cNvPr>
-                      <p:cNvPicPr/>
-                      <p:nvPr/>
-                    </p:nvPicPr>
-                    <p:blipFill>
-                      <a:blip r:embed="rId11"/>
-                      <a:stretch>
-                        <a:fillRect/>
-                      </a:stretch>
-                    </p:blipFill>
-                    <p:spPr>
-                      <a:xfrm>
-                        <a:off x="4803169" y="5632260"/>
-                        <a:ext cx="844550" cy="939800"/>
-                      </a:xfrm>
-                      <a:prstGeom prst="rect">
-                        <a:avLst/>
-                      </a:prstGeom>
-                    </p:spPr>
-                  </p:pic>
-                </p:oleObj>
-              </mc:Fallback>
-            </mc:AlternateContent>
-          </a:graphicData>
-        </a:graphic>
-      </p:graphicFrame>
-      <p:sp>
-        <p:nvSpPr>
-          <p:cNvPr id="36" name="Callout: Line 35">
-            <a:extLst>
-              <a:ext uri="{FF2B5EF4-FFF2-40B4-BE49-F238E27FC236}">
-                <a16:creationId xmlns:a16="http://schemas.microsoft.com/office/drawing/2014/main" id="{7AE5766E-1EB5-C451-F951-CC9DE33C4332}"/>
-              </a:ext>
-            </a:extLst>
-          </p:cNvPr>
-          <p:cNvSpPr/>
-          <p:nvPr/>
-        </p:nvSpPr>
-        <p:spPr>
-          <a:xfrm>
-            <a:off x="2359026" y="5293436"/>
-            <a:ext cx="1177631" cy="378895"/>
-          </a:xfrm>
-          <a:prstGeom prst="borderCallout1">
-            <a:avLst>
-              <a:gd name="adj1" fmla="val 50255"/>
-              <a:gd name="adj2" fmla="val 100906"/>
-              <a:gd name="adj3" fmla="val 15362"/>
-              <a:gd name="adj4" fmla="val 152416"/>
-            </a:avLst>
-          </a:prstGeom>
-          <a:ln>
-            <a:headEnd type="none"/>
-            <a:tailEnd type="stealth"/>
-          </a:ln>
-        </p:spPr>
-        <p:style>
-          <a:lnRef idx="2">
-            <a:schemeClr val="accent1">
-              <a:shade val="15000"/>
-            </a:schemeClr>
-          </a:lnRef>
-          <a:fillRef idx="1">
-            <a:schemeClr val="accent1"/>
-          </a:fillRef>
-          <a:effectRef idx="0">
-            <a:schemeClr val="accent1"/>
-          </a:effectRef>
-          <a:fontRef idx="minor">
-            <a:schemeClr val="lt1"/>
-          </a:fontRef>
-        </p:style>
-        <p:txBody>
-          <a:bodyPr rtlCol="0" anchor="ctr"/>
-          <a:lstStyle/>
-          <a:p>
-            <a:pPr algn="ctr"/>
-            <a:r>
-              <a:rPr lang="en-GB" dirty="0"/>
-              <a:t>sample</a:t>
-            </a:r>
-          </a:p>
-        </p:txBody>
-      </p:sp>
-      <p:sp>
-        <p:nvSpPr>
-          <p:cNvPr id="48" name="Arrow: Circular 47">
-            <a:extLst>
-              <a:ext uri="{FF2B5EF4-FFF2-40B4-BE49-F238E27FC236}">
-                <a16:creationId xmlns:a16="http://schemas.microsoft.com/office/drawing/2014/main" id="{EE45162D-0822-4B46-AC95-4F36C0AFF548}"/>
-              </a:ext>
-            </a:extLst>
-          </p:cNvPr>
-          <p:cNvSpPr/>
-          <p:nvPr/>
-        </p:nvSpPr>
-        <p:spPr>
-          <a:xfrm rot="8277881">
-            <a:off x="4229463" y="5087249"/>
-            <a:ext cx="317853" cy="388956"/>
-          </a:xfrm>
-          <a:prstGeom prst="circularArrow">
-            <a:avLst/>
-          </a:prstGeom>
-        </p:spPr>
-        <p:style>
-          <a:lnRef idx="2">
-            <a:schemeClr val="accent1">
-              <a:shade val="15000"/>
-            </a:schemeClr>
-          </a:lnRef>
-          <a:fillRef idx="1">
-            <a:schemeClr val="accent1"/>
-          </a:fillRef>
-          <a:effectRef idx="0">
-            <a:schemeClr val="accent1"/>
-          </a:effectRef>
-          <a:fontRef idx="minor">
-            <a:schemeClr val="lt1"/>
-          </a:fontRef>
-        </p:style>
-        <p:txBody>
-          <a:bodyPr rtlCol="0" anchor="ctr"/>
-          <a:lstStyle/>
-          <a:p>
-            <a:pPr algn="ctr"/>
-            <a:endParaRPr lang="en-GB">
-              <a:solidFill>
-                <a:schemeClr val="tx1"/>
-              </a:solidFill>
-            </a:endParaRPr>
-          </a:p>
-        </p:txBody>
-      </p:sp>
-      <p:graphicFrame>
-        <p:nvGraphicFramePr>
-          <p:cNvPr id="49" name="Object 48">
-            <a:extLst>
-              <a:ext uri="{FF2B5EF4-FFF2-40B4-BE49-F238E27FC236}">
-                <a16:creationId xmlns:a16="http://schemas.microsoft.com/office/drawing/2014/main" id="{2C2EE9F3-8F76-C280-6580-8DB7A6E1558C}"/>
-              </a:ext>
-            </a:extLst>
-          </p:cNvPr>
-          <p:cNvGraphicFramePr>
-            <a:graphicFrameLocks noChangeAspect="1"/>
-          </p:cNvGraphicFramePr>
-          <p:nvPr>
-            <p:extLst>
-              <p:ext uri="{D42A27DB-BD31-4B8C-83A1-F6EECF244321}">
-                <p14:modId xmlns:p14="http://schemas.microsoft.com/office/powerpoint/2010/main" val="1063973081"/>
-              </p:ext>
-            </p:extLst>
-          </p:nvPr>
-        </p:nvGraphicFramePr>
-        <p:xfrm>
-          <a:off x="6589450" y="1883890"/>
-          <a:ext cx="3517267" cy="1028782"/>
-        </p:xfrm>
-        <a:graphic>
-          <a:graphicData uri="http://schemas.openxmlformats.org/presentationml/2006/ole">
-            <mc:AlternateContent xmlns:mc="http://schemas.openxmlformats.org/markup-compatibility/2006">
-              <mc:Choice xmlns:v="urn:schemas-microsoft-com:vml" Requires="v">
-                <p:oleObj name="Equation" r:id="rId12" imgW="825480" imgH="241200" progId="Equation.DSMT4">
-                  <p:embed/>
-                </p:oleObj>
-              </mc:Choice>
-              <mc:Fallback>
-                <p:oleObj name="Equation" r:id="rId12" imgW="825480" imgH="241200" progId="Equation.DSMT4">
-                  <p:embed/>
-                  <p:pic>
-                    <p:nvPicPr>
-                      <p:cNvPr id="33" name="Object 32">
-                        <a:extLst>
-                          <a:ext uri="{FF2B5EF4-FFF2-40B4-BE49-F238E27FC236}">
-                            <a16:creationId xmlns:a16="http://schemas.microsoft.com/office/drawing/2014/main" id="{9A6B7E1D-3805-7D6B-AE44-6A9D31C203D7}"/>
-                          </a:ext>
-                        </a:extLst>
-                      </p:cNvPr>
-                      <p:cNvPicPr/>
-                      <p:nvPr/>
-                    </p:nvPicPr>
-                    <p:blipFill>
-                      <a:blip r:embed="rId13"/>
-                      <a:stretch>
-                        <a:fillRect/>
-                      </a:stretch>
-                    </p:blipFill>
-                    <p:spPr>
-                      <a:xfrm>
-                        <a:off x="6589450" y="1883890"/>
-                        <a:ext cx="3517267" cy="1028782"/>
-                      </a:xfrm>
-                      <a:prstGeom prst="rect">
-                        <a:avLst/>
-                      </a:prstGeom>
-                    </p:spPr>
-                  </p:pic>
-                </p:oleObj>
-              </mc:Fallback>
-            </mc:AlternateContent>
-          </a:graphicData>
-        </a:graphic>
-      </p:graphicFrame>
-      <p:graphicFrame>
-        <p:nvGraphicFramePr>
-          <p:cNvPr id="52" name="Object 51">
-            <a:extLst>
-              <a:ext uri="{FF2B5EF4-FFF2-40B4-BE49-F238E27FC236}">
-                <a16:creationId xmlns:a16="http://schemas.microsoft.com/office/drawing/2014/main" id="{706FB937-E572-23EC-3652-FD3334597C7F}"/>
-              </a:ext>
-            </a:extLst>
-          </p:cNvPr>
-          <p:cNvGraphicFramePr>
-            <a:graphicFrameLocks noChangeAspect="1"/>
-          </p:cNvGraphicFramePr>
-          <p:nvPr>
-            <p:extLst>
-              <p:ext uri="{D42A27DB-BD31-4B8C-83A1-F6EECF244321}">
-                <p14:modId xmlns:p14="http://schemas.microsoft.com/office/powerpoint/2010/main" val="494642923"/>
-              </p:ext>
-            </p:extLst>
-          </p:nvPr>
-        </p:nvGraphicFramePr>
-        <p:xfrm>
-          <a:off x="6666915" y="2984625"/>
-          <a:ext cx="1716956" cy="705689"/>
-        </p:xfrm>
-        <a:graphic>
-          <a:graphicData uri="http://schemas.openxmlformats.org/presentationml/2006/ole">
-            <mc:AlternateContent xmlns:mc="http://schemas.openxmlformats.org/markup-compatibility/2006">
-              <mc:Choice xmlns:v="urn:schemas-microsoft-com:vml" Requires="v">
-                <p:oleObj name="Equation" r:id="rId14" imgW="825480" imgH="266400" progId="Equation.DSMT4">
-                  <p:embed/>
-                </p:oleObj>
-              </mc:Choice>
-              <mc:Fallback>
-                <p:oleObj name="Equation" r:id="rId14" imgW="825480" imgH="266400" progId="Equation.DSMT4">
-                  <p:embed/>
-                  <p:pic>
-                    <p:nvPicPr>
-                      <p:cNvPr id="49" name="Object 48">
-                        <a:extLst>
-                          <a:ext uri="{FF2B5EF4-FFF2-40B4-BE49-F238E27FC236}">
-                            <a16:creationId xmlns:a16="http://schemas.microsoft.com/office/drawing/2014/main" id="{2C2EE9F3-8F76-C280-6580-8DB7A6E1558C}"/>
-                          </a:ext>
-                        </a:extLst>
-                      </p:cNvPr>
-                      <p:cNvPicPr/>
-                      <p:nvPr/>
-                    </p:nvPicPr>
-                    <p:blipFill>
-                      <a:blip r:embed="rId15"/>
-                      <a:stretch>
-                        <a:fillRect/>
-                      </a:stretch>
-                    </p:blipFill>
-                    <p:spPr>
-                      <a:xfrm>
-                        <a:off x="6666915" y="2984625"/>
-                        <a:ext cx="1716956" cy="705689"/>
-                      </a:xfrm>
-                      <a:prstGeom prst="rect">
-                        <a:avLst/>
-                      </a:prstGeom>
-                    </p:spPr>
-                  </p:pic>
-                </p:oleObj>
-              </mc:Fallback>
-            </mc:AlternateContent>
-          </a:graphicData>
-        </a:graphic>
-      </p:graphicFrame>
-      <p:graphicFrame>
-        <p:nvGraphicFramePr>
-          <p:cNvPr id="53" name="Object 52">
-            <a:extLst>
-              <a:ext uri="{FF2B5EF4-FFF2-40B4-BE49-F238E27FC236}">
-                <a16:creationId xmlns:a16="http://schemas.microsoft.com/office/drawing/2014/main" id="{0A9BB04E-53FC-F16E-619A-9E5190166B49}"/>
-              </a:ext>
-            </a:extLst>
-          </p:cNvPr>
-          <p:cNvGraphicFramePr>
-            <a:graphicFrameLocks noChangeAspect="1"/>
-          </p:cNvGraphicFramePr>
-          <p:nvPr>
-            <p:extLst>
-              <p:ext uri="{D42A27DB-BD31-4B8C-83A1-F6EECF244321}">
-                <p14:modId xmlns:p14="http://schemas.microsoft.com/office/powerpoint/2010/main" val="572068914"/>
-              </p:ext>
-            </p:extLst>
-          </p:nvPr>
-        </p:nvGraphicFramePr>
-        <p:xfrm>
-          <a:off x="8878925" y="2930424"/>
-          <a:ext cx="1876425" cy="738188"/>
-        </p:xfrm>
-        <a:graphic>
-          <a:graphicData uri="http://schemas.openxmlformats.org/presentationml/2006/ole">
-            <mc:AlternateContent xmlns:mc="http://schemas.openxmlformats.org/markup-compatibility/2006">
-              <mc:Choice xmlns:v="urn:schemas-microsoft-com:vml" Requires="v">
-                <p:oleObj name="Equation" r:id="rId16" imgW="901440" imgH="279360" progId="Equation.DSMT4">
-                  <p:embed/>
-                </p:oleObj>
-              </mc:Choice>
-              <mc:Fallback>
-                <p:oleObj name="Equation" r:id="rId16" imgW="901440" imgH="279360" progId="Equation.DSMT4">
-                  <p:embed/>
-                  <p:pic>
-                    <p:nvPicPr>
-                      <p:cNvPr id="52" name="Object 51">
-                        <a:extLst>
-                          <a:ext uri="{FF2B5EF4-FFF2-40B4-BE49-F238E27FC236}">
-                            <a16:creationId xmlns:a16="http://schemas.microsoft.com/office/drawing/2014/main" id="{706FB937-E572-23EC-3652-FD3334597C7F}"/>
-                          </a:ext>
-                        </a:extLst>
-                      </p:cNvPr>
-                      <p:cNvPicPr/>
-                      <p:nvPr/>
-                    </p:nvPicPr>
-                    <p:blipFill>
-                      <a:blip r:embed="rId17"/>
-                      <a:stretch>
-                        <a:fillRect/>
-                      </a:stretch>
-                    </p:blipFill>
-                    <p:spPr>
-                      <a:xfrm>
-                        <a:off x="8878925" y="2930424"/>
-                        <a:ext cx="1876425" cy="738188"/>
+                        <a:off x="1091423" y="874558"/>
+                        <a:ext cx="1712606" cy="589189"/>
                       </a:xfrm>
                       <a:prstGeom prst="rect">
                         <a:avLst/>
@@ -16612,7 +16401,326 @@
     </p:spTree>
     <p:extLst>
       <p:ext uri="{BB962C8B-B14F-4D97-AF65-F5344CB8AC3E}">
-        <p14:creationId xmlns:p14="http://schemas.microsoft.com/office/powerpoint/2010/main" val="3699373884"/>
+        <p14:creationId xmlns:p14="http://schemas.microsoft.com/office/powerpoint/2010/main" val="375699384"/>
+      </p:ext>
+    </p:extLst>
+  </p:cSld>
+  <p:clrMapOvr>
+    <a:masterClrMapping/>
+  </p:clrMapOvr>
+</p:sld>
+</file>
+
+<file path=ppt/slides/slide11.xml><?xml version="1.0" encoding="utf-8"?>
+<p:sld xmlns:a="http://schemas.openxmlformats.org/drawingml/2006/main" xmlns:r="http://schemas.openxmlformats.org/officeDocument/2006/relationships" xmlns:p="http://schemas.openxmlformats.org/presentationml/2006/main">
+  <p:cSld>
+    <p:spTree>
+      <p:nvGrpSpPr>
+        <p:cNvPr id="1" name="">
+          <a:extLst>
+            <a:ext uri="{FF2B5EF4-FFF2-40B4-BE49-F238E27FC236}">
+              <a16:creationId xmlns:a16="http://schemas.microsoft.com/office/drawing/2014/main" id="{0CD77EA6-1EE9-0823-964E-6068B9395C5C}"/>
+            </a:ext>
+          </a:extLst>
+        </p:cNvPr>
+        <p:cNvGrpSpPr/>
+        <p:nvPr/>
+      </p:nvGrpSpPr>
+      <p:grpSpPr>
+        <a:xfrm>
+          <a:off x="0" y="0"/>
+          <a:ext cx="0" cy="0"/>
+          <a:chOff x="0" y="0"/>
+          <a:chExt cx="0" cy="0"/>
+        </a:xfrm>
+      </p:grpSpPr>
+      <p:sp>
+        <p:nvSpPr>
+          <p:cNvPr id="2" name="TextBox 1">
+            <a:extLst>
+              <a:ext uri="{FF2B5EF4-FFF2-40B4-BE49-F238E27FC236}">
+                <a16:creationId xmlns:a16="http://schemas.microsoft.com/office/drawing/2014/main" id="{DA831172-2A78-CB94-0985-E54391524AFB}"/>
+              </a:ext>
+            </a:extLst>
+          </p:cNvPr>
+          <p:cNvSpPr txBox="1"/>
+          <p:nvPr/>
+        </p:nvSpPr>
+        <p:spPr>
+          <a:xfrm>
+            <a:off x="4320367" y="269358"/>
+            <a:ext cx="3390608" cy="523220"/>
+          </a:xfrm>
+          <a:prstGeom prst="rect">
+            <a:avLst/>
+          </a:prstGeom>
+          <a:noFill/>
+        </p:spPr>
+        <p:txBody>
+          <a:bodyPr wrap="none" rtlCol="0">
+            <a:spAutoFit/>
+          </a:bodyPr>
+          <a:lstStyle/>
+          <a:p>
+            <a:r>
+              <a:rPr lang="en-GB" sz="2800" dirty="0">
+                <a:latin typeface="+mj-lt"/>
+              </a:rPr>
+              <a:t>HORACE Workflow:</a:t>
+            </a:r>
+          </a:p>
+        </p:txBody>
+      </p:sp>
+      <p:sp>
+        <p:nvSpPr>
+          <p:cNvPr id="3" name="TextBox 2">
+            <a:extLst>
+              <a:ext uri="{FF2B5EF4-FFF2-40B4-BE49-F238E27FC236}">
+                <a16:creationId xmlns:a16="http://schemas.microsoft.com/office/drawing/2014/main" id="{529ACA14-6C46-F88C-5FD2-CB14D24018D6}"/>
+              </a:ext>
+            </a:extLst>
+          </p:cNvPr>
+          <p:cNvSpPr txBox="1"/>
+          <p:nvPr/>
+        </p:nvSpPr>
+        <p:spPr>
+          <a:xfrm>
+            <a:off x="992374" y="792578"/>
+            <a:ext cx="6875720" cy="523220"/>
+          </a:xfrm>
+          <a:prstGeom prst="rect">
+            <a:avLst/>
+          </a:prstGeom>
+          <a:noFill/>
+        </p:spPr>
+        <p:txBody>
+          <a:bodyPr wrap="square" rtlCol="0">
+            <a:spAutoFit/>
+          </a:bodyPr>
+          <a:lstStyle/>
+          <a:p>
+            <a:r>
+              <a:rPr lang="en-GB" sz="2800" u="sng" dirty="0">
+                <a:solidFill>
+                  <a:schemeClr val="accent1"/>
+                </a:solidFill>
+              </a:rPr>
+              <a:t>https://pace-neutrons.github.io/Horace</a:t>
+            </a:r>
+          </a:p>
+        </p:txBody>
+      </p:sp>
+      <p:sp>
+        <p:nvSpPr>
+          <p:cNvPr id="5" name="TextBox 4">
+            <a:extLst>
+              <a:ext uri="{FF2B5EF4-FFF2-40B4-BE49-F238E27FC236}">
+                <a16:creationId xmlns:a16="http://schemas.microsoft.com/office/drawing/2014/main" id="{4BAAA7A4-6A1B-C5B5-FDD0-9738107D706E}"/>
+              </a:ext>
+            </a:extLst>
+          </p:cNvPr>
+          <p:cNvSpPr txBox="1"/>
+          <p:nvPr/>
+        </p:nvSpPr>
+        <p:spPr>
+          <a:xfrm>
+            <a:off x="992374" y="1771725"/>
+            <a:ext cx="6096000" cy="461665"/>
+          </a:xfrm>
+          <a:prstGeom prst="rect">
+            <a:avLst/>
+          </a:prstGeom>
+          <a:noFill/>
+        </p:spPr>
+        <p:txBody>
+          <a:bodyPr wrap="square">
+            <a:spAutoFit/>
+          </a:bodyPr>
+          <a:lstStyle/>
+          <a:p>
+            <a:r>
+              <a:rPr lang="en-GB" sz="2400" u="sng" dirty="0">
+                <a:solidFill>
+                  <a:schemeClr val="accent1"/>
+                </a:solidFill>
+              </a:rPr>
+              <a:t>https://isis.analysis.stfc.ac.uk/workspaces</a:t>
+            </a:r>
+          </a:p>
+        </p:txBody>
+      </p:sp>
+      <p:sp>
+        <p:nvSpPr>
+          <p:cNvPr id="6" name="TextBox 5">
+            <a:extLst>
+              <a:ext uri="{FF2B5EF4-FFF2-40B4-BE49-F238E27FC236}">
+                <a16:creationId xmlns:a16="http://schemas.microsoft.com/office/drawing/2014/main" id="{D60EE40C-C89C-941C-DB5C-3B7C57A17BE5}"/>
+              </a:ext>
+            </a:extLst>
+          </p:cNvPr>
+          <p:cNvSpPr txBox="1"/>
+          <p:nvPr/>
+        </p:nvSpPr>
+        <p:spPr>
+          <a:xfrm>
+            <a:off x="6937219" y="1643513"/>
+            <a:ext cx="4774064" cy="830997"/>
+          </a:xfrm>
+          <a:prstGeom prst="rect">
+            <a:avLst/>
+          </a:prstGeom>
+          <a:noFill/>
+        </p:spPr>
+        <p:txBody>
+          <a:bodyPr wrap="none" rtlCol="0">
+            <a:spAutoFit/>
+          </a:bodyPr>
+          <a:lstStyle/>
+          <a:p>
+            <a:r>
+              <a:rPr lang="en-GB" sz="2400" dirty="0"/>
+              <a:t>MARI, MERLIN, MAPS, LET</a:t>
+            </a:r>
+          </a:p>
+          <a:p>
+            <a:r>
+              <a:rPr lang="en-GB" sz="2400" dirty="0"/>
+              <a:t>excitations-single crystal machine</a:t>
+            </a:r>
+          </a:p>
+        </p:txBody>
+      </p:sp>
+      <p:sp>
+        <p:nvSpPr>
+          <p:cNvPr id="7" name="TextBox 6">
+            <a:extLst>
+              <a:ext uri="{FF2B5EF4-FFF2-40B4-BE49-F238E27FC236}">
+                <a16:creationId xmlns:a16="http://schemas.microsoft.com/office/drawing/2014/main" id="{3C338E30-F9F3-7D05-5F94-B7F314FD45A4}"/>
+              </a:ext>
+            </a:extLst>
+          </p:cNvPr>
+          <p:cNvSpPr txBox="1"/>
+          <p:nvPr/>
+        </p:nvSpPr>
+        <p:spPr>
+          <a:xfrm>
+            <a:off x="1084521" y="2757377"/>
+            <a:ext cx="2608406" cy="369332"/>
+          </a:xfrm>
+          <a:prstGeom prst="rect">
+            <a:avLst/>
+          </a:prstGeom>
+          <a:noFill/>
+        </p:spPr>
+        <p:txBody>
+          <a:bodyPr wrap="none" rtlCol="0">
+            <a:spAutoFit/>
+          </a:bodyPr>
+          <a:lstStyle/>
+          <a:p>
+            <a:r>
+              <a:rPr lang="en-GB" dirty="0"/>
+              <a:t>There is a GUI (</a:t>
+            </a:r>
+            <a:r>
+              <a:rPr lang="en-GB" dirty="0" err="1"/>
+              <a:t>horace</a:t>
+            </a:r>
+            <a:r>
+              <a:rPr lang="en-GB" dirty="0"/>
+              <a:t>)</a:t>
+            </a:r>
+          </a:p>
+        </p:txBody>
+      </p:sp>
+      <p:sp>
+        <p:nvSpPr>
+          <p:cNvPr id="17" name="TextBox 16">
+            <a:extLst>
+              <a:ext uri="{FF2B5EF4-FFF2-40B4-BE49-F238E27FC236}">
+                <a16:creationId xmlns:a16="http://schemas.microsoft.com/office/drawing/2014/main" id="{9F2B5BE7-73CE-0461-509F-B02482E49144}"/>
+              </a:ext>
+            </a:extLst>
+          </p:cNvPr>
+          <p:cNvSpPr txBox="1"/>
+          <p:nvPr/>
+        </p:nvSpPr>
+        <p:spPr>
+          <a:xfrm>
+            <a:off x="1039693" y="3546626"/>
+            <a:ext cx="6096000" cy="461665"/>
+          </a:xfrm>
+          <a:prstGeom prst="rect">
+            <a:avLst/>
+          </a:prstGeom>
+          <a:noFill/>
+        </p:spPr>
+        <p:txBody>
+          <a:bodyPr wrap="square">
+            <a:spAutoFit/>
+          </a:bodyPr>
+          <a:lstStyle/>
+          <a:p>
+            <a:r>
+              <a:rPr lang="en-GB" sz="2400" u="sng" dirty="0">
+                <a:solidFill>
+                  <a:schemeClr val="accent1"/>
+                </a:solidFill>
+              </a:rPr>
+              <a:t>/</a:t>
+            </a:r>
+            <a:r>
+              <a:rPr lang="en-GB" sz="2400" u="sng" dirty="0" err="1">
+                <a:solidFill>
+                  <a:schemeClr val="accent1"/>
+                </a:solidFill>
+              </a:rPr>
+              <a:t>mnt</a:t>
+            </a:r>
+            <a:r>
+              <a:rPr lang="en-GB" sz="2400" u="sng" dirty="0">
+                <a:solidFill>
+                  <a:schemeClr val="accent1"/>
+                </a:solidFill>
+              </a:rPr>
+              <a:t>/</a:t>
+            </a:r>
+            <a:r>
+              <a:rPr lang="en-GB" sz="2400" u="sng" dirty="0" err="1">
+                <a:solidFill>
+                  <a:schemeClr val="accent1"/>
+                </a:solidFill>
+              </a:rPr>
+              <a:t>ceph</a:t>
+            </a:r>
+            <a:r>
+              <a:rPr lang="en-GB" sz="2400" u="sng" dirty="0">
+                <a:solidFill>
+                  <a:schemeClr val="accent1"/>
+                </a:solidFill>
+              </a:rPr>
+              <a:t>/auxiliary/excitations/</a:t>
+            </a:r>
+            <a:r>
+              <a:rPr lang="en-GB" sz="2400" u="sng" dirty="0" err="1">
+                <a:solidFill>
+                  <a:schemeClr val="accent1"/>
+                </a:solidFill>
+              </a:rPr>
+              <a:t>rse_training</a:t>
+            </a:r>
+            <a:endParaRPr lang="en-GB" sz="2400" u="sng" dirty="0">
+              <a:solidFill>
+                <a:schemeClr val="accent1"/>
+              </a:solidFill>
+            </a:endParaRPr>
+          </a:p>
+        </p:txBody>
+      </p:sp>
+    </p:spTree>
+    <p:extLst>
+      <p:ext uri="{BB962C8B-B14F-4D97-AF65-F5344CB8AC3E}">
+        <p14:creationId xmlns:p14="http://schemas.microsoft.com/office/powerpoint/2010/main" val="3791555548"/>
       </p:ext>
     </p:extLst>
   </p:cSld>
@@ -18597,6 +18705,1234 @@
   <p:cSld>
     <p:spTree>
       <p:nvGrpSpPr>
+        <p:cNvPr id="1" name=""/>
+        <p:cNvGrpSpPr/>
+        <p:nvPr/>
+      </p:nvGrpSpPr>
+      <p:grpSpPr>
+        <a:xfrm>
+          <a:off x="0" y="0"/>
+          <a:ext cx="0" cy="0"/>
+          <a:chOff x="0" y="0"/>
+          <a:chExt cx="0" cy="0"/>
+        </a:xfrm>
+      </p:grpSpPr>
+      <p:pic>
+        <p:nvPicPr>
+          <p:cNvPr id="24578" name="Picture 2"/>
+          <p:cNvPicPr>
+            <a:picLocks noChangeAspect="1" noChangeArrowheads="1"/>
+          </p:cNvPicPr>
+          <p:nvPr/>
+        </p:nvPicPr>
+        <p:blipFill>
+          <a:blip r:embed="rId2">
+            <a:extLst>
+              <a:ext uri="{28A0092B-C50C-407E-A947-70E740481C1C}">
+                <a14:useLocalDpi xmlns:a14="http://schemas.microsoft.com/office/drawing/2010/main" val="0"/>
+              </a:ext>
+            </a:extLst>
+          </a:blip>
+          <a:srcRect/>
+          <a:stretch>
+            <a:fillRect/>
+          </a:stretch>
+        </p:blipFill>
+        <p:spPr bwMode="auto">
+          <a:xfrm>
+            <a:off x="1749719" y="706613"/>
+            <a:ext cx="8316416" cy="5876822"/>
+          </a:xfrm>
+          <a:prstGeom prst="rect">
+            <a:avLst/>
+          </a:prstGeom>
+          <a:noFill/>
+          <a:ln>
+            <a:noFill/>
+          </a:ln>
+          <a:extLst>
+            <a:ext uri="{909E8E84-426E-40DD-AFC4-6F175D3DCCD1}">
+              <a14:hiddenFill xmlns:a14="http://schemas.microsoft.com/office/drawing/2010/main">
+                <a:solidFill>
+                  <a:schemeClr val="accent1"/>
+                </a:solidFill>
+              </a14:hiddenFill>
+            </a:ext>
+            <a:ext uri="{91240B29-F687-4F45-9708-019B960494DF}">
+              <a14:hiddenLine xmlns:a14="http://schemas.microsoft.com/office/drawing/2010/main" w="9525">
+                <a:solidFill>
+                  <a:schemeClr val="tx1"/>
+                </a:solidFill>
+                <a:miter lim="800000"/>
+                <a:headEnd/>
+                <a:tailEnd/>
+              </a14:hiddenLine>
+            </a:ext>
+          </a:extLst>
+        </p:spPr>
+      </p:pic>
+      <p:grpSp>
+        <p:nvGrpSpPr>
+          <p:cNvPr id="3" name="Group 2"/>
+          <p:cNvGrpSpPr/>
+          <p:nvPr/>
+        </p:nvGrpSpPr>
+        <p:grpSpPr>
+          <a:xfrm rot="13352471">
+            <a:off x="6138399" y="4792490"/>
+            <a:ext cx="2538124" cy="300"/>
+            <a:chOff x="251520" y="2159150"/>
+            <a:chExt cx="2538124" cy="300"/>
+          </a:xfrm>
+        </p:grpSpPr>
+        <p:cxnSp>
+          <p:nvCxnSpPr>
+            <p:cNvPr id="4" name="Straight Arrow Connector 3"/>
+            <p:cNvCxnSpPr/>
+            <p:nvPr/>
+          </p:nvCxnSpPr>
+          <p:spPr>
+            <a:xfrm>
+              <a:off x="251520" y="2159150"/>
+              <a:ext cx="2538124" cy="0"/>
+            </a:xfrm>
+            <a:prstGeom prst="straightConnector1">
+              <a:avLst/>
+            </a:prstGeom>
+            <a:ln w="63500">
+              <a:solidFill>
+                <a:schemeClr val="tx1"/>
+              </a:solidFill>
+              <a:tailEnd type="none"/>
+            </a:ln>
+          </p:spPr>
+          <p:style>
+            <a:lnRef idx="1">
+              <a:schemeClr val="accent1"/>
+            </a:lnRef>
+            <a:fillRef idx="0">
+              <a:schemeClr val="accent1"/>
+            </a:fillRef>
+            <a:effectRef idx="0">
+              <a:schemeClr val="accent1"/>
+            </a:effectRef>
+            <a:fontRef idx="minor">
+              <a:schemeClr val="tx1"/>
+            </a:fontRef>
+          </p:style>
+        </p:cxnSp>
+        <p:cxnSp>
+          <p:nvCxnSpPr>
+            <p:cNvPr id="5" name="Straight Arrow Connector 4"/>
+            <p:cNvCxnSpPr/>
+            <p:nvPr/>
+          </p:nvCxnSpPr>
+          <p:spPr>
+            <a:xfrm>
+              <a:off x="611560" y="2159150"/>
+              <a:ext cx="1440160" cy="300"/>
+            </a:xfrm>
+            <a:prstGeom prst="straightConnector1">
+              <a:avLst/>
+            </a:prstGeom>
+            <a:ln w="63500">
+              <a:solidFill>
+                <a:schemeClr val="tx1"/>
+              </a:solidFill>
+              <a:tailEnd type="arrow"/>
+            </a:ln>
+          </p:spPr>
+          <p:style>
+            <a:lnRef idx="1">
+              <a:schemeClr val="accent1"/>
+            </a:lnRef>
+            <a:fillRef idx="0">
+              <a:schemeClr val="accent1"/>
+            </a:fillRef>
+            <a:effectRef idx="0">
+              <a:schemeClr val="accent1"/>
+            </a:effectRef>
+            <a:fontRef idx="minor">
+              <a:schemeClr val="tx1"/>
+            </a:fontRef>
+          </p:style>
+        </p:cxnSp>
+      </p:grpSp>
+      <p:cxnSp>
+        <p:nvCxnSpPr>
+          <p:cNvPr id="10" name="Straight Arrow Connector 9"/>
+          <p:cNvCxnSpPr/>
+          <p:nvPr/>
+        </p:nvCxnSpPr>
+        <p:spPr>
+          <a:xfrm flipH="1" flipV="1">
+            <a:off x="4867200" y="3797275"/>
+            <a:ext cx="1304528" cy="55327"/>
+          </a:xfrm>
+          <a:prstGeom prst="straightConnector1">
+            <a:avLst/>
+          </a:prstGeom>
+          <a:ln w="63500">
+            <a:solidFill>
+              <a:schemeClr val="tx1"/>
+            </a:solidFill>
+            <a:tailEnd type="arrow"/>
+          </a:ln>
+        </p:spPr>
+        <p:style>
+          <a:lnRef idx="1">
+            <a:schemeClr val="accent1"/>
+          </a:lnRef>
+          <a:fillRef idx="0">
+            <a:schemeClr val="accent1"/>
+          </a:fillRef>
+          <a:effectRef idx="0">
+            <a:schemeClr val="accent1"/>
+          </a:effectRef>
+          <a:fontRef idx="minor">
+            <a:schemeClr val="tx1"/>
+          </a:fontRef>
+        </p:style>
+      </p:cxnSp>
+      <p:grpSp>
+        <p:nvGrpSpPr>
+          <p:cNvPr id="23" name="Group 22"/>
+          <p:cNvGrpSpPr/>
+          <p:nvPr/>
+        </p:nvGrpSpPr>
+        <p:grpSpPr>
+          <a:xfrm>
+            <a:off x="4867200" y="2724756"/>
+            <a:ext cx="2944776" cy="1072518"/>
+            <a:chOff x="3343200" y="2724756"/>
+            <a:chExt cx="2944776" cy="1072518"/>
+          </a:xfrm>
+        </p:grpSpPr>
+        <p:cxnSp>
+          <p:nvCxnSpPr>
+            <p:cNvPr id="13" name="Straight Arrow Connector 12"/>
+            <p:cNvCxnSpPr/>
+            <p:nvPr/>
+          </p:nvCxnSpPr>
+          <p:spPr>
+            <a:xfrm flipH="1" flipV="1">
+              <a:off x="3343200" y="3130364"/>
+              <a:ext cx="1304528" cy="584448"/>
+            </a:xfrm>
+            <a:prstGeom prst="straightConnector1">
+              <a:avLst/>
+            </a:prstGeom>
+            <a:ln w="63500">
+              <a:solidFill>
+                <a:schemeClr val="tx1"/>
+              </a:solidFill>
+              <a:tailEnd type="arrow"/>
+            </a:ln>
+          </p:spPr>
+          <p:style>
+            <a:lnRef idx="1">
+              <a:schemeClr val="accent1"/>
+            </a:lnRef>
+            <a:fillRef idx="0">
+              <a:schemeClr val="accent1"/>
+            </a:fillRef>
+            <a:effectRef idx="0">
+              <a:schemeClr val="accent1"/>
+            </a:effectRef>
+            <a:fontRef idx="minor">
+              <a:schemeClr val="tx1"/>
+            </a:fontRef>
+          </p:style>
+        </p:cxnSp>
+        <p:cxnSp>
+          <p:nvCxnSpPr>
+            <p:cNvPr id="15" name="Straight Arrow Connector 14"/>
+            <p:cNvCxnSpPr/>
+            <p:nvPr/>
+          </p:nvCxnSpPr>
+          <p:spPr>
+            <a:xfrm flipV="1">
+              <a:off x="4879068" y="3789040"/>
+              <a:ext cx="1408908" cy="8234"/>
+            </a:xfrm>
+            <a:prstGeom prst="straightConnector1">
+              <a:avLst/>
+            </a:prstGeom>
+            <a:ln w="63500">
+              <a:solidFill>
+                <a:schemeClr val="tx1"/>
+              </a:solidFill>
+              <a:tailEnd type="arrow"/>
+            </a:ln>
+          </p:spPr>
+          <p:style>
+            <a:lnRef idx="1">
+              <a:schemeClr val="accent1"/>
+            </a:lnRef>
+            <a:fillRef idx="0">
+              <a:schemeClr val="accent1"/>
+            </a:fillRef>
+            <a:effectRef idx="0">
+              <a:schemeClr val="accent1"/>
+            </a:effectRef>
+            <a:fontRef idx="minor">
+              <a:schemeClr val="tx1"/>
+            </a:fontRef>
+          </p:style>
+        </p:cxnSp>
+        <p:cxnSp>
+          <p:nvCxnSpPr>
+            <p:cNvPr id="17" name="Straight Arrow Connector 16"/>
+            <p:cNvCxnSpPr/>
+            <p:nvPr/>
+          </p:nvCxnSpPr>
+          <p:spPr>
+            <a:xfrm flipV="1">
+              <a:off x="4860032" y="2724756"/>
+              <a:ext cx="927720" cy="883599"/>
+            </a:xfrm>
+            <a:prstGeom prst="straightConnector1">
+              <a:avLst/>
+            </a:prstGeom>
+            <a:ln w="63500">
+              <a:solidFill>
+                <a:schemeClr val="tx1"/>
+              </a:solidFill>
+              <a:tailEnd type="arrow"/>
+            </a:ln>
+          </p:spPr>
+          <p:style>
+            <a:lnRef idx="1">
+              <a:schemeClr val="accent1"/>
+            </a:lnRef>
+            <a:fillRef idx="0">
+              <a:schemeClr val="accent1"/>
+            </a:fillRef>
+            <a:effectRef idx="0">
+              <a:schemeClr val="accent1"/>
+            </a:effectRef>
+            <a:fontRef idx="minor">
+              <a:schemeClr val="tx1"/>
+            </a:fontRef>
+          </p:style>
+        </p:cxnSp>
+      </p:grpSp>
+      <p:sp>
+        <p:nvSpPr>
+          <p:cNvPr id="19" name="Text Box 21"/>
+          <p:cNvSpPr txBox="1">
+            <a:spLocks noChangeArrowheads="1"/>
+          </p:cNvSpPr>
+          <p:nvPr/>
+        </p:nvSpPr>
+        <p:spPr bwMode="auto">
+          <a:xfrm>
+            <a:off x="1768371" y="5236051"/>
+            <a:ext cx="4951413" cy="1061829"/>
+          </a:xfrm>
+          <a:prstGeom prst="rect">
+            <a:avLst/>
+          </a:prstGeom>
+          <a:noFill/>
+          <a:ln>
+            <a:noFill/>
+          </a:ln>
+          <a:extLst>
+            <a:ext uri="{909E8E84-426E-40DD-AFC4-6F175D3DCCD1}">
+              <a14:hiddenFill xmlns:a14="http://schemas.microsoft.com/office/drawing/2010/main">
+                <a:solidFill>
+                  <a:srgbClr val="FFFFFF"/>
+                </a:solidFill>
+              </a14:hiddenFill>
+            </a:ext>
+            <a:ext uri="{91240B29-F687-4F45-9708-019B960494DF}">
+              <a14:hiddenLine xmlns:a14="http://schemas.microsoft.com/office/drawing/2010/main" w="9525">
+                <a:solidFill>
+                  <a:srgbClr val="000000"/>
+                </a:solidFill>
+                <a:miter lim="800000"/>
+                <a:headEnd/>
+                <a:tailEnd/>
+              </a14:hiddenLine>
+            </a:ext>
+          </a:extLst>
+        </p:spPr>
+        <p:txBody>
+          <a:bodyPr>
+            <a:spAutoFit/>
+          </a:bodyPr>
+          <a:lstStyle>
+            <a:lvl1pPr>
+              <a:defRPr sz="1600">
+                <a:solidFill>
+                  <a:srgbClr val="000099"/>
+                </a:solidFill>
+                <a:latin typeface="Arial" pitchFamily="34" charset="0"/>
+              </a:defRPr>
+            </a:lvl1pPr>
+            <a:lvl2pPr>
+              <a:defRPr sz="1600">
+                <a:solidFill>
+                  <a:srgbClr val="000099"/>
+                </a:solidFill>
+                <a:latin typeface="Arial" pitchFamily="34" charset="0"/>
+              </a:defRPr>
+            </a:lvl2pPr>
+            <a:lvl3pPr marL="1143000" indent="-228600">
+              <a:defRPr sz="1600">
+                <a:solidFill>
+                  <a:srgbClr val="000099"/>
+                </a:solidFill>
+                <a:latin typeface="Arial" pitchFamily="34" charset="0"/>
+              </a:defRPr>
+            </a:lvl3pPr>
+            <a:lvl4pPr marL="1600200" indent="-228600">
+              <a:defRPr sz="1600">
+                <a:solidFill>
+                  <a:srgbClr val="000099"/>
+                </a:solidFill>
+                <a:latin typeface="Arial" pitchFamily="34" charset="0"/>
+              </a:defRPr>
+            </a:lvl4pPr>
+            <a:lvl5pPr marL="2057400" indent="-228600">
+              <a:defRPr sz="1600">
+                <a:solidFill>
+                  <a:srgbClr val="000099"/>
+                </a:solidFill>
+                <a:latin typeface="Arial" pitchFamily="34" charset="0"/>
+              </a:defRPr>
+            </a:lvl5pPr>
+            <a:lvl6pPr marL="2514600" indent="-228600" algn="ctr" eaLnBrk="0" fontAlgn="base" hangingPunct="0">
+              <a:spcBef>
+                <a:spcPct val="0"/>
+              </a:spcBef>
+              <a:spcAft>
+                <a:spcPct val="0"/>
+              </a:spcAft>
+              <a:defRPr sz="1600">
+                <a:solidFill>
+                  <a:srgbClr val="000099"/>
+                </a:solidFill>
+                <a:latin typeface="Arial" pitchFamily="34" charset="0"/>
+              </a:defRPr>
+            </a:lvl6pPr>
+            <a:lvl7pPr marL="2971800" indent="-228600" algn="ctr" eaLnBrk="0" fontAlgn="base" hangingPunct="0">
+              <a:spcBef>
+                <a:spcPct val="0"/>
+              </a:spcBef>
+              <a:spcAft>
+                <a:spcPct val="0"/>
+              </a:spcAft>
+              <a:defRPr sz="1600">
+                <a:solidFill>
+                  <a:srgbClr val="000099"/>
+                </a:solidFill>
+                <a:latin typeface="Arial" pitchFamily="34" charset="0"/>
+              </a:defRPr>
+            </a:lvl7pPr>
+            <a:lvl8pPr marL="3429000" indent="-228600" algn="ctr" eaLnBrk="0" fontAlgn="base" hangingPunct="0">
+              <a:spcBef>
+                <a:spcPct val="0"/>
+              </a:spcBef>
+              <a:spcAft>
+                <a:spcPct val="0"/>
+              </a:spcAft>
+              <a:defRPr sz="1600">
+                <a:solidFill>
+                  <a:srgbClr val="000099"/>
+                </a:solidFill>
+                <a:latin typeface="Arial" pitchFamily="34" charset="0"/>
+              </a:defRPr>
+            </a:lvl8pPr>
+            <a:lvl9pPr marL="3886200" indent="-228600" algn="ctr" eaLnBrk="0" fontAlgn="base" hangingPunct="0">
+              <a:spcBef>
+                <a:spcPct val="0"/>
+              </a:spcBef>
+              <a:spcAft>
+                <a:spcPct val="0"/>
+              </a:spcAft>
+              <a:defRPr sz="1600">
+                <a:solidFill>
+                  <a:srgbClr val="000099"/>
+                </a:solidFill>
+                <a:latin typeface="Arial" pitchFamily="34" charset="0"/>
+              </a:defRPr>
+            </a:lvl9pPr>
+          </a:lstStyle>
+          <a:p>
+            <a:pPr lvl="1" algn="l">
+              <a:spcBef>
+                <a:spcPct val="25000"/>
+              </a:spcBef>
+            </a:pPr>
+            <a:r>
+              <a:rPr lang="en-GB" sz="1800" dirty="0">
+                <a:sym typeface="Symbol" pitchFamily="18" charset="2"/>
+              </a:rPr>
+              <a:t>70,000 detector elements</a:t>
+            </a:r>
+          </a:p>
+          <a:p>
+            <a:pPr lvl="1" algn="l">
+              <a:spcBef>
+                <a:spcPct val="25000"/>
+              </a:spcBef>
+            </a:pPr>
+            <a:r>
+              <a:rPr lang="en-GB" sz="1800" dirty="0">
+                <a:sym typeface="Symbol" pitchFamily="18" charset="2"/>
+              </a:rPr>
+              <a:t>300-500 energy bins</a:t>
+            </a:r>
+          </a:p>
+          <a:p>
+            <a:pPr lvl="1" algn="l">
+              <a:spcBef>
+                <a:spcPct val="25000"/>
+              </a:spcBef>
+            </a:pPr>
+            <a:r>
+              <a:rPr lang="en-GB" sz="1800" dirty="0" err="1">
+                <a:sym typeface="Symbol" pitchFamily="18" charset="2"/>
+              </a:rPr>
+              <a:t>Upto</a:t>
+            </a:r>
+            <a:r>
+              <a:rPr lang="en-GB" sz="1800" dirty="0">
+                <a:sym typeface="Symbol" pitchFamily="18" charset="2"/>
+              </a:rPr>
+              <a:t>  4 or 5 different </a:t>
+            </a:r>
+            <a:r>
+              <a:rPr lang="en-GB" sz="1800" dirty="0" err="1">
+                <a:sym typeface="Symbol" pitchFamily="18" charset="2"/>
+              </a:rPr>
+              <a:t>Ei</a:t>
+            </a:r>
+            <a:r>
+              <a:rPr lang="en-GB" sz="1800" dirty="0">
+                <a:sym typeface="Symbol" pitchFamily="18" charset="2"/>
+              </a:rPr>
+              <a:t> simultaneously</a:t>
+            </a:r>
+          </a:p>
+        </p:txBody>
+      </p:sp>
+      <p:grpSp>
+        <p:nvGrpSpPr>
+          <p:cNvPr id="43" name="Group 42"/>
+          <p:cNvGrpSpPr/>
+          <p:nvPr/>
+        </p:nvGrpSpPr>
+        <p:grpSpPr>
+          <a:xfrm>
+            <a:off x="6575704" y="1557780"/>
+            <a:ext cx="5453185" cy="3292252"/>
+            <a:chOff x="5051703" y="1557780"/>
+            <a:chExt cx="5453185" cy="3292252"/>
+          </a:xfrm>
+        </p:grpSpPr>
+        <p:sp>
+          <p:nvSpPr>
+            <p:cNvPr id="42" name="Isosceles Triangle 41"/>
+            <p:cNvSpPr/>
+            <p:nvPr/>
+          </p:nvSpPr>
+          <p:spPr>
+            <a:xfrm rot="14969064">
+              <a:off x="6132170" y="477313"/>
+              <a:ext cx="3292252" cy="5453185"/>
+            </a:xfrm>
+            <a:prstGeom prst="triangle">
+              <a:avLst/>
+            </a:prstGeom>
+            <a:solidFill>
+              <a:schemeClr val="accent1">
+                <a:alpha val="39000"/>
+              </a:schemeClr>
+            </a:solidFill>
+          </p:spPr>
+          <p:style>
+            <a:lnRef idx="2">
+              <a:schemeClr val="accent1">
+                <a:shade val="50000"/>
+              </a:schemeClr>
+            </a:lnRef>
+            <a:fillRef idx="1">
+              <a:schemeClr val="accent1"/>
+            </a:fillRef>
+            <a:effectRef idx="0">
+              <a:schemeClr val="accent1"/>
+            </a:effectRef>
+            <a:fontRef idx="minor">
+              <a:schemeClr val="lt1"/>
+            </a:fontRef>
+          </p:style>
+          <p:txBody>
+            <a:bodyPr rtlCol="0" anchor="ctr"/>
+            <a:lstStyle/>
+            <a:p>
+              <a:pPr algn="ctr"/>
+              <a:endParaRPr lang="en-GB"/>
+            </a:p>
+          </p:txBody>
+        </p:sp>
+        <p:grpSp>
+          <p:nvGrpSpPr>
+            <p:cNvPr id="35" name="Group 34"/>
+            <p:cNvGrpSpPr/>
+            <p:nvPr/>
+          </p:nvGrpSpPr>
+          <p:grpSpPr>
+            <a:xfrm>
+              <a:off x="7323725" y="2007674"/>
+              <a:ext cx="2173623" cy="1927038"/>
+              <a:chOff x="7030073" y="1862152"/>
+              <a:chExt cx="2173623" cy="1927038"/>
+            </a:xfrm>
+          </p:grpSpPr>
+          <p:sp>
+            <p:nvSpPr>
+              <p:cNvPr id="25" name="Flowchart: Magnetic Disk 24"/>
+              <p:cNvSpPr/>
+              <p:nvPr/>
+            </p:nvSpPr>
+            <p:spPr>
+              <a:xfrm>
+                <a:off x="7092280" y="2380800"/>
+                <a:ext cx="860686" cy="1316856"/>
+              </a:xfrm>
+              <a:prstGeom prst="flowChartMagneticDisk">
+                <a:avLst/>
+              </a:prstGeom>
+            </p:spPr>
+            <p:style>
+              <a:lnRef idx="2">
+                <a:schemeClr val="accent1">
+                  <a:shade val="50000"/>
+                </a:schemeClr>
+              </a:lnRef>
+              <a:fillRef idx="1">
+                <a:schemeClr val="accent1"/>
+              </a:fillRef>
+              <a:effectRef idx="0">
+                <a:schemeClr val="accent1"/>
+              </a:effectRef>
+              <a:fontRef idx="minor">
+                <a:schemeClr val="lt1"/>
+              </a:fontRef>
+            </p:style>
+            <p:txBody>
+              <a:bodyPr rtlCol="0" anchor="ctr"/>
+              <a:lstStyle/>
+              <a:p>
+                <a:pPr algn="ctr"/>
+                <a:endParaRPr lang="en-GB"/>
+              </a:p>
+            </p:txBody>
+          </p:sp>
+          <p:cxnSp>
+            <p:nvCxnSpPr>
+              <p:cNvPr id="28" name="Straight Connector 27"/>
+              <p:cNvCxnSpPr/>
+              <p:nvPr/>
+            </p:nvCxnSpPr>
+            <p:spPr>
+              <a:xfrm>
+                <a:off x="7164288" y="2492896"/>
+                <a:ext cx="583506" cy="288032"/>
+              </a:xfrm>
+              <a:prstGeom prst="line">
+                <a:avLst/>
+              </a:prstGeom>
+              <a:ln w="25400">
+                <a:solidFill>
+                  <a:srgbClr val="142CDC"/>
+                </a:solidFill>
+              </a:ln>
+            </p:spPr>
+            <p:style>
+              <a:lnRef idx="1">
+                <a:schemeClr val="accent1"/>
+              </a:lnRef>
+              <a:fillRef idx="0">
+                <a:schemeClr val="accent1"/>
+              </a:fillRef>
+              <a:effectRef idx="0">
+                <a:schemeClr val="accent1"/>
+              </a:effectRef>
+              <a:fontRef idx="minor">
+                <a:schemeClr val="tx1"/>
+              </a:fontRef>
+            </p:style>
+          </p:cxnSp>
+          <p:cxnSp>
+            <p:nvCxnSpPr>
+              <p:cNvPr id="31" name="Straight Connector 30"/>
+              <p:cNvCxnSpPr/>
+              <p:nvPr/>
+            </p:nvCxnSpPr>
+            <p:spPr>
+              <a:xfrm>
+                <a:off x="7230870" y="2436724"/>
+                <a:ext cx="583506" cy="288032"/>
+              </a:xfrm>
+              <a:prstGeom prst="line">
+                <a:avLst/>
+              </a:prstGeom>
+              <a:ln w="25400">
+                <a:solidFill>
+                  <a:srgbClr val="142CDC"/>
+                </a:solidFill>
+              </a:ln>
+            </p:spPr>
+            <p:style>
+              <a:lnRef idx="1">
+                <a:schemeClr val="accent1"/>
+              </a:lnRef>
+              <a:fillRef idx="0">
+                <a:schemeClr val="accent1"/>
+              </a:fillRef>
+              <a:effectRef idx="0">
+                <a:schemeClr val="accent1"/>
+              </a:effectRef>
+              <a:fontRef idx="minor">
+                <a:schemeClr val="tx1"/>
+              </a:fontRef>
+            </p:style>
+          </p:cxnSp>
+          <p:cxnSp>
+            <p:nvCxnSpPr>
+              <p:cNvPr id="32" name="Straight Connector 31"/>
+              <p:cNvCxnSpPr/>
+              <p:nvPr/>
+            </p:nvCxnSpPr>
+            <p:spPr>
+              <a:xfrm>
+                <a:off x="7344809" y="2400463"/>
+                <a:ext cx="583506" cy="288032"/>
+              </a:xfrm>
+              <a:prstGeom prst="line">
+                <a:avLst/>
+              </a:prstGeom>
+              <a:ln w="25400">
+                <a:solidFill>
+                  <a:srgbClr val="142CDC"/>
+                </a:solidFill>
+              </a:ln>
+            </p:spPr>
+            <p:style>
+              <a:lnRef idx="1">
+                <a:schemeClr val="accent1"/>
+              </a:lnRef>
+              <a:fillRef idx="0">
+                <a:schemeClr val="accent1"/>
+              </a:fillRef>
+              <a:effectRef idx="0">
+                <a:schemeClr val="accent1"/>
+              </a:effectRef>
+              <a:fontRef idx="minor">
+                <a:schemeClr val="tx1"/>
+              </a:fontRef>
+            </p:style>
+          </p:cxnSp>
+          <p:cxnSp>
+            <p:nvCxnSpPr>
+              <p:cNvPr id="33" name="Straight Connector 32"/>
+              <p:cNvCxnSpPr/>
+              <p:nvPr/>
+            </p:nvCxnSpPr>
+            <p:spPr>
+              <a:xfrm>
+                <a:off x="7747794" y="2780928"/>
+                <a:ext cx="0" cy="916728"/>
+              </a:xfrm>
+              <a:prstGeom prst="line">
+                <a:avLst/>
+              </a:prstGeom>
+              <a:ln w="25400">
+                <a:solidFill>
+                  <a:srgbClr val="142CDC"/>
+                </a:solidFill>
+              </a:ln>
+            </p:spPr>
+            <p:style>
+              <a:lnRef idx="1">
+                <a:schemeClr val="accent1"/>
+              </a:lnRef>
+              <a:fillRef idx="0">
+                <a:schemeClr val="accent1"/>
+              </a:fillRef>
+              <a:effectRef idx="0">
+                <a:schemeClr val="accent1"/>
+              </a:effectRef>
+              <a:fontRef idx="minor">
+                <a:schemeClr val="tx1"/>
+              </a:fontRef>
+            </p:style>
+          </p:cxnSp>
+          <p:cxnSp>
+            <p:nvCxnSpPr>
+              <p:cNvPr id="36" name="Straight Connector 35"/>
+              <p:cNvCxnSpPr/>
+              <p:nvPr/>
+            </p:nvCxnSpPr>
+            <p:spPr>
+              <a:xfrm>
+                <a:off x="7826303" y="2720891"/>
+                <a:ext cx="0" cy="916728"/>
+              </a:xfrm>
+              <a:prstGeom prst="line">
+                <a:avLst/>
+              </a:prstGeom>
+              <a:ln w="25400">
+                <a:solidFill>
+                  <a:srgbClr val="142CDC"/>
+                </a:solidFill>
+              </a:ln>
+            </p:spPr>
+            <p:style>
+              <a:lnRef idx="1">
+                <a:schemeClr val="accent1"/>
+              </a:lnRef>
+              <a:fillRef idx="0">
+                <a:schemeClr val="accent1"/>
+              </a:fillRef>
+              <a:effectRef idx="0">
+                <a:schemeClr val="accent1"/>
+              </a:effectRef>
+              <a:fontRef idx="minor">
+                <a:schemeClr val="tx1"/>
+              </a:fontRef>
+            </p:style>
+          </p:cxnSp>
+          <p:cxnSp>
+            <p:nvCxnSpPr>
+              <p:cNvPr id="37" name="Straight Connector 36"/>
+              <p:cNvCxnSpPr/>
+              <p:nvPr/>
+            </p:nvCxnSpPr>
+            <p:spPr>
+              <a:xfrm>
+                <a:off x="7909431" y="2674710"/>
+                <a:ext cx="0" cy="916728"/>
+              </a:xfrm>
+              <a:prstGeom prst="line">
+                <a:avLst/>
+              </a:prstGeom>
+              <a:ln w="25400">
+                <a:solidFill>
+                  <a:srgbClr val="142CDC"/>
+                </a:solidFill>
+              </a:ln>
+            </p:spPr>
+            <p:style>
+              <a:lnRef idx="1">
+                <a:schemeClr val="accent1"/>
+              </a:lnRef>
+              <a:fillRef idx="0">
+                <a:schemeClr val="accent1"/>
+              </a:fillRef>
+              <a:effectRef idx="0">
+                <a:schemeClr val="accent1"/>
+              </a:effectRef>
+              <a:fontRef idx="minor">
+                <a:schemeClr val="tx1"/>
+              </a:fontRef>
+            </p:style>
+          </p:cxnSp>
+          <p:sp>
+            <p:nvSpPr>
+              <p:cNvPr id="38" name="Arc 37"/>
+              <p:cNvSpPr/>
+              <p:nvPr/>
+            </p:nvSpPr>
+            <p:spPr>
+              <a:xfrm>
+                <a:off x="7030073" y="1862152"/>
+                <a:ext cx="985100" cy="455594"/>
+              </a:xfrm>
+              <a:prstGeom prst="arc">
+                <a:avLst>
+                  <a:gd name="adj1" fmla="val 11808389"/>
+                  <a:gd name="adj2" fmla="val 5453825"/>
+                </a:avLst>
+              </a:prstGeom>
+              <a:ln w="38100">
+                <a:solidFill>
+                  <a:srgbClr val="000099"/>
+                </a:solidFill>
+                <a:headEnd type="triangle" w="lg" len="med"/>
+                <a:tailEnd type="none"/>
+              </a:ln>
+            </p:spPr>
+            <p:style>
+              <a:lnRef idx="1">
+                <a:schemeClr val="accent1"/>
+              </a:lnRef>
+              <a:fillRef idx="0">
+                <a:schemeClr val="accent1"/>
+              </a:fillRef>
+              <a:effectRef idx="0">
+                <a:schemeClr val="accent1"/>
+              </a:effectRef>
+              <a:fontRef idx="minor">
+                <a:schemeClr val="tx1"/>
+              </a:fontRef>
+            </p:style>
+            <p:txBody>
+              <a:bodyPr rtlCol="0" anchor="ctr"/>
+              <a:lstStyle/>
+              <a:p>
+                <a:pPr algn="ctr"/>
+                <a:endParaRPr lang="en-GB"/>
+              </a:p>
+            </p:txBody>
+          </p:sp>
+          <p:cxnSp>
+            <p:nvCxnSpPr>
+              <p:cNvPr id="39" name="Straight Arrow Connector 38"/>
+              <p:cNvCxnSpPr/>
+              <p:nvPr/>
+            </p:nvCxnSpPr>
+            <p:spPr>
+              <a:xfrm rot="13352471">
+                <a:off x="7763536" y="3788890"/>
+                <a:ext cx="1440160" cy="300"/>
+              </a:xfrm>
+              <a:prstGeom prst="straightConnector1">
+                <a:avLst/>
+              </a:prstGeom>
+              <a:ln w="63500">
+                <a:solidFill>
+                  <a:schemeClr val="tx1"/>
+                </a:solidFill>
+                <a:tailEnd type="arrow"/>
+              </a:ln>
+            </p:spPr>
+            <p:style>
+              <a:lnRef idx="1">
+                <a:schemeClr val="accent1"/>
+              </a:lnRef>
+              <a:fillRef idx="0">
+                <a:schemeClr val="accent1"/>
+              </a:fillRef>
+              <a:effectRef idx="0">
+                <a:schemeClr val="accent1"/>
+              </a:effectRef>
+              <a:fontRef idx="minor">
+                <a:schemeClr val="tx1"/>
+              </a:fontRef>
+            </p:style>
+          </p:cxnSp>
+        </p:grpSp>
+      </p:grpSp>
+      <p:sp>
+        <p:nvSpPr>
+          <p:cNvPr id="27" name="Rectangle 3"/>
+          <p:cNvSpPr>
+            <a:spLocks noChangeArrowheads="1"/>
+          </p:cNvSpPr>
+          <p:nvPr/>
+        </p:nvSpPr>
+        <p:spPr bwMode="auto">
+          <a:xfrm>
+            <a:off x="6240520" y="693284"/>
+            <a:ext cx="4203750" cy="432427"/>
+          </a:xfrm>
+          <a:prstGeom prst="rect">
+            <a:avLst/>
+          </a:prstGeom>
+          <a:solidFill>
+            <a:schemeClr val="bg1"/>
+          </a:solidFill>
+          <a:ln>
+            <a:noFill/>
+          </a:ln>
+          <a:effectLst/>
+        </p:spPr>
+        <p:txBody>
+          <a:bodyPr anchor="ctr"/>
+          <a:lstStyle/>
+          <a:p>
+            <a:pPr algn="ctr"/>
+            <a:r>
+              <a:rPr lang="en-US" sz="2000" dirty="0">
+                <a:latin typeface="Trebuchet MS" pitchFamily="34" charset="0"/>
+              </a:rPr>
+              <a:t>MERLIN spectrometer (ISIS)</a:t>
+            </a:r>
+          </a:p>
+        </p:txBody>
+      </p:sp>
+      <p:sp>
+        <p:nvSpPr>
+          <p:cNvPr id="29" name="Rectangle 27"/>
+          <p:cNvSpPr>
+            <a:spLocks noChangeArrowheads="1"/>
+          </p:cNvSpPr>
+          <p:nvPr/>
+        </p:nvSpPr>
+        <p:spPr bwMode="auto">
+          <a:xfrm>
+            <a:off x="1631504" y="40792"/>
+            <a:ext cx="7640291" cy="811213"/>
+          </a:xfrm>
+          <a:prstGeom prst="rect">
+            <a:avLst/>
+          </a:prstGeom>
+          <a:noFill/>
+          <a:ln w="9525">
+            <a:noFill/>
+            <a:miter lim="800000"/>
+            <a:headEnd/>
+            <a:tailEnd/>
+          </a:ln>
+        </p:spPr>
+        <p:txBody>
+          <a:bodyPr anchor="ctr"/>
+          <a:lstStyle/>
+          <a:p>
+            <a:pPr defTabSz="762000"/>
+            <a:r>
+              <a:rPr lang="en-GB" sz="3200" b="1" dirty="0">
+                <a:solidFill>
+                  <a:srgbClr val="666699"/>
+                </a:solidFill>
+              </a:rPr>
+              <a:t>Measuring Excitations</a:t>
+            </a:r>
+          </a:p>
+        </p:txBody>
+      </p:sp>
+    </p:spTree>
+    <p:extLst>
+      <p:ext uri="{BB962C8B-B14F-4D97-AF65-F5344CB8AC3E}">
+        <p14:creationId xmlns:p14="http://schemas.microsoft.com/office/powerpoint/2010/main" val="2906114465"/>
+      </p:ext>
+    </p:extLst>
+  </p:cSld>
+  <p:clrMapOvr>
+    <a:masterClrMapping/>
+  </p:clrMapOvr>
+  <p:timing>
+    <p:tnLst>
+      <p:par>
+        <p:cTn id="1" dur="indefinite" restart="never" nodeType="tmRoot">
+          <p:childTnLst>
+            <p:seq concurrent="1" nextAc="seek">
+              <p:cTn id="2" dur="indefinite" nodeType="mainSeq">
+                <p:childTnLst>
+                  <p:par>
+                    <p:cTn id="3" fill="hold">
+                      <p:stCondLst>
+                        <p:cond delay="indefinite"/>
+                      </p:stCondLst>
+                      <p:childTnLst>
+                        <p:par>
+                          <p:cTn id="4" fill="hold">
+                            <p:stCondLst>
+                              <p:cond delay="0"/>
+                            </p:stCondLst>
+                            <p:childTnLst>
+                              <p:par>
+                                <p:cTn id="5" presetID="1" presetClass="entr" presetSubtype="0" fill="hold" nodeType="clickEffect">
+                                  <p:stCondLst>
+                                    <p:cond delay="0"/>
+                                  </p:stCondLst>
+                                  <p:childTnLst>
+                                    <p:set>
+                                      <p:cBhvr>
+                                        <p:cTn id="6" dur="1" fill="hold">
+                                          <p:stCondLst>
+                                            <p:cond delay="0"/>
+                                          </p:stCondLst>
+                                        </p:cTn>
+                                        <p:tgtEl>
+                                          <p:spTgt spid="3"/>
+                                        </p:tgtEl>
+                                        <p:attrNameLst>
+                                          <p:attrName>style.visibility</p:attrName>
+                                        </p:attrNameLst>
+                                      </p:cBhvr>
+                                      <p:to>
+                                        <p:strVal val="visible"/>
+                                      </p:to>
+                                    </p:set>
+                                  </p:childTnLst>
+                                </p:cTn>
+                              </p:par>
+                            </p:childTnLst>
+                          </p:cTn>
+                        </p:par>
+                      </p:childTnLst>
+                    </p:cTn>
+                  </p:par>
+                  <p:par>
+                    <p:cTn id="7" fill="hold">
+                      <p:stCondLst>
+                        <p:cond delay="indefinite"/>
+                      </p:stCondLst>
+                      <p:childTnLst>
+                        <p:par>
+                          <p:cTn id="8" fill="hold">
+                            <p:stCondLst>
+                              <p:cond delay="0"/>
+                            </p:stCondLst>
+                            <p:childTnLst>
+                              <p:par>
+                                <p:cTn id="9" presetID="1" presetClass="entr" presetSubtype="0" fill="hold" nodeType="clickEffect">
+                                  <p:stCondLst>
+                                    <p:cond delay="0"/>
+                                  </p:stCondLst>
+                                  <p:childTnLst>
+                                    <p:set>
+                                      <p:cBhvr>
+                                        <p:cTn id="10" dur="1" fill="hold">
+                                          <p:stCondLst>
+                                            <p:cond delay="0"/>
+                                          </p:stCondLst>
+                                        </p:cTn>
+                                        <p:tgtEl>
+                                          <p:spTgt spid="43"/>
+                                        </p:tgtEl>
+                                        <p:attrNameLst>
+                                          <p:attrName>style.visibility</p:attrName>
+                                        </p:attrNameLst>
+                                      </p:cBhvr>
+                                      <p:to>
+                                        <p:strVal val="visible"/>
+                                      </p:to>
+                                    </p:set>
+                                  </p:childTnLst>
+                                </p:cTn>
+                              </p:par>
+                            </p:childTnLst>
+                          </p:cTn>
+                        </p:par>
+                      </p:childTnLst>
+                    </p:cTn>
+                  </p:par>
+                  <p:par>
+                    <p:cTn id="11" fill="hold">
+                      <p:stCondLst>
+                        <p:cond delay="indefinite"/>
+                      </p:stCondLst>
+                      <p:childTnLst>
+                        <p:par>
+                          <p:cTn id="12" fill="hold">
+                            <p:stCondLst>
+                              <p:cond delay="0"/>
+                            </p:stCondLst>
+                            <p:childTnLst>
+                              <p:par>
+                                <p:cTn id="13" presetID="1" presetClass="entr" presetSubtype="0" fill="hold" nodeType="clickEffect">
+                                  <p:stCondLst>
+                                    <p:cond delay="0"/>
+                                  </p:stCondLst>
+                                  <p:childTnLst>
+                                    <p:set>
+                                      <p:cBhvr>
+                                        <p:cTn id="14" dur="1" fill="hold">
+                                          <p:stCondLst>
+                                            <p:cond delay="0"/>
+                                          </p:stCondLst>
+                                        </p:cTn>
+                                        <p:tgtEl>
+                                          <p:spTgt spid="10"/>
+                                        </p:tgtEl>
+                                        <p:attrNameLst>
+                                          <p:attrName>style.visibility</p:attrName>
+                                        </p:attrNameLst>
+                                      </p:cBhvr>
+                                      <p:to>
+                                        <p:strVal val="visible"/>
+                                      </p:to>
+                                    </p:set>
+                                  </p:childTnLst>
+                                </p:cTn>
+                              </p:par>
+                            </p:childTnLst>
+                          </p:cTn>
+                        </p:par>
+                      </p:childTnLst>
+                    </p:cTn>
+                  </p:par>
+                  <p:par>
+                    <p:cTn id="15" fill="hold">
+                      <p:stCondLst>
+                        <p:cond delay="indefinite"/>
+                      </p:stCondLst>
+                      <p:childTnLst>
+                        <p:par>
+                          <p:cTn id="16" fill="hold">
+                            <p:stCondLst>
+                              <p:cond delay="0"/>
+                            </p:stCondLst>
+                            <p:childTnLst>
+                              <p:par>
+                                <p:cTn id="17" presetID="1" presetClass="entr" presetSubtype="0" fill="hold" nodeType="clickEffect">
+                                  <p:stCondLst>
+                                    <p:cond delay="0"/>
+                                  </p:stCondLst>
+                                  <p:childTnLst>
+                                    <p:set>
+                                      <p:cBhvr>
+                                        <p:cTn id="18" dur="1" fill="hold">
+                                          <p:stCondLst>
+                                            <p:cond delay="0"/>
+                                          </p:stCondLst>
+                                        </p:cTn>
+                                        <p:tgtEl>
+                                          <p:spTgt spid="23"/>
+                                        </p:tgtEl>
+                                        <p:attrNameLst>
+                                          <p:attrName>style.visibility</p:attrName>
+                                        </p:attrNameLst>
+                                      </p:cBhvr>
+                                      <p:to>
+                                        <p:strVal val="visible"/>
+                                      </p:to>
+                                    </p:set>
+                                  </p:childTnLst>
+                                </p:cTn>
+                              </p:par>
+                            </p:childTnLst>
+                          </p:cTn>
+                        </p:par>
+                      </p:childTnLst>
+                    </p:cTn>
+                  </p:par>
+                </p:childTnLst>
+              </p:cTn>
+              <p:prevCondLst>
+                <p:cond evt="onPrev" delay="0">
+                  <p:tgtEl>
+                    <p:sldTgt/>
+                  </p:tgtEl>
+                </p:cond>
+              </p:prevCondLst>
+              <p:nextCondLst>
+                <p:cond evt="onNext" delay="0">
+                  <p:tgtEl>
+                    <p:sldTgt/>
+                  </p:tgtEl>
+                </p:cond>
+              </p:nextCondLst>
+            </p:seq>
+          </p:childTnLst>
+        </p:cTn>
+      </p:par>
+    </p:tnLst>
+  </p:timing>
+</p:sld>
+</file>
+
+<file path=ppt/slides/slide4.xml><?xml version="1.0" encoding="utf-8"?>
+<p:sld xmlns:a="http://schemas.openxmlformats.org/drawingml/2006/main" xmlns:r="http://schemas.openxmlformats.org/officeDocument/2006/relationships" xmlns:p="http://schemas.openxmlformats.org/presentationml/2006/main">
+  <p:cSld>
+    <p:spTree>
+      <p:nvGrpSpPr>
         <p:cNvPr id="1" name="">
           <a:extLst>
             <a:ext uri="{FF2B5EF4-FFF2-40B4-BE49-F238E27FC236}">
@@ -20217,7 +21553,7 @@
 </p:sld>
 </file>
 
-<file path=ppt/slides/slide4.xml><?xml version="1.0" encoding="utf-8"?>
+<file path=ppt/slides/slide5.xml><?xml version="1.0" encoding="utf-8"?>
 <p:sld xmlns:a="http://schemas.openxmlformats.org/drawingml/2006/main" xmlns:r="http://schemas.openxmlformats.org/officeDocument/2006/relationships" xmlns:p="http://schemas.openxmlformats.org/presentationml/2006/main">
   <p:cSld>
     <p:spTree>
@@ -22251,7 +23587,7 @@
 </p:sld>
 </file>
 
-<file path=ppt/slides/slide5.xml><?xml version="1.0" encoding="utf-8"?>
+<file path=ppt/slides/slide6.xml><?xml version="1.0" encoding="utf-8"?>
 <p:sld xmlns:a="http://schemas.openxmlformats.org/drawingml/2006/main" xmlns:r="http://schemas.openxmlformats.org/officeDocument/2006/relationships" xmlns:p="http://schemas.openxmlformats.org/presentationml/2006/main">
   <p:cSld>
     <p:spTree>
@@ -24257,7 +25593,7 @@
 </p:sld>
 </file>
 
-<file path=ppt/slides/slide6.xml><?xml version="1.0" encoding="utf-8"?>
+<file path=ppt/slides/slide7.xml><?xml version="1.0" encoding="utf-8"?>
 <p:sld xmlns:a="http://schemas.openxmlformats.org/drawingml/2006/main" xmlns:r="http://schemas.openxmlformats.org/officeDocument/2006/relationships" xmlns:p="http://schemas.openxmlformats.org/presentationml/2006/main">
   <p:cSld>
     <p:spTree>
@@ -25235,7 +26571,7 @@
 </p:sld>
 </file>
 
-<file path=ppt/slides/slide7.xml><?xml version="1.0" encoding="utf-8"?>
+<file path=ppt/slides/slide8.xml><?xml version="1.0" encoding="utf-8"?>
 <p:sld xmlns:a="http://schemas.openxmlformats.org/drawingml/2006/main" xmlns:r="http://schemas.openxmlformats.org/officeDocument/2006/relationships" xmlns:p="http://schemas.openxmlformats.org/presentationml/2006/main">
   <p:cSld>
     <p:spTree>
@@ -25443,7 +26779,7 @@
 </p:sld>
 </file>
 
-<file path=ppt/slides/slide8.xml><?xml version="1.0" encoding="utf-8"?>
+<file path=ppt/slides/slide9.xml><?xml version="1.0" encoding="utf-8"?>
 <p:sld xmlns:a="http://schemas.openxmlformats.org/drawingml/2006/main" xmlns:r="http://schemas.openxmlformats.org/officeDocument/2006/relationships" xmlns:p="http://schemas.openxmlformats.org/presentationml/2006/main">
   <p:cSld>
     <p:spTree>
@@ -26803,781 +28139,6 @@
     <p:extLst>
       <p:ext uri="{BB962C8B-B14F-4D97-AF65-F5344CB8AC3E}">
         <p14:creationId xmlns:p14="http://schemas.microsoft.com/office/powerpoint/2010/main" val="67218123"/>
-      </p:ext>
-    </p:extLst>
-  </p:cSld>
-  <p:clrMapOvr>
-    <a:masterClrMapping/>
-  </p:clrMapOvr>
-</p:sld>
-</file>
-
-<file path=ppt/slides/slide9.xml><?xml version="1.0" encoding="utf-8"?>
-<p:sld xmlns:a="http://schemas.openxmlformats.org/drawingml/2006/main" xmlns:r="http://schemas.openxmlformats.org/officeDocument/2006/relationships" xmlns:p="http://schemas.openxmlformats.org/presentationml/2006/main">
-  <p:cSld>
-    <p:spTree>
-      <p:nvGrpSpPr>
-        <p:cNvPr id="1" name="">
-          <a:extLst>
-            <a:ext uri="{FF2B5EF4-FFF2-40B4-BE49-F238E27FC236}">
-              <a16:creationId xmlns:a16="http://schemas.microsoft.com/office/drawing/2014/main" id="{D9DC687F-AB89-1C3C-604A-4B4298546BDA}"/>
-            </a:ext>
-          </a:extLst>
-        </p:cNvPr>
-        <p:cNvGrpSpPr/>
-        <p:nvPr/>
-      </p:nvGrpSpPr>
-      <p:grpSpPr>
-        <a:xfrm>
-          <a:off x="0" y="0"/>
-          <a:ext cx="0" cy="0"/>
-          <a:chOff x="0" y="0"/>
-          <a:chExt cx="0" cy="0"/>
-        </a:xfrm>
-      </p:grpSpPr>
-      <p:sp>
-        <p:nvSpPr>
-          <p:cNvPr id="9" name="TextBox 8">
-            <a:extLst>
-              <a:ext uri="{FF2B5EF4-FFF2-40B4-BE49-F238E27FC236}">
-                <a16:creationId xmlns:a16="http://schemas.microsoft.com/office/drawing/2014/main" id="{2031B0D7-CDA0-A8A2-5632-360DE9CC564E}"/>
-              </a:ext>
-            </a:extLst>
-          </p:cNvPr>
-          <p:cNvSpPr txBox="1"/>
-          <p:nvPr/>
-        </p:nvSpPr>
-        <p:spPr>
-          <a:xfrm>
-            <a:off x="4320367" y="269358"/>
-            <a:ext cx="3318537" cy="523220"/>
-          </a:xfrm>
-          <a:prstGeom prst="rect">
-            <a:avLst/>
-          </a:prstGeom>
-          <a:noFill/>
-        </p:spPr>
-        <p:txBody>
-          <a:bodyPr wrap="none" rtlCol="0">
-            <a:spAutoFit/>
-          </a:bodyPr>
-          <a:lstStyle/>
-          <a:p>
-            <a:r>
-              <a:rPr lang="en-GB" sz="2800" dirty="0">
-                <a:latin typeface="+mj-lt"/>
-              </a:rPr>
-              <a:t>HORACE structure:</a:t>
-            </a:r>
-          </a:p>
-        </p:txBody>
-      </p:sp>
-      <p:grpSp>
-        <p:nvGrpSpPr>
-          <p:cNvPr id="17" name="Group 16">
-            <a:extLst>
-              <a:ext uri="{FF2B5EF4-FFF2-40B4-BE49-F238E27FC236}">
-                <a16:creationId xmlns:a16="http://schemas.microsoft.com/office/drawing/2014/main" id="{7D8AF87B-60EE-9AA7-FDB4-B7376FCFDFD5}"/>
-              </a:ext>
-            </a:extLst>
-          </p:cNvPr>
-          <p:cNvGrpSpPr/>
-          <p:nvPr/>
-        </p:nvGrpSpPr>
-        <p:grpSpPr>
-          <a:xfrm>
-            <a:off x="680482" y="1470835"/>
-            <a:ext cx="3062177" cy="3987210"/>
-            <a:chOff x="680482" y="861237"/>
-            <a:chExt cx="3062177" cy="3987210"/>
-          </a:xfrm>
-        </p:grpSpPr>
-        <p:sp>
-          <p:nvSpPr>
-            <p:cNvPr id="13" name="Rectangle 12">
-              <a:extLst>
-                <a:ext uri="{FF2B5EF4-FFF2-40B4-BE49-F238E27FC236}">
-                  <a16:creationId xmlns:a16="http://schemas.microsoft.com/office/drawing/2014/main" id="{E256D75B-6D3A-0E44-D86D-7E64C372EAED}"/>
-                </a:ext>
-              </a:extLst>
-            </p:cNvPr>
-            <p:cNvSpPr/>
-            <p:nvPr/>
-          </p:nvSpPr>
-          <p:spPr>
-            <a:xfrm>
-              <a:off x="680482" y="861237"/>
-              <a:ext cx="3062177" cy="3987210"/>
-            </a:xfrm>
-            <a:prstGeom prst="rect">
-              <a:avLst/>
-            </a:prstGeom>
-            <a:pattFill prst="pct5">
-              <a:fgClr>
-                <a:schemeClr val="accent6">
-                  <a:lumMod val="40000"/>
-                  <a:lumOff val="60000"/>
-                </a:schemeClr>
-              </a:fgClr>
-              <a:bgClr>
-                <a:schemeClr val="bg1"/>
-              </a:bgClr>
-            </a:pattFill>
-          </p:spPr>
-          <p:style>
-            <a:lnRef idx="2">
-              <a:schemeClr val="accent1">
-                <a:shade val="15000"/>
-              </a:schemeClr>
-            </a:lnRef>
-            <a:fillRef idx="1">
-              <a:schemeClr val="accent1"/>
-            </a:fillRef>
-            <a:effectRef idx="0">
-              <a:schemeClr val="accent1"/>
-            </a:effectRef>
-            <a:fontRef idx="minor">
-              <a:schemeClr val="lt1"/>
-            </a:fontRef>
-          </p:style>
-          <p:txBody>
-            <a:bodyPr rtlCol="0" anchor="t" anchorCtr="0"/>
-            <a:lstStyle/>
-            <a:p>
-              <a:pPr algn="ctr"/>
-              <a:r>
-                <a:rPr lang="en-GB" dirty="0">
-                  <a:solidFill>
-                    <a:schemeClr val="tx1"/>
-                  </a:solidFill>
-                </a:rPr>
-                <a:t>SQW object (Filebacked)</a:t>
-              </a:r>
-            </a:p>
-          </p:txBody>
-        </p:sp>
-        <p:sp>
-          <p:nvSpPr>
-            <p:cNvPr id="10" name="Rectangle 9">
-              <a:extLst>
-                <a:ext uri="{FF2B5EF4-FFF2-40B4-BE49-F238E27FC236}">
-                  <a16:creationId xmlns:a16="http://schemas.microsoft.com/office/drawing/2014/main" id="{43C57F1E-84CF-864B-9BC0-EB0DD40BF2C1}"/>
-                </a:ext>
-              </a:extLst>
-            </p:cNvPr>
-            <p:cNvSpPr/>
-            <p:nvPr/>
-          </p:nvSpPr>
-          <p:spPr>
-            <a:xfrm>
-              <a:off x="812815" y="1389321"/>
-              <a:ext cx="1821711" cy="1105786"/>
-            </a:xfrm>
-            <a:prstGeom prst="rect">
-              <a:avLst/>
-            </a:prstGeom>
-          </p:spPr>
-          <p:style>
-            <a:lnRef idx="2">
-              <a:schemeClr val="accent1">
-                <a:shade val="15000"/>
-              </a:schemeClr>
-            </a:lnRef>
-            <a:fillRef idx="1">
-              <a:schemeClr val="accent1"/>
-            </a:fillRef>
-            <a:effectRef idx="0">
-              <a:schemeClr val="accent1"/>
-            </a:effectRef>
-            <a:fontRef idx="minor">
-              <a:schemeClr val="lt1"/>
-            </a:fontRef>
-          </p:style>
-          <p:txBody>
-            <a:bodyPr rtlCol="0" anchor="ctr"/>
-            <a:lstStyle/>
-            <a:p>
-              <a:pPr algn="ctr"/>
-              <a:r>
-                <a:rPr lang="en-GB" dirty="0"/>
-                <a:t>1-4D image in reciprocal coordinate system</a:t>
-              </a:r>
-            </a:p>
-          </p:txBody>
-        </p:sp>
-        <p:sp>
-          <p:nvSpPr>
-            <p:cNvPr id="11" name="Rectangle 10">
-              <a:extLst>
-                <a:ext uri="{FF2B5EF4-FFF2-40B4-BE49-F238E27FC236}">
-                  <a16:creationId xmlns:a16="http://schemas.microsoft.com/office/drawing/2014/main" id="{9D7CABBA-857E-414F-A3C2-09639526CB5C}"/>
-                </a:ext>
-              </a:extLst>
-            </p:cNvPr>
-            <p:cNvSpPr/>
-            <p:nvPr/>
-          </p:nvSpPr>
-          <p:spPr>
-            <a:xfrm>
-              <a:off x="826991" y="2750288"/>
-              <a:ext cx="1821711" cy="708837"/>
-            </a:xfrm>
-            <a:prstGeom prst="rect">
-              <a:avLst/>
-            </a:prstGeom>
-          </p:spPr>
-          <p:style>
-            <a:lnRef idx="2">
-              <a:schemeClr val="accent1">
-                <a:shade val="15000"/>
-              </a:schemeClr>
-            </a:lnRef>
-            <a:fillRef idx="1">
-              <a:schemeClr val="accent1"/>
-            </a:fillRef>
-            <a:effectRef idx="0">
-              <a:schemeClr val="accent1"/>
-            </a:effectRef>
-            <a:fontRef idx="minor">
-              <a:schemeClr val="lt1"/>
-            </a:fontRef>
-          </p:style>
-          <p:txBody>
-            <a:bodyPr rtlCol="0" anchor="ctr"/>
-            <a:lstStyle/>
-            <a:p>
-              <a:pPr algn="ctr"/>
-              <a:r>
-                <a:rPr lang="en-GB" dirty="0"/>
-                <a:t>Experiment info</a:t>
-              </a:r>
-            </a:p>
-          </p:txBody>
-        </p:sp>
-        <p:sp>
-          <p:nvSpPr>
-            <p:cNvPr id="12" name="Rectangle 11">
-              <a:extLst>
-                <a:ext uri="{FF2B5EF4-FFF2-40B4-BE49-F238E27FC236}">
-                  <a16:creationId xmlns:a16="http://schemas.microsoft.com/office/drawing/2014/main" id="{F0F7B7AD-16D6-731C-9378-AEA6F8F5FADA}"/>
-                </a:ext>
-              </a:extLst>
-            </p:cNvPr>
-            <p:cNvSpPr/>
-            <p:nvPr/>
-          </p:nvSpPr>
-          <p:spPr>
-            <a:xfrm>
-              <a:off x="797452" y="3802025"/>
-              <a:ext cx="1821711" cy="708837"/>
-            </a:xfrm>
-            <a:prstGeom prst="rect">
-              <a:avLst/>
-            </a:prstGeom>
-          </p:spPr>
-          <p:style>
-            <a:lnRef idx="2">
-              <a:schemeClr val="accent1">
-                <a:shade val="15000"/>
-              </a:schemeClr>
-            </a:lnRef>
-            <a:fillRef idx="1">
-              <a:schemeClr val="accent1"/>
-            </a:fillRef>
-            <a:effectRef idx="0">
-              <a:schemeClr val="accent1"/>
-            </a:effectRef>
-            <a:fontRef idx="minor">
-              <a:schemeClr val="lt1"/>
-            </a:fontRef>
-          </p:style>
-          <p:txBody>
-            <a:bodyPr rtlCol="0" anchor="ctr"/>
-            <a:lstStyle/>
-            <a:p>
-              <a:pPr algn="ctr"/>
-              <a:r>
-                <a:rPr lang="en-GB" dirty="0"/>
-                <a:t>Pixels (All neutron events)</a:t>
-              </a:r>
-            </a:p>
-          </p:txBody>
-        </p:sp>
-      </p:grpSp>
-      <p:sp>
-        <p:nvSpPr>
-          <p:cNvPr id="14" name="Rectangle 13">
-            <a:extLst>
-              <a:ext uri="{FF2B5EF4-FFF2-40B4-BE49-F238E27FC236}">
-                <a16:creationId xmlns:a16="http://schemas.microsoft.com/office/drawing/2014/main" id="{00BC3FC8-8175-3715-73F7-F7A35C449EC9}"/>
-              </a:ext>
-            </a:extLst>
-          </p:cNvPr>
-          <p:cNvSpPr/>
-          <p:nvPr/>
-        </p:nvSpPr>
-        <p:spPr>
-          <a:xfrm>
-            <a:off x="4325681" y="4031510"/>
-            <a:ext cx="3062177" cy="1454889"/>
-          </a:xfrm>
-          <a:prstGeom prst="rect">
-            <a:avLst/>
-          </a:prstGeom>
-          <a:pattFill prst="pct5">
-            <a:fgClr>
-              <a:schemeClr val="accent6">
-                <a:lumMod val="40000"/>
-                <a:lumOff val="60000"/>
-              </a:schemeClr>
-            </a:fgClr>
-            <a:bgClr>
-              <a:schemeClr val="bg1"/>
-            </a:bgClr>
-          </a:pattFill>
-        </p:spPr>
-        <p:style>
-          <a:lnRef idx="2">
-            <a:schemeClr val="accent1">
-              <a:shade val="15000"/>
-            </a:schemeClr>
-          </a:lnRef>
-          <a:fillRef idx="1">
-            <a:schemeClr val="accent1"/>
-          </a:fillRef>
-          <a:effectRef idx="0">
-            <a:schemeClr val="accent1"/>
-          </a:effectRef>
-          <a:fontRef idx="minor">
-            <a:schemeClr val="lt1"/>
-          </a:fontRef>
-        </p:style>
-        <p:txBody>
-          <a:bodyPr rtlCol="0" anchor="t" anchorCtr="0"/>
-          <a:lstStyle/>
-          <a:p>
-            <a:pPr algn="ctr"/>
-            <a:r>
-              <a:rPr lang="en-GB" dirty="0" err="1">
-                <a:solidFill>
-                  <a:schemeClr val="tx1"/>
-                </a:solidFill>
-              </a:rPr>
-              <a:t>Multifit</a:t>
-            </a:r>
-            <a:endParaRPr lang="en-GB" dirty="0">
-              <a:solidFill>
-                <a:schemeClr val="tx1"/>
-              </a:solidFill>
-            </a:endParaRPr>
-          </a:p>
-          <a:p>
-            <a:pPr algn="ctr"/>
-            <a:endParaRPr lang="en-GB" dirty="0">
-              <a:solidFill>
-                <a:schemeClr val="tx1"/>
-              </a:solidFill>
-            </a:endParaRPr>
-          </a:p>
-          <a:p>
-            <a:pPr algn="ctr"/>
-            <a:r>
-              <a:rPr lang="en-GB" dirty="0">
-                <a:solidFill>
-                  <a:schemeClr val="tx1"/>
-                </a:solidFill>
-              </a:rPr>
-              <a:t>Fitting engine</a:t>
-            </a:r>
-          </a:p>
-        </p:txBody>
-      </p:sp>
-      <p:sp>
-        <p:nvSpPr>
-          <p:cNvPr id="15" name="Rectangle 14">
-            <a:extLst>
-              <a:ext uri="{FF2B5EF4-FFF2-40B4-BE49-F238E27FC236}">
-                <a16:creationId xmlns:a16="http://schemas.microsoft.com/office/drawing/2014/main" id="{F6AA3292-84FA-54CA-FFFA-2F4E195E7AB2}"/>
-              </a:ext>
-            </a:extLst>
-          </p:cNvPr>
-          <p:cNvSpPr/>
-          <p:nvPr/>
-        </p:nvSpPr>
-        <p:spPr>
-          <a:xfrm>
-            <a:off x="7836194" y="1463747"/>
-            <a:ext cx="3062177" cy="3987210"/>
-          </a:xfrm>
-          <a:prstGeom prst="rect">
-            <a:avLst/>
-          </a:prstGeom>
-          <a:pattFill prst="pct5">
-            <a:fgClr>
-              <a:schemeClr val="accent6">
-                <a:lumMod val="40000"/>
-                <a:lumOff val="60000"/>
-              </a:schemeClr>
-            </a:fgClr>
-            <a:bgClr>
-              <a:schemeClr val="bg1"/>
-            </a:bgClr>
-          </a:pattFill>
-        </p:spPr>
-        <p:style>
-          <a:lnRef idx="2">
-            <a:schemeClr val="accent1">
-              <a:shade val="15000"/>
-            </a:schemeClr>
-          </a:lnRef>
-          <a:fillRef idx="1">
-            <a:schemeClr val="accent1"/>
-          </a:fillRef>
-          <a:effectRef idx="0">
-            <a:schemeClr val="accent1"/>
-          </a:effectRef>
-          <a:fontRef idx="minor">
-            <a:schemeClr val="lt1"/>
-          </a:fontRef>
-        </p:style>
-        <p:txBody>
-          <a:bodyPr rtlCol="0" anchor="t" anchorCtr="0"/>
-          <a:lstStyle/>
-          <a:p>
-            <a:pPr algn="ctr"/>
-            <a:r>
-              <a:rPr lang="en-GB" dirty="0" err="1">
-                <a:solidFill>
-                  <a:schemeClr val="tx1"/>
-                </a:solidFill>
-              </a:rPr>
-              <a:t>Tobyfit</a:t>
-            </a:r>
-            <a:endParaRPr lang="en-GB" dirty="0">
-              <a:solidFill>
-                <a:schemeClr val="tx1"/>
-              </a:solidFill>
-            </a:endParaRPr>
-          </a:p>
-          <a:p>
-            <a:pPr algn="ctr"/>
-            <a:endParaRPr lang="en-GB" dirty="0">
-              <a:solidFill>
-                <a:schemeClr val="tx1"/>
-              </a:solidFill>
-            </a:endParaRPr>
-          </a:p>
-          <a:p>
-            <a:pPr algn="ctr"/>
-            <a:r>
-              <a:rPr lang="en-GB" dirty="0">
-                <a:solidFill>
-                  <a:schemeClr val="tx1"/>
-                </a:solidFill>
-              </a:rPr>
-              <a:t>Instrument info</a:t>
-            </a:r>
-          </a:p>
-          <a:p>
-            <a:pPr algn="ctr"/>
-            <a:endParaRPr lang="en-GB" dirty="0">
-              <a:solidFill>
-                <a:schemeClr val="tx1"/>
-              </a:solidFill>
-            </a:endParaRPr>
-          </a:p>
-          <a:p>
-            <a:pPr algn="ctr"/>
-            <a:r>
-              <a:rPr lang="en-GB" dirty="0">
-                <a:solidFill>
-                  <a:schemeClr val="tx1"/>
-                </a:solidFill>
-              </a:rPr>
-              <a:t>ISIS instruments models</a:t>
-            </a:r>
-          </a:p>
-          <a:p>
-            <a:pPr algn="ctr"/>
-            <a:endParaRPr lang="en-GB" dirty="0">
-              <a:solidFill>
-                <a:schemeClr val="tx1"/>
-              </a:solidFill>
-            </a:endParaRPr>
-          </a:p>
-          <a:p>
-            <a:pPr algn="ctr"/>
-            <a:r>
-              <a:rPr lang="en-GB" dirty="0">
-                <a:solidFill>
-                  <a:schemeClr val="tx1"/>
-                </a:solidFill>
-              </a:rPr>
-              <a:t>Resolution function &amp; Resolution convolution</a:t>
-            </a:r>
-          </a:p>
-        </p:txBody>
-      </p:sp>
-      <p:sp>
-        <p:nvSpPr>
-          <p:cNvPr id="16" name="Rectangle 15">
-            <a:extLst>
-              <a:ext uri="{FF2B5EF4-FFF2-40B4-BE49-F238E27FC236}">
-                <a16:creationId xmlns:a16="http://schemas.microsoft.com/office/drawing/2014/main" id="{70215B1F-1E26-B6D0-59FC-01B3BBEAF285}"/>
-              </a:ext>
-            </a:extLst>
-          </p:cNvPr>
-          <p:cNvSpPr/>
-          <p:nvPr/>
-        </p:nvSpPr>
-        <p:spPr>
-          <a:xfrm>
-            <a:off x="4325681" y="1463747"/>
-            <a:ext cx="3062177" cy="1454889"/>
-          </a:xfrm>
-          <a:prstGeom prst="rect">
-            <a:avLst/>
-          </a:prstGeom>
-          <a:pattFill prst="pct5">
-            <a:fgClr>
-              <a:schemeClr val="accent6">
-                <a:lumMod val="40000"/>
-                <a:lumOff val="60000"/>
-              </a:schemeClr>
-            </a:fgClr>
-            <a:bgClr>
-              <a:schemeClr val="bg1"/>
-            </a:bgClr>
-          </a:pattFill>
-        </p:spPr>
-        <p:style>
-          <a:lnRef idx="2">
-            <a:schemeClr val="accent1">
-              <a:shade val="15000"/>
-            </a:schemeClr>
-          </a:lnRef>
-          <a:fillRef idx="1">
-            <a:schemeClr val="accent1"/>
-          </a:fillRef>
-          <a:effectRef idx="0">
-            <a:schemeClr val="accent1"/>
-          </a:effectRef>
-          <a:fontRef idx="minor">
-            <a:schemeClr val="lt1"/>
-          </a:fontRef>
-        </p:style>
-        <p:txBody>
-          <a:bodyPr rtlCol="0" anchor="t" anchorCtr="0"/>
-          <a:lstStyle/>
-          <a:p>
-            <a:pPr algn="ctr"/>
-            <a:r>
-              <a:rPr lang="en-GB" dirty="0">
-                <a:solidFill>
-                  <a:schemeClr val="tx1"/>
-                </a:solidFill>
-              </a:rPr>
-              <a:t>Algorithms to operate with sqw object</a:t>
-            </a:r>
-          </a:p>
-          <a:p>
-            <a:pPr algn="ctr"/>
-            <a:endParaRPr lang="en-GB" dirty="0">
-              <a:solidFill>
-                <a:schemeClr val="tx1"/>
-              </a:solidFill>
-            </a:endParaRPr>
-          </a:p>
-          <a:p>
-            <a:pPr algn="ctr"/>
-            <a:r>
-              <a:rPr lang="en-GB" dirty="0">
-                <a:solidFill>
-                  <a:schemeClr val="tx1"/>
-                </a:solidFill>
-              </a:rPr>
-              <a:t>CUT</a:t>
-            </a:r>
-          </a:p>
-          <a:p>
-            <a:pPr algn="ctr"/>
-            <a:r>
-              <a:rPr lang="en-GB" dirty="0">
-                <a:solidFill>
-                  <a:schemeClr val="tx1"/>
-                </a:solidFill>
-              </a:rPr>
-              <a:t>plot</a:t>
-            </a:r>
-          </a:p>
-        </p:txBody>
-      </p:sp>
-      <p:cxnSp>
-        <p:nvCxnSpPr>
-          <p:cNvPr id="19" name="Connector: Elbow 18">
-            <a:extLst>
-              <a:ext uri="{FF2B5EF4-FFF2-40B4-BE49-F238E27FC236}">
-                <a16:creationId xmlns:a16="http://schemas.microsoft.com/office/drawing/2014/main" id="{5150F35A-513F-1A1C-ABBA-F7233E4D15AB}"/>
-              </a:ext>
-            </a:extLst>
-          </p:cNvPr>
-          <p:cNvCxnSpPr>
-            <a:stCxn id="10" idx="3"/>
-            <a:endCxn id="12" idx="3"/>
-          </p:cNvCxnSpPr>
-          <p:nvPr/>
-        </p:nvCxnSpPr>
-        <p:spPr>
-          <a:xfrm flipH="1">
-            <a:off x="2619163" y="2551812"/>
-            <a:ext cx="15363" cy="2214230"/>
-          </a:xfrm>
-          <a:prstGeom prst="bentConnector3">
-            <a:avLst>
-              <a:gd name="adj1" fmla="val -1487991"/>
-            </a:avLst>
-          </a:prstGeom>
-          <a:ln w="25400">
-            <a:headEnd type="stealth"/>
-            <a:tailEnd type="stealth"/>
-          </a:ln>
-        </p:spPr>
-        <p:style>
-          <a:lnRef idx="1">
-            <a:schemeClr val="accent1"/>
-          </a:lnRef>
-          <a:fillRef idx="0">
-            <a:schemeClr val="accent1"/>
-          </a:fillRef>
-          <a:effectRef idx="0">
-            <a:schemeClr val="accent1"/>
-          </a:effectRef>
-          <a:fontRef idx="minor">
-            <a:schemeClr val="tx1"/>
-          </a:fontRef>
-        </p:style>
-      </p:cxnSp>
-      <p:sp>
-        <p:nvSpPr>
-          <p:cNvPr id="22" name="TextBox 21">
-            <a:extLst>
-              <a:ext uri="{FF2B5EF4-FFF2-40B4-BE49-F238E27FC236}">
-                <a16:creationId xmlns:a16="http://schemas.microsoft.com/office/drawing/2014/main" id="{9758B607-85FB-8C5D-E821-954A751280EF}"/>
-              </a:ext>
-            </a:extLst>
-          </p:cNvPr>
-          <p:cNvSpPr txBox="1"/>
-          <p:nvPr/>
-        </p:nvSpPr>
-        <p:spPr>
-          <a:xfrm rot="5400000">
-            <a:off x="1067985" y="3769912"/>
-            <a:ext cx="4508204" cy="646331"/>
-          </a:xfrm>
-          <a:prstGeom prst="rect">
-            <a:avLst/>
-          </a:prstGeom>
-          <a:solidFill>
-            <a:schemeClr val="bg1"/>
-          </a:solidFill>
-          <a:ln>
-            <a:solidFill>
-              <a:srgbClr val="00B050"/>
-            </a:solidFill>
-          </a:ln>
-        </p:spPr>
-        <p:txBody>
-          <a:bodyPr wrap="square" rtlCol="0">
-            <a:spAutoFit/>
-          </a:bodyPr>
-          <a:lstStyle/>
-          <a:p>
-            <a:r>
-              <a:rPr lang="en-GB" dirty="0"/>
-              <a:t>Image is calculated as average from pixels</a:t>
-            </a:r>
-          </a:p>
-          <a:p>
-            <a:r>
-              <a:rPr lang="en-GB" dirty="0"/>
-              <a:t>and serves as the “key” for pixel database</a:t>
-            </a:r>
-          </a:p>
-        </p:txBody>
-      </p:sp>
-      <p:graphicFrame>
-        <p:nvGraphicFramePr>
-          <p:cNvPr id="24" name="Object 23">
-            <a:extLst>
-              <a:ext uri="{FF2B5EF4-FFF2-40B4-BE49-F238E27FC236}">
-                <a16:creationId xmlns:a16="http://schemas.microsoft.com/office/drawing/2014/main" id="{2E513060-6B86-182F-4AE7-E811CDF67224}"/>
-              </a:ext>
-            </a:extLst>
-          </p:cNvPr>
-          <p:cNvGraphicFramePr>
-            <a:graphicFrameLocks noChangeAspect="1"/>
-          </p:cNvGraphicFramePr>
-          <p:nvPr>
-            <p:extLst>
-              <p:ext uri="{D42A27DB-BD31-4B8C-83A1-F6EECF244321}">
-                <p14:modId xmlns:p14="http://schemas.microsoft.com/office/powerpoint/2010/main" val="1276187063"/>
-              </p:ext>
-            </p:extLst>
-          </p:nvPr>
-        </p:nvGraphicFramePr>
-        <p:xfrm>
-          <a:off x="1091423" y="874558"/>
-          <a:ext cx="1712606" cy="589189"/>
-        </p:xfrm>
-        <a:graphic>
-          <a:graphicData uri="http://schemas.openxmlformats.org/presentationml/2006/ole">
-            <mc:AlternateContent xmlns:mc="http://schemas.openxmlformats.org/markup-compatibility/2006">
-              <mc:Choice xmlns:v="urn:schemas-microsoft-com:vml" Requires="v">
-                <p:oleObj name="Equation" r:id="rId2" imgW="520560" imgH="241200" progId="Equation.DSMT4">
-                  <p:embed/>
-                </p:oleObj>
-              </mc:Choice>
-              <mc:Fallback>
-                <p:oleObj name="Equation" r:id="rId2" imgW="520560" imgH="241200" progId="Equation.DSMT4">
-                  <p:embed/>
-                  <p:pic>
-                    <p:nvPicPr>
-                      <p:cNvPr id="30" name="Object 29">
-                        <a:extLst>
-                          <a:ext uri="{FF2B5EF4-FFF2-40B4-BE49-F238E27FC236}">
-                            <a16:creationId xmlns:a16="http://schemas.microsoft.com/office/drawing/2014/main" id="{E884F9A5-E763-FAF5-BF18-2E903249B03E}"/>
-                          </a:ext>
-                        </a:extLst>
-                      </p:cNvPr>
-                      <p:cNvPicPr/>
-                      <p:nvPr/>
-                    </p:nvPicPr>
-                    <p:blipFill>
-                      <a:blip r:embed="rId3"/>
-                      <a:stretch>
-                        <a:fillRect/>
-                      </a:stretch>
-                    </p:blipFill>
-                    <p:spPr>
-                      <a:xfrm>
-                        <a:off x="1091423" y="874558"/>
-                        <a:ext cx="1712606" cy="589189"/>
-                      </a:xfrm>
-                      <a:prstGeom prst="rect">
-                        <a:avLst/>
-                      </a:prstGeom>
-                    </p:spPr>
-                  </p:pic>
-                </p:oleObj>
-              </mc:Fallback>
-            </mc:AlternateContent>
-          </a:graphicData>
-        </a:graphic>
-      </p:graphicFrame>
-    </p:spTree>
-    <p:extLst>
-      <p:ext uri="{BB962C8B-B14F-4D97-AF65-F5344CB8AC3E}">
-        <p14:creationId xmlns:p14="http://schemas.microsoft.com/office/powerpoint/2010/main" val="375699384"/>
       </p:ext>
     </p:extLst>
   </p:cSld>
@@ -28642,6 +29203,321 @@
         <a:sysClr val="window" lastClr="FFFFFF"/>
       </a:lt1>
       <a:dk2>
+        <a:srgbClr val="0E2841"/>
+      </a:dk2>
+      <a:lt2>
+        <a:srgbClr val="E8E8E8"/>
+      </a:lt2>
+      <a:accent1>
+        <a:srgbClr val="156082"/>
+      </a:accent1>
+      <a:accent2>
+        <a:srgbClr val="E97132"/>
+      </a:accent2>
+      <a:accent3>
+        <a:srgbClr val="196B24"/>
+      </a:accent3>
+      <a:accent4>
+        <a:srgbClr val="0F9ED5"/>
+      </a:accent4>
+      <a:accent5>
+        <a:srgbClr val="A02B93"/>
+      </a:accent5>
+      <a:accent6>
+        <a:srgbClr val="4EA72E"/>
+      </a:accent6>
+      <a:hlink>
+        <a:srgbClr val="467886"/>
+      </a:hlink>
+      <a:folHlink>
+        <a:srgbClr val="96607D"/>
+      </a:folHlink>
+    </a:clrScheme>
+    <a:fontScheme name="Office">
+      <a:majorFont>
+        <a:latin typeface="Aptos Display" panose="02110004020202020204"/>
+        <a:ea typeface=""/>
+        <a:cs typeface=""/>
+        <a:font script="Jpan" typeface="游ゴシック Light"/>
+        <a:font script="Hang" typeface="맑은 고딕"/>
+        <a:font script="Hans" typeface="等线 Light"/>
+        <a:font script="Hant" typeface="新細明體"/>
+        <a:font script="Arab" typeface="Times New Roman"/>
+        <a:font script="Hebr" typeface="Times New Roman"/>
+        <a:font script="Thai" typeface="Angsana New"/>
+        <a:font script="Ethi" typeface="Nyala"/>
+        <a:font script="Beng" typeface="Vrinda"/>
+        <a:font script="Gujr" typeface="Shruti"/>
+        <a:font script="Khmr" typeface="MoolBoran"/>
+        <a:font script="Knda" typeface="Tunga"/>
+        <a:font script="Guru" typeface="Raavi"/>
+        <a:font script="Cans" typeface="Euphemia"/>
+        <a:font script="Cher" typeface="Plantagenet Cherokee"/>
+        <a:font script="Yiii" typeface="Microsoft Yi Baiti"/>
+        <a:font script="Tibt" typeface="Microsoft Himalaya"/>
+        <a:font script="Thaa" typeface="MV Boli"/>
+        <a:font script="Deva" typeface="Mangal"/>
+        <a:font script="Telu" typeface="Gautami"/>
+        <a:font script="Taml" typeface="Latha"/>
+        <a:font script="Syrc" typeface="Estrangelo Edessa"/>
+        <a:font script="Orya" typeface="Kalinga"/>
+        <a:font script="Mlym" typeface="Kartika"/>
+        <a:font script="Laoo" typeface="DokChampa"/>
+        <a:font script="Sinh" typeface="Iskoola Pota"/>
+        <a:font script="Mong" typeface="Mongolian Baiti"/>
+        <a:font script="Viet" typeface="Times New Roman"/>
+        <a:font script="Uigh" typeface="Microsoft Uighur"/>
+        <a:font script="Geor" typeface="Sylfaen"/>
+        <a:font script="Armn" typeface="Arial"/>
+        <a:font script="Bugi" typeface="Leelawadee UI"/>
+        <a:font script="Bopo" typeface="Microsoft JhengHei"/>
+        <a:font script="Java" typeface="Javanese Text"/>
+        <a:font script="Lisu" typeface="Segoe UI"/>
+        <a:font script="Mymr" typeface="Myanmar Text"/>
+        <a:font script="Nkoo" typeface="Ebrima"/>
+        <a:font script="Olck" typeface="Nirmala UI"/>
+        <a:font script="Osma" typeface="Ebrima"/>
+        <a:font script="Phag" typeface="Phagspa"/>
+        <a:font script="Syrn" typeface="Estrangelo Edessa"/>
+        <a:font script="Syrj" typeface="Estrangelo Edessa"/>
+        <a:font script="Syre" typeface="Estrangelo Edessa"/>
+        <a:font script="Sora" typeface="Nirmala UI"/>
+        <a:font script="Tale" typeface="Microsoft Tai Le"/>
+        <a:font script="Talu" typeface="Microsoft New Tai Lue"/>
+        <a:font script="Tfng" typeface="Ebrima"/>
+      </a:majorFont>
+      <a:minorFont>
+        <a:latin typeface="Aptos" panose="02110004020202020204"/>
+        <a:ea typeface=""/>
+        <a:cs typeface=""/>
+        <a:font script="Jpan" typeface="游ゴシック"/>
+        <a:font script="Hang" typeface="맑은 고딕"/>
+        <a:font script="Hans" typeface="等线"/>
+        <a:font script="Hant" typeface="新細明體"/>
+        <a:font script="Arab" typeface="Arial"/>
+        <a:font script="Hebr" typeface="Arial"/>
+        <a:font script="Thai" typeface="Cordia New"/>
+        <a:font script="Ethi" typeface="Nyala"/>
+        <a:font script="Beng" typeface="Vrinda"/>
+        <a:font script="Gujr" typeface="Shruti"/>
+        <a:font script="Khmr" typeface="DaunPenh"/>
+        <a:font script="Knda" typeface="Tunga"/>
+        <a:font script="Guru" typeface="Raavi"/>
+        <a:font script="Cans" typeface="Euphemia"/>
+        <a:font script="Cher" typeface="Plantagenet Cherokee"/>
+        <a:font script="Yiii" typeface="Microsoft Yi Baiti"/>
+        <a:font script="Tibt" typeface="Microsoft Himalaya"/>
+        <a:font script="Thaa" typeface="MV Boli"/>
+        <a:font script="Deva" typeface="Mangal"/>
+        <a:font script="Telu" typeface="Gautami"/>
+        <a:font script="Taml" typeface="Latha"/>
+        <a:font script="Syrc" typeface="Estrangelo Edessa"/>
+        <a:font script="Orya" typeface="Kalinga"/>
+        <a:font script="Mlym" typeface="Kartika"/>
+        <a:font script="Laoo" typeface="DokChampa"/>
+        <a:font script="Sinh" typeface="Iskoola Pota"/>
+        <a:font script="Mong" typeface="Mongolian Baiti"/>
+        <a:font script="Viet" typeface="Arial"/>
+        <a:font script="Uigh" typeface="Microsoft Uighur"/>
+        <a:font script="Geor" typeface="Sylfaen"/>
+        <a:font script="Armn" typeface="Arial"/>
+        <a:font script="Bugi" typeface="Leelawadee UI"/>
+        <a:font script="Bopo" typeface="Microsoft JhengHei"/>
+        <a:font script="Java" typeface="Javanese Text"/>
+        <a:font script="Lisu" typeface="Segoe UI"/>
+        <a:font script="Mymr" typeface="Myanmar Text"/>
+        <a:font script="Nkoo" typeface="Ebrima"/>
+        <a:font script="Olck" typeface="Nirmala UI"/>
+        <a:font script="Osma" typeface="Ebrima"/>
+        <a:font script="Phag" typeface="Phagspa"/>
+        <a:font script="Syrn" typeface="Estrangelo Edessa"/>
+        <a:font script="Syrj" typeface="Estrangelo Edessa"/>
+        <a:font script="Syre" typeface="Estrangelo Edessa"/>
+        <a:font script="Sora" typeface="Nirmala UI"/>
+        <a:font script="Tale" typeface="Microsoft Tai Le"/>
+        <a:font script="Talu" typeface="Microsoft New Tai Lue"/>
+        <a:font script="Tfng" typeface="Ebrima"/>
+      </a:minorFont>
+    </a:fontScheme>
+    <a:fmtScheme name="Office">
+      <a:fillStyleLst>
+        <a:solidFill>
+          <a:schemeClr val="phClr"/>
+        </a:solidFill>
+        <a:gradFill rotWithShape="1">
+          <a:gsLst>
+            <a:gs pos="0">
+              <a:schemeClr val="phClr">
+                <a:lumMod val="110000"/>
+                <a:satMod val="105000"/>
+                <a:tint val="67000"/>
+              </a:schemeClr>
+            </a:gs>
+            <a:gs pos="50000">
+              <a:schemeClr val="phClr">
+                <a:lumMod val="105000"/>
+                <a:satMod val="103000"/>
+                <a:tint val="73000"/>
+              </a:schemeClr>
+            </a:gs>
+            <a:gs pos="100000">
+              <a:schemeClr val="phClr">
+                <a:lumMod val="105000"/>
+                <a:satMod val="109000"/>
+                <a:tint val="81000"/>
+              </a:schemeClr>
+            </a:gs>
+          </a:gsLst>
+          <a:lin ang="5400000" scaled="0"/>
+        </a:gradFill>
+        <a:gradFill rotWithShape="1">
+          <a:gsLst>
+            <a:gs pos="0">
+              <a:schemeClr val="phClr">
+                <a:satMod val="103000"/>
+                <a:lumMod val="102000"/>
+                <a:tint val="94000"/>
+              </a:schemeClr>
+            </a:gs>
+            <a:gs pos="50000">
+              <a:schemeClr val="phClr">
+                <a:satMod val="110000"/>
+                <a:lumMod val="100000"/>
+                <a:shade val="100000"/>
+              </a:schemeClr>
+            </a:gs>
+            <a:gs pos="100000">
+              <a:schemeClr val="phClr">
+                <a:lumMod val="99000"/>
+                <a:satMod val="120000"/>
+                <a:shade val="78000"/>
+              </a:schemeClr>
+            </a:gs>
+          </a:gsLst>
+          <a:lin ang="5400000" scaled="0"/>
+        </a:gradFill>
+      </a:fillStyleLst>
+      <a:lnStyleLst>
+        <a:ln w="12700" cap="flat" cmpd="sng" algn="ctr">
+          <a:solidFill>
+            <a:schemeClr val="phClr"/>
+          </a:solidFill>
+          <a:prstDash val="solid"/>
+          <a:miter lim="800000"/>
+        </a:ln>
+        <a:ln w="19050" cap="flat" cmpd="sng" algn="ctr">
+          <a:solidFill>
+            <a:schemeClr val="phClr"/>
+          </a:solidFill>
+          <a:prstDash val="solid"/>
+          <a:miter lim="800000"/>
+        </a:ln>
+        <a:ln w="25400" cap="flat" cmpd="sng" algn="ctr">
+          <a:solidFill>
+            <a:schemeClr val="phClr"/>
+          </a:solidFill>
+          <a:prstDash val="solid"/>
+          <a:miter lim="800000"/>
+        </a:ln>
+      </a:lnStyleLst>
+      <a:effectStyleLst>
+        <a:effectStyle>
+          <a:effectLst/>
+        </a:effectStyle>
+        <a:effectStyle>
+          <a:effectLst/>
+        </a:effectStyle>
+        <a:effectStyle>
+          <a:effectLst>
+            <a:outerShdw blurRad="57150" dist="19050" dir="5400000" algn="ctr" rotWithShape="0">
+              <a:srgbClr val="000000">
+                <a:alpha val="63000"/>
+              </a:srgbClr>
+            </a:outerShdw>
+          </a:effectLst>
+        </a:effectStyle>
+      </a:effectStyleLst>
+      <a:bgFillStyleLst>
+        <a:solidFill>
+          <a:schemeClr val="phClr"/>
+        </a:solidFill>
+        <a:solidFill>
+          <a:schemeClr val="phClr">
+            <a:tint val="95000"/>
+            <a:satMod val="170000"/>
+          </a:schemeClr>
+        </a:solidFill>
+        <a:gradFill rotWithShape="1">
+          <a:gsLst>
+            <a:gs pos="0">
+              <a:schemeClr val="phClr">
+                <a:tint val="93000"/>
+                <a:satMod val="150000"/>
+                <a:shade val="98000"/>
+                <a:lumMod val="102000"/>
+              </a:schemeClr>
+            </a:gs>
+            <a:gs pos="50000">
+              <a:schemeClr val="phClr">
+                <a:tint val="98000"/>
+                <a:satMod val="130000"/>
+                <a:shade val="90000"/>
+                <a:lumMod val="103000"/>
+              </a:schemeClr>
+            </a:gs>
+            <a:gs pos="100000">
+              <a:schemeClr val="phClr">
+                <a:shade val="63000"/>
+                <a:satMod val="120000"/>
+              </a:schemeClr>
+            </a:gs>
+          </a:gsLst>
+          <a:lin ang="5400000" scaled="0"/>
+        </a:gradFill>
+      </a:bgFillStyleLst>
+    </a:fmtScheme>
+  </a:themeElements>
+  <a:objectDefaults>
+    <a:lnDef>
+      <a:spPr/>
+      <a:bodyPr/>
+      <a:lstStyle/>
+      <a:style>
+        <a:lnRef idx="2">
+          <a:schemeClr val="accent1"/>
+        </a:lnRef>
+        <a:fillRef idx="0">
+          <a:schemeClr val="accent1"/>
+        </a:fillRef>
+        <a:effectRef idx="1">
+          <a:schemeClr val="accent1"/>
+        </a:effectRef>
+        <a:fontRef idx="minor">
+          <a:schemeClr val="tx1"/>
+        </a:fontRef>
+      </a:style>
+    </a:lnDef>
+  </a:objectDefaults>
+  <a:extraClrSchemeLst/>
+  <a:extLst>
+    <a:ext uri="{05A4C25C-085E-4340-85A3-A5531E510DB2}">
+      <thm15:themeFamily xmlns:thm15="http://schemas.microsoft.com/office/thememl/2012/main" name="Office Theme" id="{2E142A2C-CD16-42D6-873A-C26D2A0506FA}" vid="{1BDDFF52-6CD6-40A5-AB3C-68EB2F1E4D0A}"/>
+    </a:ext>
+  </a:extLst>
+</a:theme>
+</file>
+
+<file path=ppt/theme/theme6.xml><?xml version="1.0" encoding="utf-8"?>
+<a:theme xmlns:a="http://schemas.openxmlformats.org/drawingml/2006/main" name="Office Theme">
+  <a:themeElements>
+    <a:clrScheme name="Office">
+      <a:dk1>
+        <a:sysClr val="windowText" lastClr="000000"/>
+      </a:dk1>
+      <a:lt1>
+        <a:sysClr val="window" lastClr="FFFFFF"/>
+      </a:lt1>
+      <a:dk2>
         <a:srgbClr val="44546A"/>
       </a:dk2>
       <a:lt2>

</xml_diff>

<commit_message>
Re #1828 minor changes to check the push
</commit_message>
<xml_diff>
--- a/documentation/presentations/HoraceIntro.pptx
+++ b/documentation/presentations/HoraceIntro.pptx
@@ -29179,6 +29179,15 @@
 </file>
 
 <file path=customXml/item1.xml><?xml version="1.0" encoding="utf-8"?>
+<?mso-contentType ?>
+<FormTemplates xmlns="http://schemas.microsoft.com/sharepoint/v3/contenttype/forms">
+  <Display>DocumentLibraryForm</Display>
+  <Edit>DocumentLibraryForm</Edit>
+  <New>DocumentLibraryForm</New>
+</FormTemplates>
+</file>
+
+<file path=customXml/item2.xml><?xml version="1.0" encoding="utf-8"?>
 <ct:contentTypeSchema xmlns:ct="http://schemas.microsoft.com/office/2006/metadata/contentType" xmlns:ma="http://schemas.microsoft.com/office/2006/metadata/properties/metaAttributes" ct:_="" ma:_="" ma:contentTypeName="Document" ma:contentTypeID="0x010100FC2453390EE4BA43A5D6133E94472E90" ma:contentTypeVersion="17" ma:contentTypeDescription="Create a new document." ma:contentTypeScope="" ma:versionID="a3dd40fe961babd590db7e6ab2b6c3cc">
   <xsd:schema xmlns:xsd="http://www.w3.org/2001/XMLSchema" xmlns:xs="http://www.w3.org/2001/XMLSchema" xmlns:p="http://schemas.microsoft.com/office/2006/metadata/properties" xmlns:ns2="7a6c5452-7205-4e2c-a322-0d36e47a4095" xmlns:ns3="4367b676-3231-4229-b246-27e36f6a6ea0" targetNamespace="http://schemas.microsoft.com/office/2006/metadata/properties" ma:root="true" ma:fieldsID="9c9a1b7cbcb1e6780652342e7736d883" ns2:_="" ns3:_="">
     <xsd:import namespace="7a6c5452-7205-4e2c-a322-0d36e47a4095"/>
@@ -29427,15 +29436,6 @@
 </ct:contentTypeSchema>
 </file>
 
-<file path=customXml/item2.xml><?xml version="1.0" encoding="utf-8"?>
-<?mso-contentType ?>
-<FormTemplates xmlns="http://schemas.microsoft.com/sharepoint/v3/contenttype/forms">
-  <Display>DocumentLibraryForm</Display>
-  <Edit>DocumentLibraryForm</Edit>
-  <New>DocumentLibraryForm</New>
-</FormTemplates>
-</file>
-
 <file path=customXml/item3.xml><?xml version="1.0" encoding="utf-8"?>
 <p:properties xmlns:p="http://schemas.microsoft.com/office/2006/metadata/properties" xmlns:xsi="http://www.w3.org/2001/XMLSchema-instance" xmlns:pc="http://schemas.microsoft.com/office/infopath/2007/PartnerControls">
   <documentManagement>
@@ -29448,6 +29448,14 @@
 </file>
 
 <file path=customXml/itemProps1.xml><?xml version="1.0" encoding="utf-8"?>
+<ds:datastoreItem xmlns:ds="http://schemas.openxmlformats.org/officeDocument/2006/customXml" ds:itemID="{D79237DF-6E98-4AFD-A1AD-E1C9D616A344}">
+  <ds:schemaRefs>
+    <ds:schemaRef ds:uri="http://schemas.microsoft.com/sharepoint/v3/contenttype/forms"/>
+  </ds:schemaRefs>
+</ds:datastoreItem>
+</file>
+
+<file path=customXml/itemProps2.xml><?xml version="1.0" encoding="utf-8"?>
 <ds:datastoreItem xmlns:ds="http://schemas.openxmlformats.org/officeDocument/2006/customXml" ds:itemID="{59CAF4C5-C546-4E53-8B48-77E78F83DEF3}">
   <ds:schemaRefs>
     <ds:schemaRef ds:uri="http://schemas.microsoft.com/office/2006/metadata/contentType"/>
@@ -29462,14 +29470,6 @@
     <ds:schemaRef ds:uri="http://purl.org/dc/elements/1.1/"/>
     <ds:schemaRef ds:uri="http://purl.org/dc/terms/"/>
     <ds:schemaRef ds:uri="http://schemas.microsoft.com/internal/obd"/>
-  </ds:schemaRefs>
-</ds:datastoreItem>
-</file>
-
-<file path=customXml/itemProps2.xml><?xml version="1.0" encoding="utf-8"?>
-<ds:datastoreItem xmlns:ds="http://schemas.openxmlformats.org/officeDocument/2006/customXml" ds:itemID="{D79237DF-6E98-4AFD-A1AD-E1C9D616A344}">
-  <ds:schemaRefs>
-    <ds:schemaRef ds:uri="http://schemas.microsoft.com/sharepoint/v3/contenttype/forms"/>
   </ds:schemaRefs>
 </ds:datastoreItem>
 </file>

</xml_diff>

<commit_message>
Re #1828 Final touches and results of presentation
</commit_message>
<xml_diff>
--- a/documentation/presentations/HoraceIntro.pptx
+++ b/documentation/presentations/HoraceIntro.pptx
@@ -8,10 +8,10 @@
     <p:sldMasterId id="2147483734" r:id="rId7"/>
   </p:sldMasterIdLst>
   <p:notesMasterIdLst>
-    <p:notesMasterId r:id="rId19"/>
+    <p:notesMasterId r:id="rId20"/>
   </p:notesMasterIdLst>
   <p:handoutMasterIdLst>
-    <p:handoutMasterId r:id="rId20"/>
+    <p:handoutMasterId r:id="rId21"/>
   </p:handoutMasterIdLst>
   <p:sldIdLst>
     <p:sldId id="256" r:id="rId8"/>
@@ -24,17 +24,18 @@
     <p:sldId id="266" r:id="rId15"/>
     <p:sldId id="259" r:id="rId16"/>
     <p:sldId id="261" r:id="rId17"/>
-    <p:sldId id="267" r:id="rId18"/>
+    <p:sldId id="472" r:id="rId18"/>
+    <p:sldId id="267" r:id="rId19"/>
   </p:sldIdLst>
   <p:sldSz cx="12192000" cy="6858000"/>
   <p:notesSz cx="6858000" cy="9144000"/>
   <p:embeddedFontLst>
     <p:embeddedFont>
       <p:font typeface="Trebuchet MS" panose="020B0603020202020204" pitchFamily="34" charset="0"/>
-      <p:regular r:id="rId21"/>
-      <p:bold r:id="rId22"/>
-      <p:italic r:id="rId23"/>
-      <p:boldItalic r:id="rId24"/>
+      <p:regular r:id="rId22"/>
+      <p:bold r:id="rId23"/>
+      <p:italic r:id="rId24"/>
+      <p:boldItalic r:id="rId25"/>
     </p:embeddedFont>
   </p:embeddedFontLst>
   <p:defaultTextStyle>
@@ -15788,6 +15789,139 @@
 </file>
 
 <file path=ppt/slides/slide11.xml><?xml version="1.0" encoding="utf-8"?>
+<p:sld xmlns:a="http://schemas.openxmlformats.org/drawingml/2006/main" xmlns:r="http://schemas.openxmlformats.org/officeDocument/2006/relationships" xmlns:p="http://schemas.openxmlformats.org/presentationml/2006/main">
+  <p:cSld>
+    <p:spTree>
+      <p:nvGrpSpPr>
+        <p:cNvPr id="1" name="">
+          <a:extLst>
+            <a:ext uri="{FF2B5EF4-FFF2-40B4-BE49-F238E27FC236}">
+              <a16:creationId xmlns:a16="http://schemas.microsoft.com/office/drawing/2014/main" id="{7C6BCCD4-DB9C-F8C1-44CF-D9E2ECB5DCC5}"/>
+            </a:ext>
+          </a:extLst>
+        </p:cNvPr>
+        <p:cNvGrpSpPr/>
+        <p:nvPr/>
+      </p:nvGrpSpPr>
+      <p:grpSpPr>
+        <a:xfrm>
+          <a:off x="0" y="0"/>
+          <a:ext cx="0" cy="0"/>
+          <a:chOff x="0" y="0"/>
+          <a:chExt cx="0" cy="0"/>
+        </a:xfrm>
+      </p:grpSpPr>
+      <p:sp>
+        <p:nvSpPr>
+          <p:cNvPr id="9" name="TextBox 8">
+            <a:extLst>
+              <a:ext uri="{FF2B5EF4-FFF2-40B4-BE49-F238E27FC236}">
+                <a16:creationId xmlns:a16="http://schemas.microsoft.com/office/drawing/2014/main" id="{489B9F48-BBAE-A823-BFAF-B5C0D3B6FACB}"/>
+              </a:ext>
+            </a:extLst>
+          </p:cNvPr>
+          <p:cNvSpPr txBox="1"/>
+          <p:nvPr/>
+        </p:nvSpPr>
+        <p:spPr>
+          <a:xfrm>
+            <a:off x="4320367" y="269358"/>
+            <a:ext cx="3480440" cy="523220"/>
+          </a:xfrm>
+          <a:prstGeom prst="rect">
+            <a:avLst/>
+          </a:prstGeom>
+          <a:noFill/>
+        </p:spPr>
+        <p:txBody>
+          <a:bodyPr wrap="none" rtlCol="0">
+            <a:spAutoFit/>
+          </a:bodyPr>
+          <a:lstStyle/>
+          <a:p>
+            <a:r>
+              <a:rPr lang="en-GB" sz="2800" dirty="0">
+                <a:latin typeface="+mj-lt"/>
+              </a:rPr>
+              <a:t>HORACE resolution:</a:t>
+            </a:r>
+          </a:p>
+        </p:txBody>
+      </p:sp>
+      <p:pic>
+        <p:nvPicPr>
+          <p:cNvPr id="7" name="Picture 6">
+            <a:extLst>
+              <a:ext uri="{FF2B5EF4-FFF2-40B4-BE49-F238E27FC236}">
+                <a16:creationId xmlns:a16="http://schemas.microsoft.com/office/drawing/2014/main" id="{24D15C30-E4BB-7C8C-DE3C-E5692761AAE2}"/>
+              </a:ext>
+            </a:extLst>
+          </p:cNvPr>
+          <p:cNvPicPr>
+            <a:picLocks noChangeAspect="1"/>
+          </p:cNvPicPr>
+          <p:nvPr/>
+        </p:nvPicPr>
+        <p:blipFill>
+          <a:blip r:embed="rId2"/>
+          <a:stretch>
+            <a:fillRect/>
+          </a:stretch>
+        </p:blipFill>
+        <p:spPr>
+          <a:xfrm>
+            <a:off x="421104" y="1188118"/>
+            <a:ext cx="5545667" cy="4159250"/>
+          </a:xfrm>
+          <a:prstGeom prst="rect">
+            <a:avLst/>
+          </a:prstGeom>
+        </p:spPr>
+      </p:pic>
+      <p:pic>
+        <p:nvPicPr>
+          <p:cNvPr id="18" name="Picture 17">
+            <a:extLst>
+              <a:ext uri="{FF2B5EF4-FFF2-40B4-BE49-F238E27FC236}">
+                <a16:creationId xmlns:a16="http://schemas.microsoft.com/office/drawing/2014/main" id="{6A0F8B6A-2B76-E60B-D689-12C6DEBF6575}"/>
+              </a:ext>
+            </a:extLst>
+          </p:cNvPr>
+          <p:cNvPicPr>
+            <a:picLocks noChangeAspect="1"/>
+          </p:cNvPicPr>
+          <p:nvPr/>
+        </p:nvPicPr>
+        <p:blipFill>
+          <a:blip r:embed="rId3"/>
+          <a:stretch>
+            <a:fillRect/>
+          </a:stretch>
+        </p:blipFill>
+        <p:spPr>
+          <a:xfrm>
+            <a:off x="5642809" y="1134646"/>
+            <a:ext cx="5987715" cy="4490786"/>
+          </a:xfrm>
+          <a:prstGeom prst="rect">
+            <a:avLst/>
+          </a:prstGeom>
+        </p:spPr>
+      </p:pic>
+    </p:spTree>
+    <p:extLst>
+      <p:ext uri="{BB962C8B-B14F-4D97-AF65-F5344CB8AC3E}">
+        <p14:creationId xmlns:p14="http://schemas.microsoft.com/office/powerpoint/2010/main" val="1873026650"/>
+      </p:ext>
+    </p:extLst>
+  </p:cSld>
+  <p:clrMapOvr>
+    <a:masterClrMapping/>
+  </p:clrMapOvr>
+</p:sld>
+</file>
+
+<file path=ppt/slides/slide12.xml><?xml version="1.0" encoding="utf-8"?>
 <p:sld xmlns:a="http://schemas.openxmlformats.org/drawingml/2006/main" xmlns:r="http://schemas.openxmlformats.org/officeDocument/2006/relationships" xmlns:p="http://schemas.openxmlformats.org/presentationml/2006/main">
   <p:cSld>
     <p:spTree>

</xml_diff>